<commit_message>
Added code to presentation and exampleUsage Script
</commit_message>
<xml_diff>
--- a/21-fs-ias-lec/3-BACnetCore/Documents/presentation.pptx
+++ b/21-fs-ias-lec/3-BACnetCore/Documents/presentation.pptx
@@ -5,7 +5,7 @@
     <p:sldMasterId id="2147483648" r:id="rId4"/>
   </p:sldMasterIdLst>
   <p:notesMasterIdLst>
-    <p:notesMasterId r:id="rId15"/>
+    <p:notesMasterId r:id="rId18"/>
   </p:notesMasterIdLst>
   <p:sldIdLst>
     <p:sldId id="256" r:id="rId5"/>
@@ -14,10 +14,13 @@
     <p:sldId id="321" r:id="rId8"/>
     <p:sldId id="304" r:id="rId9"/>
     <p:sldId id="302" r:id="rId10"/>
-    <p:sldId id="306" r:id="rId11"/>
-    <p:sldId id="322" r:id="rId12"/>
-    <p:sldId id="324" r:id="rId13"/>
-    <p:sldId id="294" r:id="rId14"/>
+    <p:sldId id="325" r:id="rId11"/>
+    <p:sldId id="326" r:id="rId12"/>
+    <p:sldId id="327" r:id="rId13"/>
+    <p:sldId id="306" r:id="rId14"/>
+    <p:sldId id="322" r:id="rId15"/>
+    <p:sldId id="324" r:id="rId16"/>
+    <p:sldId id="294" r:id="rId17"/>
   </p:sldIdLst>
   <p:sldSz cx="12192000" cy="6858000"/>
   <p:notesSz cx="6858000" cy="9144000"/>
@@ -10765,6 +10768,2339 @@
         </p:nvSpPr>
         <p:spPr>
           <a:xfrm>
+            <a:off x="1524000" y="1122363"/>
+            <a:ext cx="9144000" cy="2387600"/>
+          </a:xfrm>
+        </p:spPr>
+        <p:txBody>
+          <a:bodyPr>
+            <a:normAutofit/>
+          </a:bodyPr>
+          <a:lstStyle/>
+          <a:p>
+            <a:r>
+              <a:rPr lang="de-DE" sz="5400" dirty="0">
+                <a:latin typeface="Lorenza" panose="02000500000000000000" pitchFamily="2" charset="0"/>
+                <a:ea typeface="Lato" panose="020F0502020204030203" pitchFamily="34" charset="0"/>
+                <a:cs typeface="Lato" panose="020F0502020204030203" pitchFamily="34" charset="0"/>
+              </a:rPr>
+              <a:t>Umsetzung</a:t>
+            </a:r>
+          </a:p>
+        </p:txBody>
+      </p:sp>
+      <p:sp>
+        <p:nvSpPr>
+          <p:cNvPr id="3" name="Untertitel 2">
+            <a:extLst>
+              <a:ext uri="{FF2B5EF4-FFF2-40B4-BE49-F238E27FC236}">
+                <a16:creationId xmlns:a16="http://schemas.microsoft.com/office/drawing/2014/main" id="{3885613E-274F-4F9E-9848-115F898D81A6}"/>
+              </a:ext>
+            </a:extLst>
+          </p:cNvPr>
+          <p:cNvSpPr>
+            <a:spLocks noGrp="1"/>
+          </p:cNvSpPr>
+          <p:nvPr>
+            <p:ph type="subTitle" idx="1"/>
+          </p:nvPr>
+        </p:nvSpPr>
+        <p:spPr>
+          <a:xfrm>
+            <a:off x="1524000" y="3602038"/>
+            <a:ext cx="9144000" cy="1655762"/>
+          </a:xfrm>
+        </p:spPr>
+        <p:txBody>
+          <a:bodyPr>
+            <a:normAutofit/>
+          </a:bodyPr>
+          <a:lstStyle/>
+          <a:p>
+            <a:r>
+              <a:rPr lang="de-DE" sz="2000" dirty="0">
+                <a:latin typeface="Lorenza" panose="02000500000000000000" pitchFamily="2" charset="0"/>
+              </a:rPr>
+              <a:t>Nico Aebischer</a:t>
+            </a:r>
+          </a:p>
+          <a:p>
+            <a:endParaRPr lang="de-DE" sz="2000" dirty="0"/>
+          </a:p>
+        </p:txBody>
+      </p:sp>
+      <p:cxnSp>
+        <p:nvCxnSpPr>
+          <p:cNvPr id="6" name="Gerader Verbinder 5">
+            <a:extLst>
+              <a:ext uri="{FF2B5EF4-FFF2-40B4-BE49-F238E27FC236}">
+                <a16:creationId xmlns:a16="http://schemas.microsoft.com/office/drawing/2014/main" id="{5CDE61BA-098A-4394-AB08-4D13E8BDE63D}"/>
+              </a:ext>
+            </a:extLst>
+          </p:cNvPr>
+          <p:cNvCxnSpPr/>
+          <p:nvPr/>
+        </p:nvCxnSpPr>
+        <p:spPr>
+          <a:xfrm>
+            <a:off x="2627435" y="3509963"/>
+            <a:ext cx="6937131" cy="0"/>
+          </a:xfrm>
+          <a:prstGeom prst="line">
+            <a:avLst/>
+          </a:prstGeom>
+          <a:ln>
+            <a:solidFill>
+              <a:srgbClr val="A20000"/>
+            </a:solidFill>
+          </a:ln>
+        </p:spPr>
+        <p:style>
+          <a:lnRef idx="1">
+            <a:schemeClr val="accent1"/>
+          </a:lnRef>
+          <a:fillRef idx="0">
+            <a:schemeClr val="accent1"/>
+          </a:fillRef>
+          <a:effectRef idx="0">
+            <a:schemeClr val="accent1"/>
+          </a:effectRef>
+          <a:fontRef idx="minor">
+            <a:schemeClr val="tx1"/>
+          </a:fontRef>
+        </p:style>
+      </p:cxnSp>
+      <p:sp>
+        <p:nvSpPr>
+          <p:cNvPr id="7" name="Foliennummernplatzhalter 6">
+            <a:extLst>
+              <a:ext uri="{FF2B5EF4-FFF2-40B4-BE49-F238E27FC236}">
+                <a16:creationId xmlns:a16="http://schemas.microsoft.com/office/drawing/2014/main" id="{3C903976-187B-4866-8823-D3BA2E2DF898}"/>
+              </a:ext>
+            </a:extLst>
+          </p:cNvPr>
+          <p:cNvSpPr>
+            <a:spLocks noGrp="1"/>
+          </p:cNvSpPr>
+          <p:nvPr>
+            <p:ph type="sldNum" sz="quarter" idx="12"/>
+          </p:nvPr>
+        </p:nvSpPr>
+        <p:spPr/>
+        <p:txBody>
+          <a:bodyPr/>
+          <a:lstStyle/>
+          <a:p>
+            <a:fld id="{C1498357-5119-4593-AAA7-73EBC9C10D94}" type="slidenum">
+              <a:rPr lang="de-DE" smtClean="0"/>
+              <a:t>10</a:t>
+            </a:fld>
+            <a:endParaRPr lang="de-DE"/>
+          </a:p>
+        </p:txBody>
+      </p:sp>
+    </p:spTree>
+    <p:extLst>
+      <p:ext uri="{BB962C8B-B14F-4D97-AF65-F5344CB8AC3E}">
+        <p14:creationId xmlns:p14="http://schemas.microsoft.com/office/powerpoint/2010/main" val="2890915118"/>
+      </p:ext>
+    </p:extLst>
+  </p:cSld>
+  <p:clrMapOvr>
+    <a:masterClrMapping/>
+  </p:clrMapOvr>
+</p:sld>
+</file>
+
+<file path=ppt/slides/slide11.xml><?xml version="1.0" encoding="utf-8"?>
+<p:sld xmlns:a="http://schemas.openxmlformats.org/drawingml/2006/main" xmlns:r="http://schemas.openxmlformats.org/officeDocument/2006/relationships" xmlns:p="http://schemas.openxmlformats.org/presentationml/2006/main">
+  <p:cSld>
+    <p:spTree>
+      <p:nvGrpSpPr>
+        <p:cNvPr id="1" name=""/>
+        <p:cNvGrpSpPr/>
+        <p:nvPr/>
+      </p:nvGrpSpPr>
+      <p:grpSpPr>
+        <a:xfrm>
+          <a:off x="0" y="0"/>
+          <a:ext cx="0" cy="0"/>
+          <a:chOff x="0" y="0"/>
+          <a:chExt cx="0" cy="0"/>
+        </a:xfrm>
+      </p:grpSpPr>
+      <p:sp>
+        <p:nvSpPr>
+          <p:cNvPr id="4" name="Foliennummernplatzhalter 3">
+            <a:extLst>
+              <a:ext uri="{FF2B5EF4-FFF2-40B4-BE49-F238E27FC236}">
+                <a16:creationId xmlns:a16="http://schemas.microsoft.com/office/drawing/2014/main" id="{F7EAA9C8-B37E-4CAD-80E8-34D567859D18}"/>
+              </a:ext>
+            </a:extLst>
+          </p:cNvPr>
+          <p:cNvSpPr>
+            <a:spLocks noGrp="1"/>
+          </p:cNvSpPr>
+          <p:nvPr>
+            <p:ph type="sldNum" sz="quarter" idx="12"/>
+          </p:nvPr>
+        </p:nvSpPr>
+        <p:spPr/>
+        <p:txBody>
+          <a:bodyPr/>
+          <a:lstStyle/>
+          <a:p>
+            <a:fld id="{C1498357-5119-4593-AAA7-73EBC9C10D94}" type="slidenum">
+              <a:rPr lang="de-DE" smtClean="0"/>
+              <a:t>11</a:t>
+            </a:fld>
+            <a:endParaRPr lang="de-DE"/>
+          </a:p>
+        </p:txBody>
+      </p:sp>
+      <p:grpSp>
+        <p:nvGrpSpPr>
+          <p:cNvPr id="35" name="Group 84">
+            <a:extLst>
+              <a:ext uri="{FF2B5EF4-FFF2-40B4-BE49-F238E27FC236}">
+                <a16:creationId xmlns:a16="http://schemas.microsoft.com/office/drawing/2014/main" id="{F3A34CDC-1E39-4539-AA6C-13C10A847B9B}"/>
+              </a:ext>
+            </a:extLst>
+          </p:cNvPr>
+          <p:cNvGrpSpPr/>
+          <p:nvPr/>
+        </p:nvGrpSpPr>
+        <p:grpSpPr>
+          <a:xfrm>
+            <a:off x="7512319" y="1478802"/>
+            <a:ext cx="2196562" cy="3447761"/>
+            <a:chOff x="4934796" y="1751013"/>
+            <a:chExt cx="2935287" cy="4606075"/>
+          </a:xfrm>
+          <a:solidFill>
+            <a:schemeClr val="bg1">
+              <a:lumMod val="50000"/>
+            </a:schemeClr>
+          </a:solidFill>
+        </p:grpSpPr>
+        <p:sp>
+          <p:nvSpPr>
+            <p:cNvPr id="36" name="Freeform 13">
+              <a:extLst>
+                <a:ext uri="{FF2B5EF4-FFF2-40B4-BE49-F238E27FC236}">
+                  <a16:creationId xmlns:a16="http://schemas.microsoft.com/office/drawing/2014/main" id="{4C6A90B6-137B-4DAB-BEEC-33304BC0AA40}"/>
+                </a:ext>
+              </a:extLst>
+            </p:cNvPr>
+            <p:cNvSpPr>
+              <a:spLocks noEditPoints="1"/>
+            </p:cNvSpPr>
+            <p:nvPr/>
+          </p:nvSpPr>
+          <p:spPr bwMode="auto">
+            <a:xfrm>
+              <a:off x="4934796" y="1751013"/>
+              <a:ext cx="2935287" cy="3470275"/>
+            </a:xfrm>
+            <a:custGeom>
+              <a:avLst/>
+              <a:gdLst>
+                <a:gd name="T0" fmla="*/ 774 w 1058"/>
+                <a:gd name="T1" fmla="*/ 1252 h 1252"/>
+                <a:gd name="T2" fmla="*/ 283 w 1058"/>
+                <a:gd name="T3" fmla="*/ 1252 h 1252"/>
+                <a:gd name="T4" fmla="*/ 248 w 1058"/>
+                <a:gd name="T5" fmla="*/ 1218 h 1252"/>
+                <a:gd name="T6" fmla="*/ 142 w 1058"/>
+                <a:gd name="T7" fmla="*/ 887 h 1252"/>
+                <a:gd name="T8" fmla="*/ 110 w 1058"/>
+                <a:gd name="T9" fmla="*/ 831 h 1252"/>
+                <a:gd name="T10" fmla="*/ 0 w 1058"/>
+                <a:gd name="T11" fmla="*/ 529 h 1252"/>
+                <a:gd name="T12" fmla="*/ 529 w 1058"/>
+                <a:gd name="T13" fmla="*/ 0 h 1252"/>
+                <a:gd name="T14" fmla="*/ 1058 w 1058"/>
+                <a:gd name="T15" fmla="*/ 529 h 1252"/>
+                <a:gd name="T16" fmla="*/ 947 w 1058"/>
+                <a:gd name="T17" fmla="*/ 831 h 1252"/>
+                <a:gd name="T18" fmla="*/ 916 w 1058"/>
+                <a:gd name="T19" fmla="*/ 887 h 1252"/>
+                <a:gd name="T20" fmla="*/ 810 w 1058"/>
+                <a:gd name="T21" fmla="*/ 1218 h 1252"/>
+                <a:gd name="T22" fmla="*/ 774 w 1058"/>
+                <a:gd name="T23" fmla="*/ 1252 h 1252"/>
+                <a:gd name="T24" fmla="*/ 315 w 1058"/>
+                <a:gd name="T25" fmla="*/ 1180 h 1252"/>
+                <a:gd name="T26" fmla="*/ 742 w 1058"/>
+                <a:gd name="T27" fmla="*/ 1180 h 1252"/>
+                <a:gd name="T28" fmla="*/ 851 w 1058"/>
+                <a:gd name="T29" fmla="*/ 857 h 1252"/>
+                <a:gd name="T30" fmla="*/ 885 w 1058"/>
+                <a:gd name="T31" fmla="*/ 794 h 1252"/>
+                <a:gd name="T32" fmla="*/ 986 w 1058"/>
+                <a:gd name="T33" fmla="*/ 529 h 1252"/>
+                <a:gd name="T34" fmla="*/ 529 w 1058"/>
+                <a:gd name="T35" fmla="*/ 72 h 1252"/>
+                <a:gd name="T36" fmla="*/ 72 w 1058"/>
+                <a:gd name="T37" fmla="*/ 529 h 1252"/>
+                <a:gd name="T38" fmla="*/ 172 w 1058"/>
+                <a:gd name="T39" fmla="*/ 794 h 1252"/>
+                <a:gd name="T40" fmla="*/ 207 w 1058"/>
+                <a:gd name="T41" fmla="*/ 857 h 1252"/>
+                <a:gd name="T42" fmla="*/ 315 w 1058"/>
+                <a:gd name="T43" fmla="*/ 1180 h 1252"/>
+              </a:gdLst>
+              <a:ahLst/>
+              <a:cxnLst>
+                <a:cxn ang="0">
+                  <a:pos x="T0" y="T1"/>
+                </a:cxn>
+                <a:cxn ang="0">
+                  <a:pos x="T2" y="T3"/>
+                </a:cxn>
+                <a:cxn ang="0">
+                  <a:pos x="T4" y="T5"/>
+                </a:cxn>
+                <a:cxn ang="0">
+                  <a:pos x="T6" y="T7"/>
+                </a:cxn>
+                <a:cxn ang="0">
+                  <a:pos x="T8" y="T9"/>
+                </a:cxn>
+                <a:cxn ang="0">
+                  <a:pos x="T10" y="T11"/>
+                </a:cxn>
+                <a:cxn ang="0">
+                  <a:pos x="T12" y="T13"/>
+                </a:cxn>
+                <a:cxn ang="0">
+                  <a:pos x="T14" y="T15"/>
+                </a:cxn>
+                <a:cxn ang="0">
+                  <a:pos x="T16" y="T17"/>
+                </a:cxn>
+                <a:cxn ang="0">
+                  <a:pos x="T18" y="T19"/>
+                </a:cxn>
+                <a:cxn ang="0">
+                  <a:pos x="T20" y="T21"/>
+                </a:cxn>
+                <a:cxn ang="0">
+                  <a:pos x="T22" y="T23"/>
+                </a:cxn>
+                <a:cxn ang="0">
+                  <a:pos x="T24" y="T25"/>
+                </a:cxn>
+                <a:cxn ang="0">
+                  <a:pos x="T26" y="T27"/>
+                </a:cxn>
+                <a:cxn ang="0">
+                  <a:pos x="T28" y="T29"/>
+                </a:cxn>
+                <a:cxn ang="0">
+                  <a:pos x="T30" y="T31"/>
+                </a:cxn>
+                <a:cxn ang="0">
+                  <a:pos x="T32" y="T33"/>
+                </a:cxn>
+                <a:cxn ang="0">
+                  <a:pos x="T34" y="T35"/>
+                </a:cxn>
+                <a:cxn ang="0">
+                  <a:pos x="T36" y="T37"/>
+                </a:cxn>
+                <a:cxn ang="0">
+                  <a:pos x="T38" y="T39"/>
+                </a:cxn>
+                <a:cxn ang="0">
+                  <a:pos x="T40" y="T41"/>
+                </a:cxn>
+                <a:cxn ang="0">
+                  <a:pos x="T42" y="T43"/>
+                </a:cxn>
+              </a:cxnLst>
+              <a:rect l="0" t="0" r="r" b="b"/>
+              <a:pathLst>
+                <a:path w="1058" h="1252">
+                  <a:moveTo>
+                    <a:pt x="774" y="1252"/>
+                  </a:moveTo>
+                  <a:cubicBezTo>
+                    <a:pt x="283" y="1252"/>
+                    <a:pt x="283" y="1252"/>
+                    <a:pt x="283" y="1252"/>
+                  </a:cubicBezTo>
+                  <a:cubicBezTo>
+                    <a:pt x="264" y="1252"/>
+                    <a:pt x="249" y="1237"/>
+                    <a:pt x="248" y="1218"/>
+                  </a:cubicBezTo>
+                  <a:cubicBezTo>
+                    <a:pt x="247" y="1217"/>
+                    <a:pt x="239" y="1097"/>
+                    <a:pt x="142" y="887"/>
+                  </a:cubicBezTo>
+                  <a:cubicBezTo>
+                    <a:pt x="135" y="873"/>
+                    <a:pt x="123" y="853"/>
+                    <a:pt x="110" y="831"/>
+                  </a:cubicBezTo>
+                  <a:cubicBezTo>
+                    <a:pt x="66" y="755"/>
+                    <a:pt x="0" y="640"/>
+                    <a:pt x="0" y="529"/>
+                  </a:cubicBezTo>
+                  <a:cubicBezTo>
+                    <a:pt x="0" y="238"/>
+                    <a:pt x="237" y="0"/>
+                    <a:pt x="529" y="0"/>
+                  </a:cubicBezTo>
+                  <a:cubicBezTo>
+                    <a:pt x="820" y="0"/>
+                    <a:pt x="1058" y="238"/>
+                    <a:pt x="1058" y="529"/>
+                  </a:cubicBezTo>
+                  <a:cubicBezTo>
+                    <a:pt x="1058" y="640"/>
+                    <a:pt x="991" y="755"/>
+                    <a:pt x="947" y="831"/>
+                  </a:cubicBezTo>
+                  <a:cubicBezTo>
+                    <a:pt x="934" y="853"/>
+                    <a:pt x="923" y="873"/>
+                    <a:pt x="916" y="887"/>
+                  </a:cubicBezTo>
+                  <a:cubicBezTo>
+                    <a:pt x="818" y="1097"/>
+                    <a:pt x="810" y="1217"/>
+                    <a:pt x="810" y="1218"/>
+                  </a:cubicBezTo>
+                  <a:cubicBezTo>
+                    <a:pt x="809" y="1237"/>
+                    <a:pt x="793" y="1252"/>
+                    <a:pt x="774" y="1252"/>
+                  </a:cubicBezTo>
+                  <a:close/>
+                  <a:moveTo>
+                    <a:pt x="315" y="1180"/>
+                  </a:moveTo>
+                  <a:cubicBezTo>
+                    <a:pt x="742" y="1180"/>
+                    <a:pt x="742" y="1180"/>
+                    <a:pt x="742" y="1180"/>
+                  </a:cubicBezTo>
+                  <a:cubicBezTo>
+                    <a:pt x="751" y="1127"/>
+                    <a:pt x="776" y="1017"/>
+                    <a:pt x="851" y="857"/>
+                  </a:cubicBezTo>
+                  <a:cubicBezTo>
+                    <a:pt x="859" y="840"/>
+                    <a:pt x="871" y="819"/>
+                    <a:pt x="885" y="794"/>
+                  </a:cubicBezTo>
+                  <a:cubicBezTo>
+                    <a:pt x="928" y="721"/>
+                    <a:pt x="986" y="621"/>
+                    <a:pt x="986" y="529"/>
+                  </a:cubicBezTo>
+                  <a:cubicBezTo>
+                    <a:pt x="986" y="277"/>
+                    <a:pt x="781" y="72"/>
+                    <a:pt x="529" y="72"/>
+                  </a:cubicBezTo>
+                  <a:cubicBezTo>
+                    <a:pt x="277" y="72"/>
+                    <a:pt x="72" y="277"/>
+                    <a:pt x="72" y="529"/>
+                  </a:cubicBezTo>
+                  <a:cubicBezTo>
+                    <a:pt x="72" y="621"/>
+                    <a:pt x="130" y="721"/>
+                    <a:pt x="172" y="794"/>
+                  </a:cubicBezTo>
+                  <a:cubicBezTo>
+                    <a:pt x="187" y="819"/>
+                    <a:pt x="199" y="840"/>
+                    <a:pt x="207" y="857"/>
+                  </a:cubicBezTo>
+                  <a:cubicBezTo>
+                    <a:pt x="281" y="1017"/>
+                    <a:pt x="307" y="1127"/>
+                    <a:pt x="315" y="1180"/>
+                  </a:cubicBezTo>
+                  <a:close/>
+                </a:path>
+              </a:pathLst>
+            </a:custGeom>
+            <a:grpFill/>
+            <a:ln>
+              <a:noFill/>
+            </a:ln>
+          </p:spPr>
+          <p:txBody>
+            <a:bodyPr vert="horz" wrap="square" lIns="91440" tIns="45720" rIns="91440" bIns="45720" numCol="1" anchor="t" anchorCtr="0" compatLnSpc="1">
+              <a:prstTxWarp prst="textNoShape">
+                <a:avLst/>
+              </a:prstTxWarp>
+            </a:bodyPr>
+            <a:lstStyle/>
+            <a:p>
+              <a:endParaRPr lang="id-ID">
+                <a:solidFill>
+                  <a:schemeClr val="bg1">
+                    <a:lumMod val="50000"/>
+                  </a:schemeClr>
+                </a:solidFill>
+              </a:endParaRPr>
+            </a:p>
+          </p:txBody>
+        </p:sp>
+        <p:sp>
+          <p:nvSpPr>
+            <p:cNvPr id="37" name="Freeform 16">
+              <a:extLst>
+                <a:ext uri="{FF2B5EF4-FFF2-40B4-BE49-F238E27FC236}">
+                  <a16:creationId xmlns:a16="http://schemas.microsoft.com/office/drawing/2014/main" id="{F610144E-4629-4C1C-96D8-414F8D33D78C}"/>
+                </a:ext>
+              </a:extLst>
+            </p:cNvPr>
+            <p:cNvSpPr>
+              <a:spLocks noEditPoints="1"/>
+            </p:cNvSpPr>
+            <p:nvPr/>
+          </p:nvSpPr>
+          <p:spPr bwMode="auto">
+            <a:xfrm>
+              <a:off x="5672983" y="5153763"/>
+              <a:ext cx="1500187" cy="1203325"/>
+            </a:xfrm>
+            <a:custGeom>
+              <a:avLst/>
+              <a:gdLst>
+                <a:gd name="T0" fmla="*/ 495 w 541"/>
+                <a:gd name="T1" fmla="*/ 223 h 434"/>
+                <a:gd name="T2" fmla="*/ 540 w 541"/>
+                <a:gd name="T3" fmla="*/ 168 h 434"/>
+                <a:gd name="T4" fmla="*/ 494 w 541"/>
+                <a:gd name="T5" fmla="*/ 112 h 434"/>
+                <a:gd name="T6" fmla="*/ 540 w 541"/>
+                <a:gd name="T7" fmla="*/ 57 h 434"/>
+                <a:gd name="T8" fmla="*/ 483 w 541"/>
+                <a:gd name="T9" fmla="*/ 0 h 434"/>
+                <a:gd name="T10" fmla="*/ 56 w 541"/>
+                <a:gd name="T11" fmla="*/ 0 h 434"/>
+                <a:gd name="T12" fmla="*/ 0 w 541"/>
+                <a:gd name="T13" fmla="*/ 56 h 434"/>
+                <a:gd name="T14" fmla="*/ 46 w 541"/>
+                <a:gd name="T15" fmla="*/ 112 h 434"/>
+                <a:gd name="T16" fmla="*/ 0 w 541"/>
+                <a:gd name="T17" fmla="*/ 167 h 434"/>
+                <a:gd name="T18" fmla="*/ 46 w 541"/>
+                <a:gd name="T19" fmla="*/ 223 h 434"/>
+                <a:gd name="T20" fmla="*/ 1 w 541"/>
+                <a:gd name="T21" fmla="*/ 278 h 434"/>
+                <a:gd name="T22" fmla="*/ 57 w 541"/>
+                <a:gd name="T23" fmla="*/ 334 h 434"/>
+                <a:gd name="T24" fmla="*/ 157 w 541"/>
+                <a:gd name="T25" fmla="*/ 334 h 434"/>
+                <a:gd name="T26" fmla="*/ 161 w 541"/>
+                <a:gd name="T27" fmla="*/ 351 h 434"/>
+                <a:gd name="T28" fmla="*/ 272 w 541"/>
+                <a:gd name="T29" fmla="*/ 433 h 434"/>
+                <a:gd name="T30" fmla="*/ 383 w 541"/>
+                <a:gd name="T31" fmla="*/ 335 h 434"/>
+                <a:gd name="T32" fmla="*/ 484 w 541"/>
+                <a:gd name="T33" fmla="*/ 335 h 434"/>
+                <a:gd name="T34" fmla="*/ 541 w 541"/>
+                <a:gd name="T35" fmla="*/ 278 h 434"/>
+                <a:gd name="T36" fmla="*/ 495 w 541"/>
+                <a:gd name="T37" fmla="*/ 223 h 434"/>
+                <a:gd name="T38" fmla="*/ 423 w 541"/>
+                <a:gd name="T39" fmla="*/ 241 h 434"/>
+                <a:gd name="T40" fmla="*/ 118 w 541"/>
+                <a:gd name="T41" fmla="*/ 241 h 434"/>
+                <a:gd name="T42" fmla="*/ 104 w 541"/>
+                <a:gd name="T43" fmla="*/ 227 h 434"/>
+                <a:gd name="T44" fmla="*/ 118 w 541"/>
+                <a:gd name="T45" fmla="*/ 213 h 434"/>
+                <a:gd name="T46" fmla="*/ 423 w 541"/>
+                <a:gd name="T47" fmla="*/ 213 h 434"/>
+                <a:gd name="T48" fmla="*/ 437 w 541"/>
+                <a:gd name="T49" fmla="*/ 227 h 434"/>
+                <a:gd name="T50" fmla="*/ 423 w 541"/>
+                <a:gd name="T51" fmla="*/ 241 h 434"/>
+                <a:gd name="T52" fmla="*/ 423 w 541"/>
+                <a:gd name="T53" fmla="*/ 116 h 434"/>
+                <a:gd name="T54" fmla="*/ 118 w 541"/>
+                <a:gd name="T55" fmla="*/ 116 h 434"/>
+                <a:gd name="T56" fmla="*/ 104 w 541"/>
+                <a:gd name="T57" fmla="*/ 102 h 434"/>
+                <a:gd name="T58" fmla="*/ 118 w 541"/>
+                <a:gd name="T59" fmla="*/ 88 h 434"/>
+                <a:gd name="T60" fmla="*/ 423 w 541"/>
+                <a:gd name="T61" fmla="*/ 88 h 434"/>
+                <a:gd name="T62" fmla="*/ 437 w 541"/>
+                <a:gd name="T63" fmla="*/ 102 h 434"/>
+                <a:gd name="T64" fmla="*/ 423 w 541"/>
+                <a:gd name="T65" fmla="*/ 116 h 434"/>
+              </a:gdLst>
+              <a:ahLst/>
+              <a:cxnLst>
+                <a:cxn ang="0">
+                  <a:pos x="T0" y="T1"/>
+                </a:cxn>
+                <a:cxn ang="0">
+                  <a:pos x="T2" y="T3"/>
+                </a:cxn>
+                <a:cxn ang="0">
+                  <a:pos x="T4" y="T5"/>
+                </a:cxn>
+                <a:cxn ang="0">
+                  <a:pos x="T6" y="T7"/>
+                </a:cxn>
+                <a:cxn ang="0">
+                  <a:pos x="T8" y="T9"/>
+                </a:cxn>
+                <a:cxn ang="0">
+                  <a:pos x="T10" y="T11"/>
+                </a:cxn>
+                <a:cxn ang="0">
+                  <a:pos x="T12" y="T13"/>
+                </a:cxn>
+                <a:cxn ang="0">
+                  <a:pos x="T14" y="T15"/>
+                </a:cxn>
+                <a:cxn ang="0">
+                  <a:pos x="T16" y="T17"/>
+                </a:cxn>
+                <a:cxn ang="0">
+                  <a:pos x="T18" y="T19"/>
+                </a:cxn>
+                <a:cxn ang="0">
+                  <a:pos x="T20" y="T21"/>
+                </a:cxn>
+                <a:cxn ang="0">
+                  <a:pos x="T22" y="T23"/>
+                </a:cxn>
+                <a:cxn ang="0">
+                  <a:pos x="T24" y="T25"/>
+                </a:cxn>
+                <a:cxn ang="0">
+                  <a:pos x="T26" y="T27"/>
+                </a:cxn>
+                <a:cxn ang="0">
+                  <a:pos x="T28" y="T29"/>
+                </a:cxn>
+                <a:cxn ang="0">
+                  <a:pos x="T30" y="T31"/>
+                </a:cxn>
+                <a:cxn ang="0">
+                  <a:pos x="T32" y="T33"/>
+                </a:cxn>
+                <a:cxn ang="0">
+                  <a:pos x="T34" y="T35"/>
+                </a:cxn>
+                <a:cxn ang="0">
+                  <a:pos x="T36" y="T37"/>
+                </a:cxn>
+                <a:cxn ang="0">
+                  <a:pos x="T38" y="T39"/>
+                </a:cxn>
+                <a:cxn ang="0">
+                  <a:pos x="T40" y="T41"/>
+                </a:cxn>
+                <a:cxn ang="0">
+                  <a:pos x="T42" y="T43"/>
+                </a:cxn>
+                <a:cxn ang="0">
+                  <a:pos x="T44" y="T45"/>
+                </a:cxn>
+                <a:cxn ang="0">
+                  <a:pos x="T46" y="T47"/>
+                </a:cxn>
+                <a:cxn ang="0">
+                  <a:pos x="T48" y="T49"/>
+                </a:cxn>
+                <a:cxn ang="0">
+                  <a:pos x="T50" y="T51"/>
+                </a:cxn>
+                <a:cxn ang="0">
+                  <a:pos x="T52" y="T53"/>
+                </a:cxn>
+                <a:cxn ang="0">
+                  <a:pos x="T54" y="T55"/>
+                </a:cxn>
+                <a:cxn ang="0">
+                  <a:pos x="T56" y="T57"/>
+                </a:cxn>
+                <a:cxn ang="0">
+                  <a:pos x="T58" y="T59"/>
+                </a:cxn>
+                <a:cxn ang="0">
+                  <a:pos x="T60" y="T61"/>
+                </a:cxn>
+                <a:cxn ang="0">
+                  <a:pos x="T62" y="T63"/>
+                </a:cxn>
+                <a:cxn ang="0">
+                  <a:pos x="T64" y="T65"/>
+                </a:cxn>
+              </a:cxnLst>
+              <a:rect l="0" t="0" r="r" b="b"/>
+              <a:pathLst>
+                <a:path w="541" h="434">
+                  <a:moveTo>
+                    <a:pt x="495" y="223"/>
+                  </a:moveTo>
+                  <a:cubicBezTo>
+                    <a:pt x="521" y="218"/>
+                    <a:pt x="540" y="195"/>
+                    <a:pt x="540" y="168"/>
+                  </a:cubicBezTo>
+                  <a:cubicBezTo>
+                    <a:pt x="540" y="140"/>
+                    <a:pt x="520" y="117"/>
+                    <a:pt x="494" y="112"/>
+                  </a:cubicBezTo>
+                  <a:cubicBezTo>
+                    <a:pt x="520" y="107"/>
+                    <a:pt x="540" y="84"/>
+                    <a:pt x="540" y="57"/>
+                  </a:cubicBezTo>
+                  <a:cubicBezTo>
+                    <a:pt x="540" y="26"/>
+                    <a:pt x="514" y="0"/>
+                    <a:pt x="483" y="0"/>
+                  </a:cubicBezTo>
+                  <a:cubicBezTo>
+                    <a:pt x="56" y="0"/>
+                    <a:pt x="56" y="0"/>
+                    <a:pt x="56" y="0"/>
+                  </a:cubicBezTo>
+                  <a:cubicBezTo>
+                    <a:pt x="25" y="0"/>
+                    <a:pt x="0" y="25"/>
+                    <a:pt x="0" y="56"/>
+                  </a:cubicBezTo>
+                  <a:cubicBezTo>
+                    <a:pt x="0" y="84"/>
+                    <a:pt x="20" y="107"/>
+                    <a:pt x="46" y="112"/>
+                  </a:cubicBezTo>
+                  <a:cubicBezTo>
+                    <a:pt x="20" y="117"/>
+                    <a:pt x="0" y="140"/>
+                    <a:pt x="0" y="167"/>
+                  </a:cubicBezTo>
+                  <a:cubicBezTo>
+                    <a:pt x="0" y="195"/>
+                    <a:pt x="20" y="218"/>
+                    <a:pt x="46" y="223"/>
+                  </a:cubicBezTo>
+                  <a:cubicBezTo>
+                    <a:pt x="20" y="228"/>
+                    <a:pt x="1" y="250"/>
+                    <a:pt x="1" y="278"/>
+                  </a:cubicBezTo>
+                  <a:cubicBezTo>
+                    <a:pt x="1" y="309"/>
+                    <a:pt x="26" y="334"/>
+                    <a:pt x="57" y="334"/>
+                  </a:cubicBezTo>
+                  <a:cubicBezTo>
+                    <a:pt x="157" y="334"/>
+                    <a:pt x="157" y="334"/>
+                    <a:pt x="157" y="334"/>
+                  </a:cubicBezTo>
+                  <a:cubicBezTo>
+                    <a:pt x="158" y="340"/>
+                    <a:pt x="159" y="345"/>
+                    <a:pt x="161" y="351"/>
+                  </a:cubicBezTo>
+                  <a:cubicBezTo>
+                    <a:pt x="175" y="399"/>
+                    <a:pt x="219" y="434"/>
+                    <a:pt x="272" y="433"/>
+                  </a:cubicBezTo>
+                  <a:cubicBezTo>
+                    <a:pt x="331" y="433"/>
+                    <a:pt x="380" y="392"/>
+                    <a:pt x="383" y="335"/>
+                  </a:cubicBezTo>
+                  <a:cubicBezTo>
+                    <a:pt x="484" y="335"/>
+                    <a:pt x="484" y="335"/>
+                    <a:pt x="484" y="335"/>
+                  </a:cubicBezTo>
+                  <a:cubicBezTo>
+                    <a:pt x="515" y="335"/>
+                    <a:pt x="541" y="309"/>
+                    <a:pt x="541" y="278"/>
+                  </a:cubicBezTo>
+                  <a:cubicBezTo>
+                    <a:pt x="541" y="251"/>
+                    <a:pt x="521" y="228"/>
+                    <a:pt x="495" y="223"/>
+                  </a:cubicBezTo>
+                  <a:close/>
+                  <a:moveTo>
+                    <a:pt x="423" y="241"/>
+                  </a:moveTo>
+                  <a:cubicBezTo>
+                    <a:pt x="118" y="241"/>
+                    <a:pt x="118" y="241"/>
+                    <a:pt x="118" y="241"/>
+                  </a:cubicBezTo>
+                  <a:cubicBezTo>
+                    <a:pt x="110" y="241"/>
+                    <a:pt x="104" y="234"/>
+                    <a:pt x="104" y="227"/>
+                  </a:cubicBezTo>
+                  <a:cubicBezTo>
+                    <a:pt x="104" y="219"/>
+                    <a:pt x="110" y="213"/>
+                    <a:pt x="118" y="213"/>
+                  </a:cubicBezTo>
+                  <a:cubicBezTo>
+                    <a:pt x="423" y="213"/>
+                    <a:pt x="423" y="213"/>
+                    <a:pt x="423" y="213"/>
+                  </a:cubicBezTo>
+                  <a:cubicBezTo>
+                    <a:pt x="431" y="213"/>
+                    <a:pt x="437" y="219"/>
+                    <a:pt x="437" y="227"/>
+                  </a:cubicBezTo>
+                  <a:cubicBezTo>
+                    <a:pt x="437" y="234"/>
+                    <a:pt x="431" y="241"/>
+                    <a:pt x="423" y="241"/>
+                  </a:cubicBezTo>
+                  <a:close/>
+                  <a:moveTo>
+                    <a:pt x="423" y="116"/>
+                  </a:moveTo>
+                  <a:cubicBezTo>
+                    <a:pt x="118" y="116"/>
+                    <a:pt x="118" y="116"/>
+                    <a:pt x="118" y="116"/>
+                  </a:cubicBezTo>
+                  <a:cubicBezTo>
+                    <a:pt x="110" y="116"/>
+                    <a:pt x="104" y="110"/>
+                    <a:pt x="104" y="102"/>
+                  </a:cubicBezTo>
+                  <a:cubicBezTo>
+                    <a:pt x="104" y="95"/>
+                    <a:pt x="110" y="88"/>
+                    <a:pt x="118" y="88"/>
+                  </a:cubicBezTo>
+                  <a:cubicBezTo>
+                    <a:pt x="423" y="88"/>
+                    <a:pt x="423" y="88"/>
+                    <a:pt x="423" y="88"/>
+                  </a:cubicBezTo>
+                  <a:cubicBezTo>
+                    <a:pt x="431" y="88"/>
+                    <a:pt x="437" y="95"/>
+                    <a:pt x="437" y="102"/>
+                  </a:cubicBezTo>
+                  <a:cubicBezTo>
+                    <a:pt x="437" y="110"/>
+                    <a:pt x="431" y="116"/>
+                    <a:pt x="423" y="116"/>
+                  </a:cubicBezTo>
+                  <a:close/>
+                </a:path>
+              </a:pathLst>
+            </a:custGeom>
+            <a:grpFill/>
+            <a:ln>
+              <a:noFill/>
+            </a:ln>
+          </p:spPr>
+          <p:txBody>
+            <a:bodyPr vert="horz" wrap="square" lIns="91440" tIns="45720" rIns="91440" bIns="45720" numCol="1" anchor="t" anchorCtr="0" compatLnSpc="1">
+              <a:prstTxWarp prst="textNoShape">
+                <a:avLst/>
+              </a:prstTxWarp>
+            </a:bodyPr>
+            <a:lstStyle/>
+            <a:p>
+              <a:endParaRPr lang="id-ID">
+                <a:solidFill>
+                  <a:schemeClr val="bg1">
+                    <a:lumMod val="50000"/>
+                  </a:schemeClr>
+                </a:solidFill>
+              </a:endParaRPr>
+            </a:p>
+          </p:txBody>
+        </p:sp>
+      </p:grpSp>
+      <p:grpSp>
+        <p:nvGrpSpPr>
+          <p:cNvPr id="38" name="Group 87">
+            <a:extLst>
+              <a:ext uri="{FF2B5EF4-FFF2-40B4-BE49-F238E27FC236}">
+                <a16:creationId xmlns:a16="http://schemas.microsoft.com/office/drawing/2014/main" id="{44285946-D463-49C5-B255-1F7BA3674B63}"/>
+              </a:ext>
+            </a:extLst>
+          </p:cNvPr>
+          <p:cNvGrpSpPr/>
+          <p:nvPr/>
+        </p:nvGrpSpPr>
+        <p:grpSpPr>
+          <a:xfrm>
+            <a:off x="7718056" y="1639125"/>
+            <a:ext cx="1815974" cy="1625805"/>
+            <a:chOff x="8169276" y="952501"/>
+            <a:chExt cx="3781424" cy="3384550"/>
+          </a:xfrm>
+          <a:solidFill>
+            <a:schemeClr val="accent1"/>
+          </a:solidFill>
+        </p:grpSpPr>
+        <p:sp>
+          <p:nvSpPr>
+            <p:cNvPr id="39" name="Freeform 10">
+              <a:extLst>
+                <a:ext uri="{FF2B5EF4-FFF2-40B4-BE49-F238E27FC236}">
+                  <a16:creationId xmlns:a16="http://schemas.microsoft.com/office/drawing/2014/main" id="{E2157A7C-BFCF-42C2-976D-BF9ACF54665C}"/>
+                </a:ext>
+              </a:extLst>
+            </p:cNvPr>
+            <p:cNvSpPr>
+              <a:spLocks/>
+            </p:cNvSpPr>
+            <p:nvPr/>
+          </p:nvSpPr>
+          <p:spPr bwMode="auto">
+            <a:xfrm>
+              <a:off x="9297988" y="1533526"/>
+              <a:ext cx="1392237" cy="1004888"/>
+            </a:xfrm>
+            <a:custGeom>
+              <a:avLst/>
+              <a:gdLst>
+                <a:gd name="T0" fmla="*/ 142 w 370"/>
+                <a:gd name="T1" fmla="*/ 228 h 267"/>
+                <a:gd name="T2" fmla="*/ 241 w 370"/>
+                <a:gd name="T3" fmla="*/ 248 h 267"/>
+                <a:gd name="T4" fmla="*/ 303 w 370"/>
+                <a:gd name="T5" fmla="*/ 226 h 267"/>
+                <a:gd name="T6" fmla="*/ 368 w 370"/>
+                <a:gd name="T7" fmla="*/ 107 h 267"/>
+                <a:gd name="T8" fmla="*/ 278 w 370"/>
+                <a:gd name="T9" fmla="*/ 11 h 267"/>
+                <a:gd name="T10" fmla="*/ 179 w 370"/>
+                <a:gd name="T11" fmla="*/ 58 h 267"/>
+                <a:gd name="T12" fmla="*/ 168 w 370"/>
+                <a:gd name="T13" fmla="*/ 65 h 267"/>
+                <a:gd name="T14" fmla="*/ 155 w 370"/>
+                <a:gd name="T15" fmla="*/ 60 h 267"/>
+                <a:gd name="T16" fmla="*/ 67 w 370"/>
+                <a:gd name="T17" fmla="*/ 47 h 267"/>
+                <a:gd name="T18" fmla="*/ 0 w 370"/>
+                <a:gd name="T19" fmla="*/ 116 h 267"/>
+                <a:gd name="T20" fmla="*/ 9 w 370"/>
+                <a:gd name="T21" fmla="*/ 121 h 267"/>
+                <a:gd name="T22" fmla="*/ 84 w 370"/>
+                <a:gd name="T23" fmla="*/ 267 h 267"/>
+                <a:gd name="T24" fmla="*/ 142 w 370"/>
+                <a:gd name="T25" fmla="*/ 228 h 267"/>
+              </a:gdLst>
+              <a:ahLst/>
+              <a:cxnLst>
+                <a:cxn ang="0">
+                  <a:pos x="T0" y="T1"/>
+                </a:cxn>
+                <a:cxn ang="0">
+                  <a:pos x="T2" y="T3"/>
+                </a:cxn>
+                <a:cxn ang="0">
+                  <a:pos x="T4" y="T5"/>
+                </a:cxn>
+                <a:cxn ang="0">
+                  <a:pos x="T6" y="T7"/>
+                </a:cxn>
+                <a:cxn ang="0">
+                  <a:pos x="T8" y="T9"/>
+                </a:cxn>
+                <a:cxn ang="0">
+                  <a:pos x="T10" y="T11"/>
+                </a:cxn>
+                <a:cxn ang="0">
+                  <a:pos x="T12" y="T13"/>
+                </a:cxn>
+                <a:cxn ang="0">
+                  <a:pos x="T14" y="T15"/>
+                </a:cxn>
+                <a:cxn ang="0">
+                  <a:pos x="T16" y="T17"/>
+                </a:cxn>
+                <a:cxn ang="0">
+                  <a:pos x="T18" y="T19"/>
+                </a:cxn>
+                <a:cxn ang="0">
+                  <a:pos x="T20" y="T21"/>
+                </a:cxn>
+                <a:cxn ang="0">
+                  <a:pos x="T22" y="T23"/>
+                </a:cxn>
+                <a:cxn ang="0">
+                  <a:pos x="T24" y="T25"/>
+                </a:cxn>
+              </a:cxnLst>
+              <a:rect l="0" t="0" r="r" b="b"/>
+              <a:pathLst>
+                <a:path w="370" h="267">
+                  <a:moveTo>
+                    <a:pt x="142" y="228"/>
+                  </a:moveTo>
+                  <a:cubicBezTo>
+                    <a:pt x="189" y="219"/>
+                    <a:pt x="225" y="237"/>
+                    <a:pt x="241" y="248"/>
+                  </a:cubicBezTo>
+                  <a:cubicBezTo>
+                    <a:pt x="253" y="241"/>
+                    <a:pt x="275" y="230"/>
+                    <a:pt x="303" y="226"/>
+                  </a:cubicBezTo>
+                  <a:cubicBezTo>
+                    <a:pt x="304" y="191"/>
+                    <a:pt x="319" y="134"/>
+                    <a:pt x="368" y="107"/>
+                  </a:cubicBezTo>
+                  <a:cubicBezTo>
+                    <a:pt x="370" y="82"/>
+                    <a:pt x="350" y="22"/>
+                    <a:pt x="278" y="11"/>
+                  </a:cubicBezTo>
+                  <a:cubicBezTo>
+                    <a:pt x="211" y="0"/>
+                    <a:pt x="181" y="56"/>
+                    <a:pt x="179" y="58"/>
+                  </a:cubicBezTo>
+                  <a:cubicBezTo>
+                    <a:pt x="177" y="62"/>
+                    <a:pt x="173" y="65"/>
+                    <a:pt x="168" y="65"/>
+                  </a:cubicBezTo>
+                  <a:cubicBezTo>
+                    <a:pt x="163" y="66"/>
+                    <a:pt x="158" y="64"/>
+                    <a:pt x="155" y="60"/>
+                  </a:cubicBezTo>
+                  <a:cubicBezTo>
+                    <a:pt x="155" y="59"/>
+                    <a:pt x="133" y="32"/>
+                    <a:pt x="67" y="47"/>
+                  </a:cubicBezTo>
+                  <a:cubicBezTo>
+                    <a:pt x="14" y="60"/>
+                    <a:pt x="2" y="101"/>
+                    <a:pt x="0" y="116"/>
+                  </a:cubicBezTo>
+                  <a:cubicBezTo>
+                    <a:pt x="3" y="117"/>
+                    <a:pt x="6" y="119"/>
+                    <a:pt x="9" y="121"/>
+                  </a:cubicBezTo>
+                  <a:cubicBezTo>
+                    <a:pt x="63" y="161"/>
+                    <a:pt x="80" y="224"/>
+                    <a:pt x="84" y="267"/>
+                  </a:cubicBezTo>
+                  <a:cubicBezTo>
+                    <a:pt x="96" y="250"/>
+                    <a:pt x="114" y="234"/>
+                    <a:pt x="142" y="228"/>
+                  </a:cubicBezTo>
+                  <a:close/>
+                </a:path>
+              </a:pathLst>
+            </a:custGeom>
+            <a:grpFill/>
+            <a:ln>
+              <a:noFill/>
+            </a:ln>
+            <a:extLst>
+              <a:ext uri="{91240B29-F687-4f45-9708-019B960494DF}">
+                <a14:hiddenLine xmlns:a14="http://schemas.microsoft.com/office/drawing/2010/main" xmlns="" w="9525">
+                  <a:solidFill>
+                    <a:srgbClr val="000000"/>
+                  </a:solidFill>
+                  <a:round/>
+                  <a:headEnd/>
+                  <a:tailEnd/>
+                </a14:hiddenLine>
+              </a:ext>
+            </a:extLst>
+          </p:spPr>
+          <p:txBody>
+            <a:bodyPr vert="horz" wrap="square" lIns="91440" tIns="45720" rIns="91440" bIns="45720" numCol="1" anchor="t" anchorCtr="0" compatLnSpc="1">
+              <a:prstTxWarp prst="textNoShape">
+                <a:avLst/>
+              </a:prstTxWarp>
+            </a:bodyPr>
+            <a:lstStyle/>
+            <a:p>
+              <a:endParaRPr lang="id-ID"/>
+            </a:p>
+          </p:txBody>
+        </p:sp>
+        <p:sp>
+          <p:nvSpPr>
+            <p:cNvPr id="40" name="Freeform 11">
+              <a:extLst>
+                <a:ext uri="{FF2B5EF4-FFF2-40B4-BE49-F238E27FC236}">
+                  <a16:creationId xmlns:a16="http://schemas.microsoft.com/office/drawing/2014/main" id="{183BDCFD-24C6-43F4-BD11-2AF7D81CBED3}"/>
+                </a:ext>
+              </a:extLst>
+            </p:cNvPr>
+            <p:cNvSpPr>
+              <a:spLocks/>
+            </p:cNvSpPr>
+            <p:nvPr/>
+          </p:nvSpPr>
+          <p:spPr bwMode="auto">
+            <a:xfrm>
+              <a:off x="8169276" y="952501"/>
+              <a:ext cx="3781424" cy="3384550"/>
+            </a:xfrm>
+            <a:custGeom>
+              <a:avLst/>
+              <a:gdLst>
+                <a:gd name="T0" fmla="*/ 932 w 1005"/>
+                <a:gd name="T1" fmla="*/ 313 h 899"/>
+                <a:gd name="T2" fmla="*/ 693 w 1005"/>
+                <a:gd name="T3" fmla="*/ 126 h 899"/>
+                <a:gd name="T4" fmla="*/ 192 w 1005"/>
+                <a:gd name="T5" fmla="*/ 181 h 899"/>
+                <a:gd name="T6" fmla="*/ 261 w 1005"/>
+                <a:gd name="T7" fmla="*/ 549 h 899"/>
+                <a:gd name="T8" fmla="*/ 292 w 1005"/>
+                <a:gd name="T9" fmla="*/ 298 h 899"/>
+                <a:gd name="T10" fmla="*/ 155 w 1005"/>
+                <a:gd name="T11" fmla="*/ 377 h 899"/>
+                <a:gd name="T12" fmla="*/ 244 w 1005"/>
+                <a:gd name="T13" fmla="*/ 409 h 899"/>
+                <a:gd name="T14" fmla="*/ 255 w 1005"/>
+                <a:gd name="T15" fmla="*/ 435 h 899"/>
+                <a:gd name="T16" fmla="*/ 128 w 1005"/>
+                <a:gd name="T17" fmla="*/ 388 h 899"/>
+                <a:gd name="T18" fmla="*/ 274 w 1005"/>
+                <a:gd name="T19" fmla="*/ 257 h 899"/>
+                <a:gd name="T20" fmla="*/ 464 w 1005"/>
+                <a:gd name="T21" fmla="*/ 184 h 899"/>
+                <a:gd name="T22" fmla="*/ 673 w 1005"/>
+                <a:gd name="T23" fmla="*/ 190 h 899"/>
+                <a:gd name="T24" fmla="*/ 851 w 1005"/>
+                <a:gd name="T25" fmla="*/ 291 h 899"/>
+                <a:gd name="T26" fmla="*/ 914 w 1005"/>
+                <a:gd name="T27" fmla="*/ 518 h 899"/>
+                <a:gd name="T28" fmla="*/ 747 w 1005"/>
+                <a:gd name="T29" fmla="*/ 572 h 899"/>
+                <a:gd name="T30" fmla="*/ 474 w 1005"/>
+                <a:gd name="T31" fmla="*/ 615 h 899"/>
+                <a:gd name="T32" fmla="*/ 421 w 1005"/>
+                <a:gd name="T33" fmla="*/ 572 h 899"/>
+                <a:gd name="T34" fmla="*/ 446 w 1005"/>
+                <a:gd name="T35" fmla="*/ 560 h 899"/>
+                <a:gd name="T36" fmla="*/ 553 w 1005"/>
+                <a:gd name="T37" fmla="*/ 547 h 899"/>
+                <a:gd name="T38" fmla="*/ 854 w 1005"/>
+                <a:gd name="T39" fmla="*/ 560 h 899"/>
+                <a:gd name="T40" fmla="*/ 857 w 1005"/>
+                <a:gd name="T41" fmla="*/ 427 h 899"/>
+                <a:gd name="T42" fmla="*/ 831 w 1005"/>
+                <a:gd name="T43" fmla="*/ 311 h 899"/>
+                <a:gd name="T44" fmla="*/ 632 w 1005"/>
+                <a:gd name="T45" fmla="*/ 378 h 899"/>
+                <a:gd name="T46" fmla="*/ 742 w 1005"/>
+                <a:gd name="T47" fmla="*/ 461 h 899"/>
+                <a:gd name="T48" fmla="*/ 549 w 1005"/>
+                <a:gd name="T49" fmla="*/ 430 h 899"/>
+                <a:gd name="T50" fmla="*/ 447 w 1005"/>
+                <a:gd name="T51" fmla="*/ 410 h 899"/>
+                <a:gd name="T52" fmla="*/ 381 w 1005"/>
+                <a:gd name="T53" fmla="*/ 488 h 899"/>
+                <a:gd name="T54" fmla="*/ 300 w 1005"/>
+                <a:gd name="T55" fmla="*/ 535 h 899"/>
+                <a:gd name="T56" fmla="*/ 298 w 1005"/>
+                <a:gd name="T57" fmla="*/ 538 h 899"/>
+                <a:gd name="T58" fmla="*/ 274 w 1005"/>
+                <a:gd name="T59" fmla="*/ 618 h 899"/>
+                <a:gd name="T60" fmla="*/ 288 w 1005"/>
+                <a:gd name="T61" fmla="*/ 665 h 899"/>
+                <a:gd name="T62" fmla="*/ 352 w 1005"/>
+                <a:gd name="T63" fmla="*/ 724 h 899"/>
+                <a:gd name="T64" fmla="*/ 571 w 1005"/>
+                <a:gd name="T65" fmla="*/ 769 h 899"/>
+                <a:gd name="T66" fmla="*/ 570 w 1005"/>
+                <a:gd name="T67" fmla="*/ 769 h 899"/>
+                <a:gd name="T68" fmla="*/ 681 w 1005"/>
+                <a:gd name="T69" fmla="*/ 675 h 899"/>
+                <a:gd name="T70" fmla="*/ 650 w 1005"/>
+                <a:gd name="T71" fmla="*/ 634 h 899"/>
+                <a:gd name="T72" fmla="*/ 708 w 1005"/>
+                <a:gd name="T73" fmla="*/ 665 h 899"/>
+                <a:gd name="T74" fmla="*/ 691 w 1005"/>
+                <a:gd name="T75" fmla="*/ 750 h 899"/>
+                <a:gd name="T76" fmla="*/ 491 w 1005"/>
+                <a:gd name="T77" fmla="*/ 785 h 899"/>
+                <a:gd name="T78" fmla="*/ 787 w 1005"/>
+                <a:gd name="T79" fmla="*/ 830 h 899"/>
+                <a:gd name="T80" fmla="*/ 1001 w 1005"/>
+                <a:gd name="T81" fmla="*/ 474 h 899"/>
+              </a:gdLst>
+              <a:ahLst/>
+              <a:cxnLst>
+                <a:cxn ang="0">
+                  <a:pos x="T0" y="T1"/>
+                </a:cxn>
+                <a:cxn ang="0">
+                  <a:pos x="T2" y="T3"/>
+                </a:cxn>
+                <a:cxn ang="0">
+                  <a:pos x="T4" y="T5"/>
+                </a:cxn>
+                <a:cxn ang="0">
+                  <a:pos x="T6" y="T7"/>
+                </a:cxn>
+                <a:cxn ang="0">
+                  <a:pos x="T8" y="T9"/>
+                </a:cxn>
+                <a:cxn ang="0">
+                  <a:pos x="T10" y="T11"/>
+                </a:cxn>
+                <a:cxn ang="0">
+                  <a:pos x="T12" y="T13"/>
+                </a:cxn>
+                <a:cxn ang="0">
+                  <a:pos x="T14" y="T15"/>
+                </a:cxn>
+                <a:cxn ang="0">
+                  <a:pos x="T16" y="T17"/>
+                </a:cxn>
+                <a:cxn ang="0">
+                  <a:pos x="T18" y="T19"/>
+                </a:cxn>
+                <a:cxn ang="0">
+                  <a:pos x="T20" y="T21"/>
+                </a:cxn>
+                <a:cxn ang="0">
+                  <a:pos x="T22" y="T23"/>
+                </a:cxn>
+                <a:cxn ang="0">
+                  <a:pos x="T24" y="T25"/>
+                </a:cxn>
+                <a:cxn ang="0">
+                  <a:pos x="T26" y="T27"/>
+                </a:cxn>
+                <a:cxn ang="0">
+                  <a:pos x="T28" y="T29"/>
+                </a:cxn>
+                <a:cxn ang="0">
+                  <a:pos x="T30" y="T31"/>
+                </a:cxn>
+                <a:cxn ang="0">
+                  <a:pos x="T32" y="T33"/>
+                </a:cxn>
+                <a:cxn ang="0">
+                  <a:pos x="T34" y="T35"/>
+                </a:cxn>
+                <a:cxn ang="0">
+                  <a:pos x="T36" y="T37"/>
+                </a:cxn>
+                <a:cxn ang="0">
+                  <a:pos x="T38" y="T39"/>
+                </a:cxn>
+                <a:cxn ang="0">
+                  <a:pos x="T40" y="T41"/>
+                </a:cxn>
+                <a:cxn ang="0">
+                  <a:pos x="T42" y="T43"/>
+                </a:cxn>
+                <a:cxn ang="0">
+                  <a:pos x="T44" y="T45"/>
+                </a:cxn>
+                <a:cxn ang="0">
+                  <a:pos x="T46" y="T47"/>
+                </a:cxn>
+                <a:cxn ang="0">
+                  <a:pos x="T48" y="T49"/>
+                </a:cxn>
+                <a:cxn ang="0">
+                  <a:pos x="T50" y="T51"/>
+                </a:cxn>
+                <a:cxn ang="0">
+                  <a:pos x="T52" y="T53"/>
+                </a:cxn>
+                <a:cxn ang="0">
+                  <a:pos x="T54" y="T55"/>
+                </a:cxn>
+                <a:cxn ang="0">
+                  <a:pos x="T56" y="T57"/>
+                </a:cxn>
+                <a:cxn ang="0">
+                  <a:pos x="T58" y="T59"/>
+                </a:cxn>
+                <a:cxn ang="0">
+                  <a:pos x="T60" y="T61"/>
+                </a:cxn>
+                <a:cxn ang="0">
+                  <a:pos x="T62" y="T63"/>
+                </a:cxn>
+                <a:cxn ang="0">
+                  <a:pos x="T64" y="T65"/>
+                </a:cxn>
+                <a:cxn ang="0">
+                  <a:pos x="T66" y="T67"/>
+                </a:cxn>
+                <a:cxn ang="0">
+                  <a:pos x="T68" y="T69"/>
+                </a:cxn>
+                <a:cxn ang="0">
+                  <a:pos x="T70" y="T71"/>
+                </a:cxn>
+                <a:cxn ang="0">
+                  <a:pos x="T72" y="T73"/>
+                </a:cxn>
+                <a:cxn ang="0">
+                  <a:pos x="T74" y="T75"/>
+                </a:cxn>
+                <a:cxn ang="0">
+                  <a:pos x="T76" y="T77"/>
+                </a:cxn>
+                <a:cxn ang="0">
+                  <a:pos x="T78" y="T79"/>
+                </a:cxn>
+                <a:cxn ang="0">
+                  <a:pos x="T80" y="T81"/>
+                </a:cxn>
+              </a:cxnLst>
+              <a:rect l="0" t="0" r="r" b="b"/>
+              <a:pathLst>
+                <a:path w="1005" h="899">
+                  <a:moveTo>
+                    <a:pt x="1001" y="474"/>
+                  </a:moveTo>
+                  <a:cubicBezTo>
+                    <a:pt x="997" y="357"/>
+                    <a:pt x="932" y="313"/>
+                    <a:pt x="932" y="313"/>
+                  </a:cubicBezTo>
+                  <a:cubicBezTo>
+                    <a:pt x="932" y="313"/>
+                    <a:pt x="924" y="257"/>
+                    <a:pt x="873" y="197"/>
+                  </a:cubicBezTo>
+                  <a:cubicBezTo>
+                    <a:pt x="794" y="111"/>
+                    <a:pt x="693" y="126"/>
+                    <a:pt x="693" y="126"/>
+                  </a:cubicBezTo>
+                  <a:cubicBezTo>
+                    <a:pt x="563" y="0"/>
+                    <a:pt x="430" y="97"/>
+                    <a:pt x="430" y="97"/>
+                  </a:cubicBezTo>
+                  <a:cubicBezTo>
+                    <a:pt x="245" y="36"/>
+                    <a:pt x="192" y="181"/>
+                    <a:pt x="192" y="181"/>
+                  </a:cubicBezTo>
+                  <a:cubicBezTo>
+                    <a:pt x="86" y="193"/>
+                    <a:pt x="0" y="317"/>
+                    <a:pt x="77" y="450"/>
+                  </a:cubicBezTo>
+                  <a:cubicBezTo>
+                    <a:pt x="136" y="552"/>
+                    <a:pt x="224" y="554"/>
+                    <a:pt x="261" y="549"/>
+                  </a:cubicBezTo>
+                  <a:cubicBezTo>
+                    <a:pt x="274" y="517"/>
+                    <a:pt x="300" y="481"/>
+                    <a:pt x="357" y="465"/>
+                  </a:cubicBezTo>
+                  <a:cubicBezTo>
+                    <a:pt x="358" y="459"/>
+                    <a:pt x="365" y="350"/>
+                    <a:pt x="292" y="298"/>
+                  </a:cubicBezTo>
+                  <a:cubicBezTo>
+                    <a:pt x="249" y="267"/>
+                    <a:pt x="201" y="275"/>
+                    <a:pt x="174" y="295"/>
+                  </a:cubicBezTo>
+                  <a:cubicBezTo>
+                    <a:pt x="149" y="315"/>
+                    <a:pt x="142" y="345"/>
+                    <a:pt x="155" y="377"/>
+                  </a:cubicBezTo>
+                  <a:cubicBezTo>
+                    <a:pt x="161" y="394"/>
+                    <a:pt x="171" y="405"/>
+                    <a:pt x="185" y="411"/>
+                  </a:cubicBezTo>
+                  <a:cubicBezTo>
+                    <a:pt x="212" y="422"/>
+                    <a:pt x="243" y="409"/>
+                    <a:pt x="244" y="409"/>
+                  </a:cubicBezTo>
+                  <a:cubicBezTo>
+                    <a:pt x="251" y="406"/>
+                    <a:pt x="259" y="410"/>
+                    <a:pt x="262" y="417"/>
+                  </a:cubicBezTo>
+                  <a:cubicBezTo>
+                    <a:pt x="265" y="424"/>
+                    <a:pt x="262" y="432"/>
+                    <a:pt x="255" y="435"/>
+                  </a:cubicBezTo>
+                  <a:cubicBezTo>
+                    <a:pt x="253" y="436"/>
+                    <a:pt x="212" y="453"/>
+                    <a:pt x="174" y="437"/>
+                  </a:cubicBezTo>
+                  <a:cubicBezTo>
+                    <a:pt x="154" y="429"/>
+                    <a:pt x="138" y="412"/>
+                    <a:pt x="128" y="388"/>
+                  </a:cubicBezTo>
+                  <a:cubicBezTo>
+                    <a:pt x="111" y="343"/>
+                    <a:pt x="122" y="300"/>
+                    <a:pt x="157" y="273"/>
+                  </a:cubicBezTo>
+                  <a:cubicBezTo>
+                    <a:pt x="189" y="248"/>
+                    <a:pt x="234" y="243"/>
+                    <a:pt x="274" y="257"/>
+                  </a:cubicBezTo>
+                  <a:cubicBezTo>
+                    <a:pt x="281" y="227"/>
+                    <a:pt x="304" y="187"/>
+                    <a:pt x="361" y="174"/>
+                  </a:cubicBezTo>
+                  <a:cubicBezTo>
+                    <a:pt x="415" y="161"/>
+                    <a:pt x="447" y="173"/>
+                    <a:pt x="464" y="184"/>
+                  </a:cubicBezTo>
+                  <a:cubicBezTo>
+                    <a:pt x="484" y="158"/>
+                    <a:pt x="524" y="127"/>
+                    <a:pt x="582" y="137"/>
+                  </a:cubicBezTo>
+                  <a:cubicBezTo>
+                    <a:pt x="631" y="145"/>
+                    <a:pt x="658" y="170"/>
+                    <a:pt x="673" y="190"/>
+                  </a:cubicBezTo>
+                  <a:cubicBezTo>
+                    <a:pt x="686" y="208"/>
+                    <a:pt x="694" y="230"/>
+                    <a:pt x="696" y="250"/>
+                  </a:cubicBezTo>
+                  <a:cubicBezTo>
+                    <a:pt x="751" y="237"/>
+                    <a:pt x="814" y="253"/>
+                    <a:pt x="851" y="291"/>
+                  </a:cubicBezTo>
+                  <a:cubicBezTo>
+                    <a:pt x="881" y="322"/>
+                    <a:pt x="892" y="365"/>
+                    <a:pt x="881" y="411"/>
+                  </a:cubicBezTo>
+                  <a:cubicBezTo>
+                    <a:pt x="895" y="424"/>
+                    <a:pt x="922" y="459"/>
+                    <a:pt x="914" y="518"/>
+                  </a:cubicBezTo>
+                  <a:cubicBezTo>
+                    <a:pt x="910" y="549"/>
+                    <a:pt x="893" y="573"/>
+                    <a:pt x="866" y="586"/>
+                  </a:cubicBezTo>
+                  <a:cubicBezTo>
+                    <a:pt x="831" y="602"/>
+                    <a:pt x="785" y="596"/>
+                    <a:pt x="747" y="572"/>
+                  </a:cubicBezTo>
+                  <a:cubicBezTo>
+                    <a:pt x="693" y="538"/>
+                    <a:pt x="609" y="536"/>
+                    <a:pt x="571" y="568"/>
+                  </a:cubicBezTo>
+                  <a:cubicBezTo>
+                    <a:pt x="541" y="593"/>
+                    <a:pt x="507" y="618"/>
+                    <a:pt x="474" y="615"/>
+                  </a:cubicBezTo>
+                  <a:cubicBezTo>
+                    <a:pt x="472" y="615"/>
+                    <a:pt x="469" y="615"/>
+                    <a:pt x="466" y="614"/>
+                  </a:cubicBezTo>
+                  <a:cubicBezTo>
+                    <a:pt x="447" y="610"/>
+                    <a:pt x="432" y="596"/>
+                    <a:pt x="421" y="572"/>
+                  </a:cubicBezTo>
+                  <a:cubicBezTo>
+                    <a:pt x="417" y="565"/>
+                    <a:pt x="420" y="557"/>
+                    <a:pt x="427" y="554"/>
+                  </a:cubicBezTo>
+                  <a:cubicBezTo>
+                    <a:pt x="434" y="550"/>
+                    <a:pt x="443" y="553"/>
+                    <a:pt x="446" y="560"/>
+                  </a:cubicBezTo>
+                  <a:cubicBezTo>
+                    <a:pt x="453" y="576"/>
+                    <a:pt x="462" y="584"/>
+                    <a:pt x="473" y="586"/>
+                  </a:cubicBezTo>
+                  <a:cubicBezTo>
+                    <a:pt x="496" y="592"/>
+                    <a:pt x="530" y="566"/>
+                    <a:pt x="553" y="547"/>
+                  </a:cubicBezTo>
+                  <a:cubicBezTo>
+                    <a:pt x="601" y="506"/>
+                    <a:pt x="697" y="507"/>
+                    <a:pt x="762" y="548"/>
+                  </a:cubicBezTo>
+                  <a:cubicBezTo>
+                    <a:pt x="792" y="567"/>
+                    <a:pt x="828" y="572"/>
+                    <a:pt x="854" y="560"/>
+                  </a:cubicBezTo>
+                  <a:cubicBezTo>
+                    <a:pt x="872" y="552"/>
+                    <a:pt x="883" y="536"/>
+                    <a:pt x="886" y="514"/>
+                  </a:cubicBezTo>
+                  <a:cubicBezTo>
+                    <a:pt x="895" y="455"/>
+                    <a:pt x="858" y="427"/>
+                    <a:pt x="857" y="427"/>
+                  </a:cubicBezTo>
+                  <a:cubicBezTo>
+                    <a:pt x="852" y="424"/>
+                    <a:pt x="850" y="418"/>
+                    <a:pt x="852" y="412"/>
+                  </a:cubicBezTo>
+                  <a:cubicBezTo>
+                    <a:pt x="863" y="372"/>
+                    <a:pt x="856" y="337"/>
+                    <a:pt x="831" y="311"/>
+                  </a:cubicBezTo>
+                  <a:cubicBezTo>
+                    <a:pt x="800" y="280"/>
+                    <a:pt x="747" y="266"/>
+                    <a:pt x="702" y="278"/>
+                  </a:cubicBezTo>
+                  <a:cubicBezTo>
+                    <a:pt x="642" y="293"/>
+                    <a:pt x="633" y="357"/>
+                    <a:pt x="632" y="378"/>
+                  </a:cubicBezTo>
+                  <a:cubicBezTo>
+                    <a:pt x="667" y="380"/>
+                    <a:pt x="707" y="396"/>
+                    <a:pt x="744" y="441"/>
+                  </a:cubicBezTo>
+                  <a:cubicBezTo>
+                    <a:pt x="749" y="447"/>
+                    <a:pt x="748" y="456"/>
+                    <a:pt x="742" y="461"/>
+                  </a:cubicBezTo>
+                  <a:cubicBezTo>
+                    <a:pt x="736" y="466"/>
+                    <a:pt x="727" y="465"/>
+                    <a:pt x="722" y="459"/>
+                  </a:cubicBezTo>
+                  <a:cubicBezTo>
+                    <a:pt x="643" y="362"/>
+                    <a:pt x="552" y="428"/>
+                    <a:pt x="549" y="430"/>
+                  </a:cubicBezTo>
+                  <a:cubicBezTo>
+                    <a:pt x="543" y="434"/>
+                    <a:pt x="536" y="434"/>
+                    <a:pt x="531" y="430"/>
+                  </a:cubicBezTo>
+                  <a:cubicBezTo>
+                    <a:pt x="529" y="429"/>
+                    <a:pt x="496" y="400"/>
+                    <a:pt x="447" y="410"/>
+                  </a:cubicBezTo>
+                  <a:cubicBezTo>
+                    <a:pt x="401" y="419"/>
+                    <a:pt x="393" y="476"/>
+                    <a:pt x="393" y="476"/>
+                  </a:cubicBezTo>
+                  <a:cubicBezTo>
+                    <a:pt x="392" y="482"/>
+                    <a:pt x="387" y="487"/>
+                    <a:pt x="381" y="488"/>
+                  </a:cubicBezTo>
+                  <a:cubicBezTo>
+                    <a:pt x="339" y="496"/>
+                    <a:pt x="315" y="514"/>
+                    <a:pt x="300" y="535"/>
+                  </a:cubicBezTo>
+                  <a:cubicBezTo>
+                    <a:pt x="300" y="535"/>
+                    <a:pt x="300" y="535"/>
+                    <a:pt x="300" y="535"/>
+                  </a:cubicBezTo>
+                  <a:cubicBezTo>
+                    <a:pt x="300" y="535"/>
+                    <a:pt x="300" y="535"/>
+                    <a:pt x="300" y="535"/>
+                  </a:cubicBezTo>
+                  <a:cubicBezTo>
+                    <a:pt x="299" y="536"/>
+                    <a:pt x="299" y="537"/>
+                    <a:pt x="298" y="538"/>
+                  </a:cubicBezTo>
+                  <a:cubicBezTo>
+                    <a:pt x="278" y="568"/>
+                    <a:pt x="273" y="596"/>
+                    <a:pt x="275" y="618"/>
+                  </a:cubicBezTo>
+                  <a:cubicBezTo>
+                    <a:pt x="275" y="618"/>
+                    <a:pt x="274" y="618"/>
+                    <a:pt x="274" y="618"/>
+                  </a:cubicBezTo>
+                  <a:cubicBezTo>
+                    <a:pt x="275" y="625"/>
+                    <a:pt x="276" y="631"/>
+                    <a:pt x="278" y="637"/>
+                  </a:cubicBezTo>
+                  <a:cubicBezTo>
+                    <a:pt x="281" y="654"/>
+                    <a:pt x="288" y="664"/>
+                    <a:pt x="288" y="665"/>
+                  </a:cubicBezTo>
+                  <a:cubicBezTo>
+                    <a:pt x="302" y="693"/>
+                    <a:pt x="326" y="711"/>
+                    <a:pt x="352" y="724"/>
+                  </a:cubicBezTo>
+                  <a:cubicBezTo>
+                    <a:pt x="352" y="724"/>
+                    <a:pt x="352" y="724"/>
+                    <a:pt x="352" y="724"/>
+                  </a:cubicBezTo>
+                  <a:cubicBezTo>
+                    <a:pt x="352" y="724"/>
+                    <a:pt x="418" y="758"/>
+                    <a:pt x="552" y="768"/>
+                  </a:cubicBezTo>
+                  <a:cubicBezTo>
+                    <a:pt x="558" y="768"/>
+                    <a:pt x="565" y="769"/>
+                    <a:pt x="571" y="769"/>
+                  </a:cubicBezTo>
+                  <a:cubicBezTo>
+                    <a:pt x="571" y="769"/>
+                    <a:pt x="570" y="769"/>
+                    <a:pt x="570" y="769"/>
+                  </a:cubicBezTo>
+                  <a:cubicBezTo>
+                    <a:pt x="570" y="769"/>
+                    <a:pt x="570" y="769"/>
+                    <a:pt x="570" y="769"/>
+                  </a:cubicBezTo>
+                  <a:cubicBezTo>
+                    <a:pt x="606" y="770"/>
+                    <a:pt x="643" y="762"/>
+                    <a:pt x="668" y="733"/>
+                  </a:cubicBezTo>
+                  <a:cubicBezTo>
+                    <a:pt x="682" y="710"/>
+                    <a:pt x="687" y="689"/>
+                    <a:pt x="681" y="675"/>
+                  </a:cubicBezTo>
+                  <a:cubicBezTo>
+                    <a:pt x="675" y="658"/>
+                    <a:pt x="659" y="652"/>
+                    <a:pt x="659" y="652"/>
+                  </a:cubicBezTo>
+                  <a:cubicBezTo>
+                    <a:pt x="651" y="649"/>
+                    <a:pt x="648" y="641"/>
+                    <a:pt x="650" y="634"/>
+                  </a:cubicBezTo>
+                  <a:cubicBezTo>
+                    <a:pt x="653" y="627"/>
+                    <a:pt x="661" y="623"/>
+                    <a:pt x="668" y="625"/>
+                  </a:cubicBezTo>
+                  <a:cubicBezTo>
+                    <a:pt x="669" y="626"/>
+                    <a:pt x="698" y="636"/>
+                    <a:pt x="708" y="665"/>
+                  </a:cubicBezTo>
+                  <a:cubicBezTo>
+                    <a:pt x="717" y="689"/>
+                    <a:pt x="711" y="717"/>
+                    <a:pt x="692" y="749"/>
+                  </a:cubicBezTo>
+                  <a:cubicBezTo>
+                    <a:pt x="691" y="749"/>
+                    <a:pt x="691" y="750"/>
+                    <a:pt x="691" y="750"/>
+                  </a:cubicBezTo>
+                  <a:cubicBezTo>
+                    <a:pt x="655" y="793"/>
+                    <a:pt x="601" y="800"/>
+                    <a:pt x="556" y="797"/>
+                  </a:cubicBezTo>
+                  <a:cubicBezTo>
+                    <a:pt x="530" y="795"/>
+                    <a:pt x="507" y="789"/>
+                    <a:pt x="491" y="785"/>
+                  </a:cubicBezTo>
+                  <a:cubicBezTo>
+                    <a:pt x="524" y="857"/>
+                    <a:pt x="598" y="891"/>
+                    <a:pt x="677" y="895"/>
+                  </a:cubicBezTo>
+                  <a:cubicBezTo>
+                    <a:pt x="769" y="899"/>
+                    <a:pt x="787" y="830"/>
+                    <a:pt x="787" y="830"/>
+                  </a:cubicBezTo>
+                  <a:cubicBezTo>
+                    <a:pt x="911" y="781"/>
+                    <a:pt x="884" y="656"/>
+                    <a:pt x="884" y="656"/>
+                  </a:cubicBezTo>
+                  <a:cubicBezTo>
+                    <a:pt x="936" y="648"/>
+                    <a:pt x="1005" y="590"/>
+                    <a:pt x="1001" y="474"/>
+                  </a:cubicBezTo>
+                  <a:close/>
+                </a:path>
+              </a:pathLst>
+            </a:custGeom>
+            <a:grpFill/>
+            <a:ln>
+              <a:noFill/>
+            </a:ln>
+            <a:extLst>
+              <a:ext uri="{91240B29-F687-4f45-9708-019B960494DF}">
+                <a14:hiddenLine xmlns:a14="http://schemas.microsoft.com/office/drawing/2010/main" xmlns="" w="9525">
+                  <a:solidFill>
+                    <a:srgbClr val="000000"/>
+                  </a:solidFill>
+                  <a:round/>
+                  <a:headEnd/>
+                  <a:tailEnd/>
+                </a14:hiddenLine>
+              </a:ext>
+            </a:extLst>
+          </p:spPr>
+          <p:txBody>
+            <a:bodyPr vert="horz" wrap="square" lIns="91440" tIns="45720" rIns="91440" bIns="45720" numCol="1" anchor="t" anchorCtr="0" compatLnSpc="1">
+              <a:prstTxWarp prst="textNoShape">
+                <a:avLst/>
+              </a:prstTxWarp>
+            </a:bodyPr>
+            <a:lstStyle/>
+            <a:p>
+              <a:endParaRPr lang="id-ID"/>
+            </a:p>
+          </p:txBody>
+        </p:sp>
+      </p:grpSp>
+      <p:grpSp>
+        <p:nvGrpSpPr>
+          <p:cNvPr id="41" name="Group 90">
+            <a:extLst>
+              <a:ext uri="{FF2B5EF4-FFF2-40B4-BE49-F238E27FC236}">
+                <a16:creationId xmlns:a16="http://schemas.microsoft.com/office/drawing/2014/main" id="{0D20E1D1-76C3-437B-BF00-B6B5EEEF1CD3}"/>
+              </a:ext>
+            </a:extLst>
+          </p:cNvPr>
+          <p:cNvGrpSpPr/>
+          <p:nvPr/>
+        </p:nvGrpSpPr>
+        <p:grpSpPr>
+          <a:xfrm>
+            <a:off x="7840191" y="2349396"/>
+            <a:ext cx="1182904" cy="1404967"/>
+            <a:chOff x="7826363" y="2844010"/>
+            <a:chExt cx="1580725" cy="1876982"/>
+          </a:xfrm>
+          <a:solidFill>
+            <a:schemeClr val="accent1"/>
+          </a:solidFill>
+        </p:grpSpPr>
+        <p:sp>
+          <p:nvSpPr>
+            <p:cNvPr id="42" name="Rounded Rectangle 91">
+              <a:extLst>
+                <a:ext uri="{FF2B5EF4-FFF2-40B4-BE49-F238E27FC236}">
+                  <a16:creationId xmlns:a16="http://schemas.microsoft.com/office/drawing/2014/main" id="{482F6A79-0330-4589-B9F2-04822587D3E5}"/>
+                </a:ext>
+              </a:extLst>
+            </p:cNvPr>
+            <p:cNvSpPr/>
+            <p:nvPr/>
+          </p:nvSpPr>
+          <p:spPr>
+            <a:xfrm>
+              <a:off x="8110354" y="2984172"/>
+              <a:ext cx="101591" cy="790450"/>
+            </a:xfrm>
+            <a:prstGeom prst="roundRect">
+              <a:avLst>
+                <a:gd name="adj" fmla="val 50000"/>
+              </a:avLst>
+            </a:prstGeom>
+            <a:grpFill/>
+            <a:ln>
+              <a:noFill/>
+            </a:ln>
+          </p:spPr>
+          <p:style>
+            <a:lnRef idx="2">
+              <a:schemeClr val="accent1">
+                <a:shade val="50000"/>
+              </a:schemeClr>
+            </a:lnRef>
+            <a:fillRef idx="1">
+              <a:schemeClr val="accent1"/>
+            </a:fillRef>
+            <a:effectRef idx="0">
+              <a:schemeClr val="accent1"/>
+            </a:effectRef>
+            <a:fontRef idx="minor">
+              <a:schemeClr val="lt1"/>
+            </a:fontRef>
+          </p:style>
+          <p:txBody>
+            <a:bodyPr rtlCol="0" anchor="ctr"/>
+            <a:lstStyle/>
+            <a:p>
+              <a:pPr algn="ctr"/>
+              <a:endParaRPr lang="id-ID"/>
+            </a:p>
+          </p:txBody>
+        </p:sp>
+        <p:sp>
+          <p:nvSpPr>
+            <p:cNvPr id="43" name="Rounded Rectangle 92">
+              <a:extLst>
+                <a:ext uri="{FF2B5EF4-FFF2-40B4-BE49-F238E27FC236}">
+                  <a16:creationId xmlns:a16="http://schemas.microsoft.com/office/drawing/2014/main" id="{E8675697-1A17-4EE7-A305-82236B377EF6}"/>
+                </a:ext>
+              </a:extLst>
+            </p:cNvPr>
+            <p:cNvSpPr/>
+            <p:nvPr/>
+          </p:nvSpPr>
+          <p:spPr>
+            <a:xfrm>
+              <a:off x="8375528" y="3216877"/>
+              <a:ext cx="101591" cy="1504115"/>
+            </a:xfrm>
+            <a:prstGeom prst="roundRect">
+              <a:avLst>
+                <a:gd name="adj" fmla="val 50000"/>
+              </a:avLst>
+            </a:prstGeom>
+            <a:grpFill/>
+            <a:ln>
+              <a:noFill/>
+            </a:ln>
+          </p:spPr>
+          <p:style>
+            <a:lnRef idx="2">
+              <a:schemeClr val="accent1">
+                <a:shade val="50000"/>
+              </a:schemeClr>
+            </a:lnRef>
+            <a:fillRef idx="1">
+              <a:schemeClr val="accent1"/>
+            </a:fillRef>
+            <a:effectRef idx="0">
+              <a:schemeClr val="accent1"/>
+            </a:effectRef>
+            <a:fontRef idx="minor">
+              <a:schemeClr val="lt1"/>
+            </a:fontRef>
+          </p:style>
+          <p:txBody>
+            <a:bodyPr rtlCol="0" anchor="ctr"/>
+            <a:lstStyle/>
+            <a:p>
+              <a:pPr algn="ctr"/>
+              <a:endParaRPr lang="id-ID"/>
+            </a:p>
+          </p:txBody>
+        </p:sp>
+        <p:sp>
+          <p:nvSpPr>
+            <p:cNvPr id="44" name="Rounded Rectangle 93">
+              <a:extLst>
+                <a:ext uri="{FF2B5EF4-FFF2-40B4-BE49-F238E27FC236}">
+                  <a16:creationId xmlns:a16="http://schemas.microsoft.com/office/drawing/2014/main" id="{391367F9-2E8E-4437-BF04-A034E1B45B53}"/>
+                </a:ext>
+              </a:extLst>
+            </p:cNvPr>
+            <p:cNvSpPr/>
+            <p:nvPr/>
+          </p:nvSpPr>
+          <p:spPr>
+            <a:xfrm>
+              <a:off x="8672942" y="3502859"/>
+              <a:ext cx="101591" cy="1218133"/>
+            </a:xfrm>
+            <a:prstGeom prst="roundRect">
+              <a:avLst>
+                <a:gd name="adj" fmla="val 50000"/>
+              </a:avLst>
+            </a:prstGeom>
+            <a:grpFill/>
+            <a:ln>
+              <a:noFill/>
+            </a:ln>
+          </p:spPr>
+          <p:style>
+            <a:lnRef idx="2">
+              <a:schemeClr val="accent1">
+                <a:shade val="50000"/>
+              </a:schemeClr>
+            </a:lnRef>
+            <a:fillRef idx="1">
+              <a:schemeClr val="accent1"/>
+            </a:fillRef>
+            <a:effectRef idx="0">
+              <a:schemeClr val="accent1"/>
+            </a:effectRef>
+            <a:fontRef idx="minor">
+              <a:schemeClr val="lt1"/>
+            </a:fontRef>
+          </p:style>
+          <p:txBody>
+            <a:bodyPr rtlCol="0" anchor="ctr"/>
+            <a:lstStyle/>
+            <a:p>
+              <a:pPr algn="ctr"/>
+              <a:endParaRPr lang="id-ID"/>
+            </a:p>
+          </p:txBody>
+        </p:sp>
+        <p:sp>
+          <p:nvSpPr>
+            <p:cNvPr id="45" name="Rounded Rectangle 94">
+              <a:extLst>
+                <a:ext uri="{FF2B5EF4-FFF2-40B4-BE49-F238E27FC236}">
+                  <a16:creationId xmlns:a16="http://schemas.microsoft.com/office/drawing/2014/main" id="{E6531787-ADB6-4C04-B7F1-C376B67CD30D}"/>
+                </a:ext>
+              </a:extLst>
+            </p:cNvPr>
+            <p:cNvSpPr/>
+            <p:nvPr/>
+          </p:nvSpPr>
+          <p:spPr>
+            <a:xfrm>
+              <a:off x="9007728" y="3844758"/>
+              <a:ext cx="101591" cy="876234"/>
+            </a:xfrm>
+            <a:prstGeom prst="roundRect">
+              <a:avLst>
+                <a:gd name="adj" fmla="val 50000"/>
+              </a:avLst>
+            </a:prstGeom>
+            <a:grpFill/>
+            <a:ln>
+              <a:noFill/>
+            </a:ln>
+          </p:spPr>
+          <p:style>
+            <a:lnRef idx="2">
+              <a:schemeClr val="accent1">
+                <a:shade val="50000"/>
+              </a:schemeClr>
+            </a:lnRef>
+            <a:fillRef idx="1">
+              <a:schemeClr val="accent1"/>
+            </a:fillRef>
+            <a:effectRef idx="0">
+              <a:schemeClr val="accent1"/>
+            </a:effectRef>
+            <a:fontRef idx="minor">
+              <a:schemeClr val="lt1"/>
+            </a:fontRef>
+          </p:style>
+          <p:txBody>
+            <a:bodyPr rtlCol="0" anchor="ctr"/>
+            <a:lstStyle/>
+            <a:p>
+              <a:pPr algn="ctr"/>
+              <a:endParaRPr lang="id-ID"/>
+            </a:p>
+          </p:txBody>
+        </p:sp>
+        <p:sp>
+          <p:nvSpPr>
+            <p:cNvPr id="46" name="Rounded Rectangle 95">
+              <a:extLst>
+                <a:ext uri="{FF2B5EF4-FFF2-40B4-BE49-F238E27FC236}">
+                  <a16:creationId xmlns:a16="http://schemas.microsoft.com/office/drawing/2014/main" id="{4E8D7BF5-9047-4177-B8EA-A52C8C000B97}"/>
+                </a:ext>
+              </a:extLst>
+            </p:cNvPr>
+            <p:cNvSpPr/>
+            <p:nvPr/>
+          </p:nvSpPr>
+          <p:spPr>
+            <a:xfrm>
+              <a:off x="9305497" y="3844758"/>
+              <a:ext cx="101591" cy="876234"/>
+            </a:xfrm>
+            <a:prstGeom prst="roundRect">
+              <a:avLst>
+                <a:gd name="adj" fmla="val 50000"/>
+              </a:avLst>
+            </a:prstGeom>
+            <a:grpFill/>
+            <a:ln>
+              <a:noFill/>
+            </a:ln>
+          </p:spPr>
+          <p:style>
+            <a:lnRef idx="2">
+              <a:schemeClr val="accent1">
+                <a:shade val="50000"/>
+              </a:schemeClr>
+            </a:lnRef>
+            <a:fillRef idx="1">
+              <a:schemeClr val="accent1"/>
+            </a:fillRef>
+            <a:effectRef idx="0">
+              <a:schemeClr val="accent1"/>
+            </a:effectRef>
+            <a:fontRef idx="minor">
+              <a:schemeClr val="lt1"/>
+            </a:fontRef>
+          </p:style>
+          <p:txBody>
+            <a:bodyPr rtlCol="0" anchor="ctr"/>
+            <a:lstStyle/>
+            <a:p>
+              <a:pPr algn="ctr"/>
+              <a:endParaRPr lang="id-ID"/>
+            </a:p>
+          </p:txBody>
+        </p:sp>
+        <p:sp>
+          <p:nvSpPr>
+            <p:cNvPr id="47" name="Rounded Rectangle 96">
+              <a:extLst>
+                <a:ext uri="{FF2B5EF4-FFF2-40B4-BE49-F238E27FC236}">
+                  <a16:creationId xmlns:a16="http://schemas.microsoft.com/office/drawing/2014/main" id="{E6F12B41-E055-4367-AA11-23A1D6E70CAD}"/>
+                </a:ext>
+              </a:extLst>
+            </p:cNvPr>
+            <p:cNvSpPr/>
+            <p:nvPr/>
+          </p:nvSpPr>
+          <p:spPr>
+            <a:xfrm>
+              <a:off x="7826363" y="2844010"/>
+              <a:ext cx="101591" cy="658850"/>
+            </a:xfrm>
+            <a:prstGeom prst="roundRect">
+              <a:avLst>
+                <a:gd name="adj" fmla="val 50000"/>
+              </a:avLst>
+            </a:prstGeom>
+            <a:grpFill/>
+            <a:ln>
+              <a:noFill/>
+            </a:ln>
+          </p:spPr>
+          <p:style>
+            <a:lnRef idx="2">
+              <a:schemeClr val="accent1">
+                <a:shade val="50000"/>
+              </a:schemeClr>
+            </a:lnRef>
+            <a:fillRef idx="1">
+              <a:schemeClr val="accent1"/>
+            </a:fillRef>
+            <a:effectRef idx="0">
+              <a:schemeClr val="accent1"/>
+            </a:effectRef>
+            <a:fontRef idx="minor">
+              <a:schemeClr val="lt1"/>
+            </a:fontRef>
+          </p:style>
+          <p:txBody>
+            <a:bodyPr rtlCol="0" anchor="ctr"/>
+            <a:lstStyle/>
+            <a:p>
+              <a:pPr algn="ctr"/>
+              <a:endParaRPr lang="id-ID"/>
+            </a:p>
+          </p:txBody>
+        </p:sp>
+      </p:grpSp>
+      <p:sp>
+        <p:nvSpPr>
+          <p:cNvPr id="27" name="Textfeld 26">
+            <a:extLst>
+              <a:ext uri="{FF2B5EF4-FFF2-40B4-BE49-F238E27FC236}">
+                <a16:creationId xmlns:a16="http://schemas.microsoft.com/office/drawing/2014/main" id="{F7F2AB95-F58D-4E03-85A2-70F1CD65A874}"/>
+              </a:ext>
+            </a:extLst>
+          </p:cNvPr>
+          <p:cNvSpPr txBox="1"/>
+          <p:nvPr/>
+        </p:nvSpPr>
+        <p:spPr>
+          <a:xfrm>
+            <a:off x="2370753" y="2133759"/>
+            <a:ext cx="4600564" cy="2585323"/>
+          </a:xfrm>
+          <a:prstGeom prst="rect">
+            <a:avLst/>
+          </a:prstGeom>
+          <a:noFill/>
+        </p:spPr>
+        <p:txBody>
+          <a:bodyPr wrap="square" rtlCol="0">
+            <a:spAutoFit/>
+          </a:bodyPr>
+          <a:lstStyle/>
+          <a:p>
+            <a:pPr marL="285750" indent="-285750">
+              <a:buFont typeface="Arial" panose="020B0604020202020204" pitchFamily="34" charset="0"/>
+              <a:buChar char="•"/>
+            </a:pPr>
+            <a:r>
+              <a:rPr lang="de-DE" sz="2400" dirty="0">
+                <a:solidFill>
+                  <a:schemeClr val="bg1"/>
+                </a:solidFill>
+                <a:latin typeface="Lorenza" panose="02000500000000000000" pitchFamily="2" charset="0"/>
+              </a:rPr>
+              <a:t>Neuer robuster Aufbau</a:t>
+            </a:r>
+          </a:p>
+          <a:p>
+            <a:endParaRPr lang="de-DE" sz="2400" dirty="0">
+              <a:solidFill>
+                <a:schemeClr val="bg1"/>
+              </a:solidFill>
+              <a:latin typeface="Lorenza" panose="02000500000000000000" pitchFamily="2" charset="0"/>
+            </a:endParaRPr>
+          </a:p>
+          <a:p>
+            <a:pPr marL="285750" indent="-285750">
+              <a:buFont typeface="Arial" panose="020B0604020202020204" pitchFamily="34" charset="0"/>
+              <a:buChar char="•"/>
+            </a:pPr>
+            <a:r>
+              <a:rPr lang="de-DE" sz="2400" dirty="0">
+                <a:solidFill>
+                  <a:schemeClr val="bg1"/>
+                </a:solidFill>
+                <a:latin typeface="Lorenza" panose="02000500000000000000" pitchFamily="2" charset="0"/>
+              </a:rPr>
+              <a:t>Individuelle Projekte strukturiert zusammenfassen</a:t>
+            </a:r>
+          </a:p>
+          <a:p>
+            <a:pPr marL="285750" indent="-285750">
+              <a:buFont typeface="Arial" panose="020B0604020202020204" pitchFamily="34" charset="0"/>
+              <a:buChar char="•"/>
+            </a:pPr>
+            <a:endParaRPr lang="de-DE" sz="2400" dirty="0">
+              <a:solidFill>
+                <a:schemeClr val="bg1"/>
+              </a:solidFill>
+              <a:latin typeface="Lorenza" panose="02000500000000000000" pitchFamily="2" charset="0"/>
+            </a:endParaRPr>
+          </a:p>
+          <a:p>
+            <a:pPr marL="285750" indent="-285750">
+              <a:buFont typeface="Arial" panose="020B0604020202020204" pitchFamily="34" charset="0"/>
+              <a:buChar char="•"/>
+            </a:pPr>
+            <a:r>
+              <a:rPr lang="de-DE" sz="2400" dirty="0">
+                <a:solidFill>
+                  <a:schemeClr val="bg1"/>
+                </a:solidFill>
+                <a:latin typeface="Lorenza" panose="02000500000000000000" pitchFamily="2" charset="0"/>
+              </a:rPr>
+              <a:t>Modularität</a:t>
+            </a:r>
+          </a:p>
+          <a:p>
+            <a:endParaRPr lang="de-DE" dirty="0">
+              <a:latin typeface="Lorenza" panose="02000500000000000000" pitchFamily="2" charset="0"/>
+            </a:endParaRPr>
+          </a:p>
+        </p:txBody>
+      </p:sp>
+    </p:spTree>
+    <p:extLst>
+      <p:ext uri="{BB962C8B-B14F-4D97-AF65-F5344CB8AC3E}">
+        <p14:creationId xmlns:p14="http://schemas.microsoft.com/office/powerpoint/2010/main" val="941408796"/>
+      </p:ext>
+    </p:extLst>
+  </p:cSld>
+  <p:clrMapOvr>
+    <a:masterClrMapping/>
+  </p:clrMapOvr>
+</p:sld>
+</file>
+
+<file path=ppt/slides/slide12.xml><?xml version="1.0" encoding="utf-8"?>
+<p:sld xmlns:a="http://schemas.openxmlformats.org/drawingml/2006/main" xmlns:r="http://schemas.openxmlformats.org/officeDocument/2006/relationships" xmlns:p="http://schemas.openxmlformats.org/presentationml/2006/main">
+  <p:cSld>
+    <p:spTree>
+      <p:nvGrpSpPr>
+        <p:cNvPr id="1" name=""/>
+        <p:cNvGrpSpPr/>
+        <p:nvPr/>
+      </p:nvGrpSpPr>
+      <p:grpSpPr>
+        <a:xfrm>
+          <a:off x="0" y="0"/>
+          <a:ext cx="0" cy="0"/>
+          <a:chOff x="0" y="0"/>
+          <a:chExt cx="0" cy="0"/>
+        </a:xfrm>
+      </p:grpSpPr>
+      <p:graphicFrame>
+        <p:nvGraphicFramePr>
+          <p:cNvPr id="5" name="Inhaltsplatzhalter 4">
+            <a:extLst>
+              <a:ext uri="{FF2B5EF4-FFF2-40B4-BE49-F238E27FC236}">
+                <a16:creationId xmlns:a16="http://schemas.microsoft.com/office/drawing/2014/main" id="{2CFD0B0F-02AD-4A94-BE6D-26BB6679D6B7}"/>
+              </a:ext>
+            </a:extLst>
+          </p:cNvPr>
+          <p:cNvGraphicFramePr>
+            <a:graphicFrameLocks noGrp="1"/>
+          </p:cNvGraphicFramePr>
+          <p:nvPr>
+            <p:ph idx="1"/>
+            <p:extLst>
+              <p:ext uri="{D42A27DB-BD31-4B8C-83A1-F6EECF244321}">
+                <p14:modId xmlns:p14="http://schemas.microsoft.com/office/powerpoint/2010/main" val="2048702457"/>
+              </p:ext>
+            </p:extLst>
+          </p:nvPr>
+        </p:nvGraphicFramePr>
+        <p:xfrm>
+          <a:off x="419100" y="1228575"/>
+          <a:ext cx="11353800" cy="4400849"/>
+        </p:xfrm>
+        <a:graphic>
+          <a:graphicData uri="http://schemas.openxmlformats.org/drawingml/2006/diagram">
+            <dgm:relIds xmlns:dgm="http://schemas.openxmlformats.org/drawingml/2006/diagram" xmlns:r="http://schemas.openxmlformats.org/officeDocument/2006/relationships" r:dm="rId2" r:lo="rId3" r:qs="rId4" r:cs="rId5"/>
+          </a:graphicData>
+        </a:graphic>
+      </p:graphicFrame>
+      <p:sp>
+        <p:nvSpPr>
+          <p:cNvPr id="4" name="Foliennummernplatzhalter 3">
+            <a:extLst>
+              <a:ext uri="{FF2B5EF4-FFF2-40B4-BE49-F238E27FC236}">
+                <a16:creationId xmlns:a16="http://schemas.microsoft.com/office/drawing/2014/main" id="{65A32C60-A8CB-469F-BEB4-7439947CF1BE}"/>
+              </a:ext>
+            </a:extLst>
+          </p:cNvPr>
+          <p:cNvSpPr>
+            <a:spLocks noGrp="1"/>
+          </p:cNvSpPr>
+          <p:nvPr>
+            <p:ph type="sldNum" sz="quarter" idx="12"/>
+          </p:nvPr>
+        </p:nvSpPr>
+        <p:spPr/>
+        <p:txBody>
+          <a:bodyPr/>
+          <a:lstStyle/>
+          <a:p>
+            <a:fld id="{C1498357-5119-4593-AAA7-73EBC9C10D94}" type="slidenum">
+              <a:rPr lang="de-DE" smtClean="0"/>
+              <a:t>12</a:t>
+            </a:fld>
+            <a:endParaRPr lang="de-DE"/>
+          </a:p>
+        </p:txBody>
+      </p:sp>
+    </p:spTree>
+    <p:extLst>
+      <p:ext uri="{BB962C8B-B14F-4D97-AF65-F5344CB8AC3E}">
+        <p14:creationId xmlns:p14="http://schemas.microsoft.com/office/powerpoint/2010/main" val="1664322626"/>
+      </p:ext>
+    </p:extLst>
+  </p:cSld>
+  <p:clrMapOvr>
+    <a:masterClrMapping/>
+  </p:clrMapOvr>
+</p:sld>
+</file>
+
+<file path=ppt/slides/slide13.xml><?xml version="1.0" encoding="utf-8"?>
+<p:sld xmlns:a="http://schemas.openxmlformats.org/drawingml/2006/main" xmlns:r="http://schemas.openxmlformats.org/officeDocument/2006/relationships" xmlns:p="http://schemas.openxmlformats.org/presentationml/2006/main" showMasterSp="0">
+  <p:cSld>
+    <p:spTree>
+      <p:nvGrpSpPr>
+        <p:cNvPr id="1" name=""/>
+        <p:cNvGrpSpPr/>
+        <p:nvPr/>
+      </p:nvGrpSpPr>
+      <p:grpSpPr>
+        <a:xfrm>
+          <a:off x="0" y="0"/>
+          <a:ext cx="0" cy="0"/>
+          <a:chOff x="0" y="0"/>
+          <a:chExt cx="0" cy="0"/>
+        </a:xfrm>
+      </p:grpSpPr>
+      <p:sp>
+        <p:nvSpPr>
+          <p:cNvPr id="2" name="Titel 1">
+            <a:extLst>
+              <a:ext uri="{FF2B5EF4-FFF2-40B4-BE49-F238E27FC236}">
+                <a16:creationId xmlns:a16="http://schemas.microsoft.com/office/drawing/2014/main" id="{BC70B425-094D-443F-96BD-1F0162B01C33}"/>
+              </a:ext>
+            </a:extLst>
+          </p:cNvPr>
+          <p:cNvSpPr>
+            <a:spLocks noGrp="1"/>
+          </p:cNvSpPr>
+          <p:nvPr>
+            <p:ph type="ctrTitle"/>
+          </p:nvPr>
+        </p:nvSpPr>
+        <p:spPr>
+          <a:xfrm>
             <a:off x="1524000" y="1456471"/>
             <a:ext cx="9144000" cy="2387600"/>
           </a:xfrm>
@@ -10850,7 +13186,7 @@
           <a:p>
             <a:fld id="{C1498357-5119-4593-AAA7-73EBC9C10D94}" type="slidenum">
               <a:rPr lang="de-DE" smtClean="0"/>
-              <a:t>10</a:t>
+              <a:t>13</a:t>
             </a:fld>
             <a:endParaRPr lang="de-DE"/>
           </a:p>
@@ -15728,10 +18064,10 @@
       </p:sp>
       <p:pic>
         <p:nvPicPr>
-          <p:cNvPr id="11" name="Grafik 10">
+          <p:cNvPr id="8" name="Grafik 7">
             <a:extLst>
               <a:ext uri="{FF2B5EF4-FFF2-40B4-BE49-F238E27FC236}">
-                <a16:creationId xmlns:a16="http://schemas.microsoft.com/office/drawing/2014/main" id="{0BDF8943-50F8-48ED-A322-97023F8616ED}"/>
+                <a16:creationId xmlns:a16="http://schemas.microsoft.com/office/drawing/2014/main" id="{81CB97E1-4DE7-41BE-89FA-9AD54FDC14F0}"/>
               </a:ext>
             </a:extLst>
           </p:cNvPr>
@@ -15754,12 +18090,15 @@
         </p:blipFill>
         <p:spPr>
           <a:xfrm>
-            <a:off x="1309019" y="242443"/>
-            <a:ext cx="9573961" cy="6373114"/>
+            <a:off x="2085263" y="651460"/>
+            <a:ext cx="8021473" cy="5555079"/>
           </a:xfrm>
           <a:prstGeom prst="rect">
             <a:avLst/>
           </a:prstGeom>
+          <a:effectLst>
+            <a:softEdge rad="12700"/>
+          </a:effectLst>
         </p:spPr>
       </p:pic>
     </p:spTree>
@@ -15776,7 +18115,7 @@
 </file>
 
 <file path=ppt/slides/slide7.xml><?xml version="1.0" encoding="utf-8"?>
-<p:sld xmlns:a="http://schemas.openxmlformats.org/drawingml/2006/main" xmlns:r="http://schemas.openxmlformats.org/officeDocument/2006/relationships" xmlns:p="http://schemas.openxmlformats.org/presentationml/2006/main" showMasterSp="0">
+<p:sld xmlns:a="http://schemas.openxmlformats.org/drawingml/2006/main" xmlns:r="http://schemas.openxmlformats.org/officeDocument/2006/relationships" xmlns:p="http://schemas.openxmlformats.org/presentationml/2006/main">
   <p:cSld>
     <p:spTree>
       <p:nvGrpSpPr>
@@ -15794,10 +18133,10 @@
       </p:grpSpPr>
       <p:sp>
         <p:nvSpPr>
-          <p:cNvPr id="2" name="Titel 1">
+          <p:cNvPr id="7" name="Titel 6">
             <a:extLst>
               <a:ext uri="{FF2B5EF4-FFF2-40B4-BE49-F238E27FC236}">
-                <a16:creationId xmlns:a16="http://schemas.microsoft.com/office/drawing/2014/main" id="{BC70B425-094D-443F-96BD-1F0162B01C33}"/>
+                <a16:creationId xmlns:a16="http://schemas.microsoft.com/office/drawing/2014/main" id="{4CC51961-35A4-486A-8412-5241BB4E29E0}"/>
               </a:ext>
             </a:extLst>
           </p:cNvPr>
@@ -15805,119 +18144,27 @@
             <a:spLocks noGrp="1"/>
           </p:cNvSpPr>
           <p:nvPr>
-            <p:ph type="ctrTitle"/>
+            <p:ph type="title"/>
           </p:nvPr>
         </p:nvSpPr>
-        <p:spPr>
-          <a:xfrm>
-            <a:off x="1524000" y="1122363"/>
-            <a:ext cx="9144000" cy="2387600"/>
-          </a:xfrm>
-        </p:spPr>
+        <p:spPr/>
         <p:txBody>
-          <a:bodyPr>
-            <a:normAutofit/>
-          </a:bodyPr>
+          <a:bodyPr/>
           <a:lstStyle/>
           <a:p>
             <a:r>
-              <a:rPr lang="de-DE" sz="5400" dirty="0">
-                <a:latin typeface="Lorenza" panose="02000500000000000000" pitchFamily="2" charset="0"/>
-                <a:ea typeface="Lato" panose="020F0502020204030203" pitchFamily="34" charset="0"/>
-                <a:cs typeface="Lato" panose="020F0502020204030203" pitchFamily="34" charset="0"/>
-              </a:rPr>
-              <a:t>Umsetzung</a:t>
+              <a:rPr lang="de-DE" dirty="0"/>
+              <a:t>Netzknoten erstellen</a:t>
             </a:r>
           </a:p>
         </p:txBody>
       </p:sp>
       <p:sp>
         <p:nvSpPr>
-          <p:cNvPr id="3" name="Untertitel 2">
+          <p:cNvPr id="4" name="Foliennummernplatzhalter 3">
             <a:extLst>
               <a:ext uri="{FF2B5EF4-FFF2-40B4-BE49-F238E27FC236}">
-                <a16:creationId xmlns:a16="http://schemas.microsoft.com/office/drawing/2014/main" id="{3885613E-274F-4F9E-9848-115F898D81A6}"/>
-              </a:ext>
-            </a:extLst>
-          </p:cNvPr>
-          <p:cNvSpPr>
-            <a:spLocks noGrp="1"/>
-          </p:cNvSpPr>
-          <p:nvPr>
-            <p:ph type="subTitle" idx="1"/>
-          </p:nvPr>
-        </p:nvSpPr>
-        <p:spPr>
-          <a:xfrm>
-            <a:off x="1524000" y="3602038"/>
-            <a:ext cx="9144000" cy="1655762"/>
-          </a:xfrm>
-        </p:spPr>
-        <p:txBody>
-          <a:bodyPr>
-            <a:normAutofit/>
-          </a:bodyPr>
-          <a:lstStyle/>
-          <a:p>
-            <a:r>
-              <a:rPr lang="de-DE" sz="2000" dirty="0">
-                <a:latin typeface="Lorenza" panose="02000500000000000000" pitchFamily="2" charset="0"/>
-              </a:rPr>
-              <a:t>Nico Aebischer</a:t>
-            </a:r>
-          </a:p>
-          <a:p>
-            <a:endParaRPr lang="de-DE" sz="2000" dirty="0"/>
-          </a:p>
-        </p:txBody>
-      </p:sp>
-      <p:cxnSp>
-        <p:nvCxnSpPr>
-          <p:cNvPr id="6" name="Gerader Verbinder 5">
-            <a:extLst>
-              <a:ext uri="{FF2B5EF4-FFF2-40B4-BE49-F238E27FC236}">
-                <a16:creationId xmlns:a16="http://schemas.microsoft.com/office/drawing/2014/main" id="{5CDE61BA-098A-4394-AB08-4D13E8BDE63D}"/>
-              </a:ext>
-            </a:extLst>
-          </p:cNvPr>
-          <p:cNvCxnSpPr/>
-          <p:nvPr/>
-        </p:nvCxnSpPr>
-        <p:spPr>
-          <a:xfrm>
-            <a:off x="2627435" y="3509963"/>
-            <a:ext cx="6937131" cy="0"/>
-          </a:xfrm>
-          <a:prstGeom prst="line">
-            <a:avLst/>
-          </a:prstGeom>
-          <a:ln>
-            <a:solidFill>
-              <a:srgbClr val="A20000"/>
-            </a:solidFill>
-          </a:ln>
-        </p:spPr>
-        <p:style>
-          <a:lnRef idx="1">
-            <a:schemeClr val="accent1"/>
-          </a:lnRef>
-          <a:fillRef idx="0">
-            <a:schemeClr val="accent1"/>
-          </a:fillRef>
-          <a:effectRef idx="0">
-            <a:schemeClr val="accent1"/>
-          </a:effectRef>
-          <a:fontRef idx="minor">
-            <a:schemeClr val="tx1"/>
-          </a:fontRef>
-        </p:style>
-      </p:cxnSp>
-      <p:sp>
-        <p:nvSpPr>
-          <p:cNvPr id="7" name="Foliennummernplatzhalter 6">
-            <a:extLst>
-              <a:ext uri="{FF2B5EF4-FFF2-40B4-BE49-F238E27FC236}">
-                <a16:creationId xmlns:a16="http://schemas.microsoft.com/office/drawing/2014/main" id="{3C903976-187B-4866-8823-D3BA2E2DF898}"/>
+                <a16:creationId xmlns:a16="http://schemas.microsoft.com/office/drawing/2014/main" id="{5A7489DB-B7BF-4005-97A7-2E400F3EE6BF}"/>
               </a:ext>
             </a:extLst>
           </p:cNvPr>
@@ -15941,10 +18188,46 @@
           </a:p>
         </p:txBody>
       </p:sp>
+      <p:pic>
+        <p:nvPicPr>
+          <p:cNvPr id="6" name="Grafik 5">
+            <a:extLst>
+              <a:ext uri="{FF2B5EF4-FFF2-40B4-BE49-F238E27FC236}">
+                <a16:creationId xmlns:a16="http://schemas.microsoft.com/office/drawing/2014/main" id="{788687E4-1BA5-4172-8FB5-080816C798B3}"/>
+              </a:ext>
+            </a:extLst>
+          </p:cNvPr>
+          <p:cNvPicPr>
+            <a:picLocks noChangeAspect="1"/>
+          </p:cNvPicPr>
+          <p:nvPr/>
+        </p:nvPicPr>
+        <p:blipFill>
+          <a:blip r:embed="rId2">
+            <a:extLst>
+              <a:ext uri="{28A0092B-C50C-407E-A947-70E740481C1C}">
+                <a14:useLocalDpi xmlns:a14="http://schemas.microsoft.com/office/drawing/2010/main" val="0"/>
+              </a:ext>
+            </a:extLst>
+          </a:blip>
+          <a:stretch>
+            <a:fillRect/>
+          </a:stretch>
+        </p:blipFill>
+        <p:spPr>
+          <a:xfrm>
+            <a:off x="2037250" y="2207523"/>
+            <a:ext cx="7944950" cy="2694983"/>
+          </a:xfrm>
+          <a:prstGeom prst="rect">
+            <a:avLst/>
+          </a:prstGeom>
+        </p:spPr>
+      </p:pic>
     </p:spTree>
     <p:extLst>
       <p:ext uri="{BB962C8B-B14F-4D97-AF65-F5344CB8AC3E}">
-        <p14:creationId xmlns:p14="http://schemas.microsoft.com/office/powerpoint/2010/main" val="2890915118"/>
+        <p14:creationId xmlns:p14="http://schemas.microsoft.com/office/powerpoint/2010/main" val="1491491862"/>
       </p:ext>
     </p:extLst>
   </p:cSld>
@@ -15973,10 +18256,38 @@
       </p:grpSpPr>
       <p:sp>
         <p:nvSpPr>
+          <p:cNvPr id="7" name="Titel 6">
+            <a:extLst>
+              <a:ext uri="{FF2B5EF4-FFF2-40B4-BE49-F238E27FC236}">
+                <a16:creationId xmlns:a16="http://schemas.microsoft.com/office/drawing/2014/main" id="{4CC51961-35A4-486A-8412-5241BB4E29E0}"/>
+              </a:ext>
+            </a:extLst>
+          </p:cNvPr>
+          <p:cNvSpPr>
+            <a:spLocks noGrp="1"/>
+          </p:cNvSpPr>
+          <p:nvPr>
+            <p:ph type="title"/>
+          </p:nvPr>
+        </p:nvSpPr>
+        <p:spPr/>
+        <p:txBody>
+          <a:bodyPr/>
+          <a:lstStyle/>
+          <a:p>
+            <a:r>
+              <a:rPr lang="de-DE" dirty="0"/>
+              <a:t>Der Masterfeed</a:t>
+            </a:r>
+          </a:p>
+        </p:txBody>
+      </p:sp>
+      <p:sp>
+        <p:nvSpPr>
           <p:cNvPr id="4" name="Foliennummernplatzhalter 3">
             <a:extLst>
               <a:ext uri="{FF2B5EF4-FFF2-40B4-BE49-F238E27FC236}">
-                <a16:creationId xmlns:a16="http://schemas.microsoft.com/office/drawing/2014/main" id="{F7EAA9C8-B37E-4CAD-80E8-34D567859D18}"/>
+                <a16:creationId xmlns:a16="http://schemas.microsoft.com/office/drawing/2014/main" id="{5A7489DB-B7BF-4005-97A7-2E400F3EE6BF}"/>
               </a:ext>
             </a:extLst>
           </p:cNvPr>
@@ -16000,2015 +18311,40 @@
           </a:p>
         </p:txBody>
       </p:sp>
-      <p:grpSp>
-        <p:nvGrpSpPr>
-          <p:cNvPr id="35" name="Group 84">
+      <p:pic>
+        <p:nvPicPr>
+          <p:cNvPr id="8" name="Grafik 7">
             <a:extLst>
               <a:ext uri="{FF2B5EF4-FFF2-40B4-BE49-F238E27FC236}">
-                <a16:creationId xmlns:a16="http://schemas.microsoft.com/office/drawing/2014/main" id="{F3A34CDC-1E39-4539-AA6C-13C10A847B9B}"/>
+                <a16:creationId xmlns:a16="http://schemas.microsoft.com/office/drawing/2014/main" id="{BEDE4F8C-8CCD-4FE4-850D-13D6B3E3C989}"/>
               </a:ext>
             </a:extLst>
           </p:cNvPr>
-          <p:cNvGrpSpPr/>
+          <p:cNvPicPr>
+            <a:picLocks noChangeAspect="1"/>
+          </p:cNvPicPr>
           <p:nvPr/>
-        </p:nvGrpSpPr>
-        <p:grpSpPr>
-          <a:xfrm>
-            <a:off x="7512319" y="1478802"/>
-            <a:ext cx="2196562" cy="3447761"/>
-            <a:chOff x="4934796" y="1751013"/>
-            <a:chExt cx="2935287" cy="4606075"/>
-          </a:xfrm>
-          <a:solidFill>
-            <a:schemeClr val="bg1">
-              <a:lumMod val="50000"/>
-            </a:schemeClr>
-          </a:solidFill>
-        </p:grpSpPr>
-        <p:sp>
-          <p:nvSpPr>
-            <p:cNvPr id="36" name="Freeform 13">
-              <a:extLst>
-                <a:ext uri="{FF2B5EF4-FFF2-40B4-BE49-F238E27FC236}">
-                  <a16:creationId xmlns:a16="http://schemas.microsoft.com/office/drawing/2014/main" id="{4C6A90B6-137B-4DAB-BEEC-33304BC0AA40}"/>
-                </a:ext>
-              </a:extLst>
-            </p:cNvPr>
-            <p:cNvSpPr>
-              <a:spLocks noEditPoints="1"/>
-            </p:cNvSpPr>
-            <p:nvPr/>
-          </p:nvSpPr>
-          <p:spPr bwMode="auto">
-            <a:xfrm>
-              <a:off x="4934796" y="1751013"/>
-              <a:ext cx="2935287" cy="3470275"/>
-            </a:xfrm>
-            <a:custGeom>
-              <a:avLst/>
-              <a:gdLst>
-                <a:gd name="T0" fmla="*/ 774 w 1058"/>
-                <a:gd name="T1" fmla="*/ 1252 h 1252"/>
-                <a:gd name="T2" fmla="*/ 283 w 1058"/>
-                <a:gd name="T3" fmla="*/ 1252 h 1252"/>
-                <a:gd name="T4" fmla="*/ 248 w 1058"/>
-                <a:gd name="T5" fmla="*/ 1218 h 1252"/>
-                <a:gd name="T6" fmla="*/ 142 w 1058"/>
-                <a:gd name="T7" fmla="*/ 887 h 1252"/>
-                <a:gd name="T8" fmla="*/ 110 w 1058"/>
-                <a:gd name="T9" fmla="*/ 831 h 1252"/>
-                <a:gd name="T10" fmla="*/ 0 w 1058"/>
-                <a:gd name="T11" fmla="*/ 529 h 1252"/>
-                <a:gd name="T12" fmla="*/ 529 w 1058"/>
-                <a:gd name="T13" fmla="*/ 0 h 1252"/>
-                <a:gd name="T14" fmla="*/ 1058 w 1058"/>
-                <a:gd name="T15" fmla="*/ 529 h 1252"/>
-                <a:gd name="T16" fmla="*/ 947 w 1058"/>
-                <a:gd name="T17" fmla="*/ 831 h 1252"/>
-                <a:gd name="T18" fmla="*/ 916 w 1058"/>
-                <a:gd name="T19" fmla="*/ 887 h 1252"/>
-                <a:gd name="T20" fmla="*/ 810 w 1058"/>
-                <a:gd name="T21" fmla="*/ 1218 h 1252"/>
-                <a:gd name="T22" fmla="*/ 774 w 1058"/>
-                <a:gd name="T23" fmla="*/ 1252 h 1252"/>
-                <a:gd name="T24" fmla="*/ 315 w 1058"/>
-                <a:gd name="T25" fmla="*/ 1180 h 1252"/>
-                <a:gd name="T26" fmla="*/ 742 w 1058"/>
-                <a:gd name="T27" fmla="*/ 1180 h 1252"/>
-                <a:gd name="T28" fmla="*/ 851 w 1058"/>
-                <a:gd name="T29" fmla="*/ 857 h 1252"/>
-                <a:gd name="T30" fmla="*/ 885 w 1058"/>
-                <a:gd name="T31" fmla="*/ 794 h 1252"/>
-                <a:gd name="T32" fmla="*/ 986 w 1058"/>
-                <a:gd name="T33" fmla="*/ 529 h 1252"/>
-                <a:gd name="T34" fmla="*/ 529 w 1058"/>
-                <a:gd name="T35" fmla="*/ 72 h 1252"/>
-                <a:gd name="T36" fmla="*/ 72 w 1058"/>
-                <a:gd name="T37" fmla="*/ 529 h 1252"/>
-                <a:gd name="T38" fmla="*/ 172 w 1058"/>
-                <a:gd name="T39" fmla="*/ 794 h 1252"/>
-                <a:gd name="T40" fmla="*/ 207 w 1058"/>
-                <a:gd name="T41" fmla="*/ 857 h 1252"/>
-                <a:gd name="T42" fmla="*/ 315 w 1058"/>
-                <a:gd name="T43" fmla="*/ 1180 h 1252"/>
-              </a:gdLst>
-              <a:ahLst/>
-              <a:cxnLst>
-                <a:cxn ang="0">
-                  <a:pos x="T0" y="T1"/>
-                </a:cxn>
-                <a:cxn ang="0">
-                  <a:pos x="T2" y="T3"/>
-                </a:cxn>
-                <a:cxn ang="0">
-                  <a:pos x="T4" y="T5"/>
-                </a:cxn>
-                <a:cxn ang="0">
-                  <a:pos x="T6" y="T7"/>
-                </a:cxn>
-                <a:cxn ang="0">
-                  <a:pos x="T8" y="T9"/>
-                </a:cxn>
-                <a:cxn ang="0">
-                  <a:pos x="T10" y="T11"/>
-                </a:cxn>
-                <a:cxn ang="0">
-                  <a:pos x="T12" y="T13"/>
-                </a:cxn>
-                <a:cxn ang="0">
-                  <a:pos x="T14" y="T15"/>
-                </a:cxn>
-                <a:cxn ang="0">
-                  <a:pos x="T16" y="T17"/>
-                </a:cxn>
-                <a:cxn ang="0">
-                  <a:pos x="T18" y="T19"/>
-                </a:cxn>
-                <a:cxn ang="0">
-                  <a:pos x="T20" y="T21"/>
-                </a:cxn>
-                <a:cxn ang="0">
-                  <a:pos x="T22" y="T23"/>
-                </a:cxn>
-                <a:cxn ang="0">
-                  <a:pos x="T24" y="T25"/>
-                </a:cxn>
-                <a:cxn ang="0">
-                  <a:pos x="T26" y="T27"/>
-                </a:cxn>
-                <a:cxn ang="0">
-                  <a:pos x="T28" y="T29"/>
-                </a:cxn>
-                <a:cxn ang="0">
-                  <a:pos x="T30" y="T31"/>
-                </a:cxn>
-                <a:cxn ang="0">
-                  <a:pos x="T32" y="T33"/>
-                </a:cxn>
-                <a:cxn ang="0">
-                  <a:pos x="T34" y="T35"/>
-                </a:cxn>
-                <a:cxn ang="0">
-                  <a:pos x="T36" y="T37"/>
-                </a:cxn>
-                <a:cxn ang="0">
-                  <a:pos x="T38" y="T39"/>
-                </a:cxn>
-                <a:cxn ang="0">
-                  <a:pos x="T40" y="T41"/>
-                </a:cxn>
-                <a:cxn ang="0">
-                  <a:pos x="T42" y="T43"/>
-                </a:cxn>
-              </a:cxnLst>
-              <a:rect l="0" t="0" r="r" b="b"/>
-              <a:pathLst>
-                <a:path w="1058" h="1252">
-                  <a:moveTo>
-                    <a:pt x="774" y="1252"/>
-                  </a:moveTo>
-                  <a:cubicBezTo>
-                    <a:pt x="283" y="1252"/>
-                    <a:pt x="283" y="1252"/>
-                    <a:pt x="283" y="1252"/>
-                  </a:cubicBezTo>
-                  <a:cubicBezTo>
-                    <a:pt x="264" y="1252"/>
-                    <a:pt x="249" y="1237"/>
-                    <a:pt x="248" y="1218"/>
-                  </a:cubicBezTo>
-                  <a:cubicBezTo>
-                    <a:pt x="247" y="1217"/>
-                    <a:pt x="239" y="1097"/>
-                    <a:pt x="142" y="887"/>
-                  </a:cubicBezTo>
-                  <a:cubicBezTo>
-                    <a:pt x="135" y="873"/>
-                    <a:pt x="123" y="853"/>
-                    <a:pt x="110" y="831"/>
-                  </a:cubicBezTo>
-                  <a:cubicBezTo>
-                    <a:pt x="66" y="755"/>
-                    <a:pt x="0" y="640"/>
-                    <a:pt x="0" y="529"/>
-                  </a:cubicBezTo>
-                  <a:cubicBezTo>
-                    <a:pt x="0" y="238"/>
-                    <a:pt x="237" y="0"/>
-                    <a:pt x="529" y="0"/>
-                  </a:cubicBezTo>
-                  <a:cubicBezTo>
-                    <a:pt x="820" y="0"/>
-                    <a:pt x="1058" y="238"/>
-                    <a:pt x="1058" y="529"/>
-                  </a:cubicBezTo>
-                  <a:cubicBezTo>
-                    <a:pt x="1058" y="640"/>
-                    <a:pt x="991" y="755"/>
-                    <a:pt x="947" y="831"/>
-                  </a:cubicBezTo>
-                  <a:cubicBezTo>
-                    <a:pt x="934" y="853"/>
-                    <a:pt x="923" y="873"/>
-                    <a:pt x="916" y="887"/>
-                  </a:cubicBezTo>
-                  <a:cubicBezTo>
-                    <a:pt x="818" y="1097"/>
-                    <a:pt x="810" y="1217"/>
-                    <a:pt x="810" y="1218"/>
-                  </a:cubicBezTo>
-                  <a:cubicBezTo>
-                    <a:pt x="809" y="1237"/>
-                    <a:pt x="793" y="1252"/>
-                    <a:pt x="774" y="1252"/>
-                  </a:cubicBezTo>
-                  <a:close/>
-                  <a:moveTo>
-                    <a:pt x="315" y="1180"/>
-                  </a:moveTo>
-                  <a:cubicBezTo>
-                    <a:pt x="742" y="1180"/>
-                    <a:pt x="742" y="1180"/>
-                    <a:pt x="742" y="1180"/>
-                  </a:cubicBezTo>
-                  <a:cubicBezTo>
-                    <a:pt x="751" y="1127"/>
-                    <a:pt x="776" y="1017"/>
-                    <a:pt x="851" y="857"/>
-                  </a:cubicBezTo>
-                  <a:cubicBezTo>
-                    <a:pt x="859" y="840"/>
-                    <a:pt x="871" y="819"/>
-                    <a:pt x="885" y="794"/>
-                  </a:cubicBezTo>
-                  <a:cubicBezTo>
-                    <a:pt x="928" y="721"/>
-                    <a:pt x="986" y="621"/>
-                    <a:pt x="986" y="529"/>
-                  </a:cubicBezTo>
-                  <a:cubicBezTo>
-                    <a:pt x="986" y="277"/>
-                    <a:pt x="781" y="72"/>
-                    <a:pt x="529" y="72"/>
-                  </a:cubicBezTo>
-                  <a:cubicBezTo>
-                    <a:pt x="277" y="72"/>
-                    <a:pt x="72" y="277"/>
-                    <a:pt x="72" y="529"/>
-                  </a:cubicBezTo>
-                  <a:cubicBezTo>
-                    <a:pt x="72" y="621"/>
-                    <a:pt x="130" y="721"/>
-                    <a:pt x="172" y="794"/>
-                  </a:cubicBezTo>
-                  <a:cubicBezTo>
-                    <a:pt x="187" y="819"/>
-                    <a:pt x="199" y="840"/>
-                    <a:pt x="207" y="857"/>
-                  </a:cubicBezTo>
-                  <a:cubicBezTo>
-                    <a:pt x="281" y="1017"/>
-                    <a:pt x="307" y="1127"/>
-                    <a:pt x="315" y="1180"/>
-                  </a:cubicBezTo>
-                  <a:close/>
-                </a:path>
-              </a:pathLst>
-            </a:custGeom>
-            <a:grpFill/>
-            <a:ln>
-              <a:noFill/>
-            </a:ln>
-          </p:spPr>
-          <p:txBody>
-            <a:bodyPr vert="horz" wrap="square" lIns="91440" tIns="45720" rIns="91440" bIns="45720" numCol="1" anchor="t" anchorCtr="0" compatLnSpc="1">
-              <a:prstTxWarp prst="textNoShape">
-                <a:avLst/>
-              </a:prstTxWarp>
-            </a:bodyPr>
-            <a:lstStyle/>
-            <a:p>
-              <a:endParaRPr lang="id-ID">
-                <a:solidFill>
-                  <a:schemeClr val="bg1">
-                    <a:lumMod val="50000"/>
-                  </a:schemeClr>
-                </a:solidFill>
-              </a:endParaRPr>
-            </a:p>
-          </p:txBody>
-        </p:sp>
-        <p:sp>
-          <p:nvSpPr>
-            <p:cNvPr id="37" name="Freeform 16">
-              <a:extLst>
-                <a:ext uri="{FF2B5EF4-FFF2-40B4-BE49-F238E27FC236}">
-                  <a16:creationId xmlns:a16="http://schemas.microsoft.com/office/drawing/2014/main" id="{F610144E-4629-4C1C-96D8-414F8D33D78C}"/>
-                </a:ext>
-              </a:extLst>
-            </p:cNvPr>
-            <p:cNvSpPr>
-              <a:spLocks noEditPoints="1"/>
-            </p:cNvSpPr>
-            <p:nvPr/>
-          </p:nvSpPr>
-          <p:spPr bwMode="auto">
-            <a:xfrm>
-              <a:off x="5672983" y="5153763"/>
-              <a:ext cx="1500187" cy="1203325"/>
-            </a:xfrm>
-            <a:custGeom>
-              <a:avLst/>
-              <a:gdLst>
-                <a:gd name="T0" fmla="*/ 495 w 541"/>
-                <a:gd name="T1" fmla="*/ 223 h 434"/>
-                <a:gd name="T2" fmla="*/ 540 w 541"/>
-                <a:gd name="T3" fmla="*/ 168 h 434"/>
-                <a:gd name="T4" fmla="*/ 494 w 541"/>
-                <a:gd name="T5" fmla="*/ 112 h 434"/>
-                <a:gd name="T6" fmla="*/ 540 w 541"/>
-                <a:gd name="T7" fmla="*/ 57 h 434"/>
-                <a:gd name="T8" fmla="*/ 483 w 541"/>
-                <a:gd name="T9" fmla="*/ 0 h 434"/>
-                <a:gd name="T10" fmla="*/ 56 w 541"/>
-                <a:gd name="T11" fmla="*/ 0 h 434"/>
-                <a:gd name="T12" fmla="*/ 0 w 541"/>
-                <a:gd name="T13" fmla="*/ 56 h 434"/>
-                <a:gd name="T14" fmla="*/ 46 w 541"/>
-                <a:gd name="T15" fmla="*/ 112 h 434"/>
-                <a:gd name="T16" fmla="*/ 0 w 541"/>
-                <a:gd name="T17" fmla="*/ 167 h 434"/>
-                <a:gd name="T18" fmla="*/ 46 w 541"/>
-                <a:gd name="T19" fmla="*/ 223 h 434"/>
-                <a:gd name="T20" fmla="*/ 1 w 541"/>
-                <a:gd name="T21" fmla="*/ 278 h 434"/>
-                <a:gd name="T22" fmla="*/ 57 w 541"/>
-                <a:gd name="T23" fmla="*/ 334 h 434"/>
-                <a:gd name="T24" fmla="*/ 157 w 541"/>
-                <a:gd name="T25" fmla="*/ 334 h 434"/>
-                <a:gd name="T26" fmla="*/ 161 w 541"/>
-                <a:gd name="T27" fmla="*/ 351 h 434"/>
-                <a:gd name="T28" fmla="*/ 272 w 541"/>
-                <a:gd name="T29" fmla="*/ 433 h 434"/>
-                <a:gd name="T30" fmla="*/ 383 w 541"/>
-                <a:gd name="T31" fmla="*/ 335 h 434"/>
-                <a:gd name="T32" fmla="*/ 484 w 541"/>
-                <a:gd name="T33" fmla="*/ 335 h 434"/>
-                <a:gd name="T34" fmla="*/ 541 w 541"/>
-                <a:gd name="T35" fmla="*/ 278 h 434"/>
-                <a:gd name="T36" fmla="*/ 495 w 541"/>
-                <a:gd name="T37" fmla="*/ 223 h 434"/>
-                <a:gd name="T38" fmla="*/ 423 w 541"/>
-                <a:gd name="T39" fmla="*/ 241 h 434"/>
-                <a:gd name="T40" fmla="*/ 118 w 541"/>
-                <a:gd name="T41" fmla="*/ 241 h 434"/>
-                <a:gd name="T42" fmla="*/ 104 w 541"/>
-                <a:gd name="T43" fmla="*/ 227 h 434"/>
-                <a:gd name="T44" fmla="*/ 118 w 541"/>
-                <a:gd name="T45" fmla="*/ 213 h 434"/>
-                <a:gd name="T46" fmla="*/ 423 w 541"/>
-                <a:gd name="T47" fmla="*/ 213 h 434"/>
-                <a:gd name="T48" fmla="*/ 437 w 541"/>
-                <a:gd name="T49" fmla="*/ 227 h 434"/>
-                <a:gd name="T50" fmla="*/ 423 w 541"/>
-                <a:gd name="T51" fmla="*/ 241 h 434"/>
-                <a:gd name="T52" fmla="*/ 423 w 541"/>
-                <a:gd name="T53" fmla="*/ 116 h 434"/>
-                <a:gd name="T54" fmla="*/ 118 w 541"/>
-                <a:gd name="T55" fmla="*/ 116 h 434"/>
-                <a:gd name="T56" fmla="*/ 104 w 541"/>
-                <a:gd name="T57" fmla="*/ 102 h 434"/>
-                <a:gd name="T58" fmla="*/ 118 w 541"/>
-                <a:gd name="T59" fmla="*/ 88 h 434"/>
-                <a:gd name="T60" fmla="*/ 423 w 541"/>
-                <a:gd name="T61" fmla="*/ 88 h 434"/>
-                <a:gd name="T62" fmla="*/ 437 w 541"/>
-                <a:gd name="T63" fmla="*/ 102 h 434"/>
-                <a:gd name="T64" fmla="*/ 423 w 541"/>
-                <a:gd name="T65" fmla="*/ 116 h 434"/>
-              </a:gdLst>
-              <a:ahLst/>
-              <a:cxnLst>
-                <a:cxn ang="0">
-                  <a:pos x="T0" y="T1"/>
-                </a:cxn>
-                <a:cxn ang="0">
-                  <a:pos x="T2" y="T3"/>
-                </a:cxn>
-                <a:cxn ang="0">
-                  <a:pos x="T4" y="T5"/>
-                </a:cxn>
-                <a:cxn ang="0">
-                  <a:pos x="T6" y="T7"/>
-                </a:cxn>
-                <a:cxn ang="0">
-                  <a:pos x="T8" y="T9"/>
-                </a:cxn>
-                <a:cxn ang="0">
-                  <a:pos x="T10" y="T11"/>
-                </a:cxn>
-                <a:cxn ang="0">
-                  <a:pos x="T12" y="T13"/>
-                </a:cxn>
-                <a:cxn ang="0">
-                  <a:pos x="T14" y="T15"/>
-                </a:cxn>
-                <a:cxn ang="0">
-                  <a:pos x="T16" y="T17"/>
-                </a:cxn>
-                <a:cxn ang="0">
-                  <a:pos x="T18" y="T19"/>
-                </a:cxn>
-                <a:cxn ang="0">
-                  <a:pos x="T20" y="T21"/>
-                </a:cxn>
-                <a:cxn ang="0">
-                  <a:pos x="T22" y="T23"/>
-                </a:cxn>
-                <a:cxn ang="0">
-                  <a:pos x="T24" y="T25"/>
-                </a:cxn>
-                <a:cxn ang="0">
-                  <a:pos x="T26" y="T27"/>
-                </a:cxn>
-                <a:cxn ang="0">
-                  <a:pos x="T28" y="T29"/>
-                </a:cxn>
-                <a:cxn ang="0">
-                  <a:pos x="T30" y="T31"/>
-                </a:cxn>
-                <a:cxn ang="0">
-                  <a:pos x="T32" y="T33"/>
-                </a:cxn>
-                <a:cxn ang="0">
-                  <a:pos x="T34" y="T35"/>
-                </a:cxn>
-                <a:cxn ang="0">
-                  <a:pos x="T36" y="T37"/>
-                </a:cxn>
-                <a:cxn ang="0">
-                  <a:pos x="T38" y="T39"/>
-                </a:cxn>
-                <a:cxn ang="0">
-                  <a:pos x="T40" y="T41"/>
-                </a:cxn>
-                <a:cxn ang="0">
-                  <a:pos x="T42" y="T43"/>
-                </a:cxn>
-                <a:cxn ang="0">
-                  <a:pos x="T44" y="T45"/>
-                </a:cxn>
-                <a:cxn ang="0">
-                  <a:pos x="T46" y="T47"/>
-                </a:cxn>
-                <a:cxn ang="0">
-                  <a:pos x="T48" y="T49"/>
-                </a:cxn>
-                <a:cxn ang="0">
-                  <a:pos x="T50" y="T51"/>
-                </a:cxn>
-                <a:cxn ang="0">
-                  <a:pos x="T52" y="T53"/>
-                </a:cxn>
-                <a:cxn ang="0">
-                  <a:pos x="T54" y="T55"/>
-                </a:cxn>
-                <a:cxn ang="0">
-                  <a:pos x="T56" y="T57"/>
-                </a:cxn>
-                <a:cxn ang="0">
-                  <a:pos x="T58" y="T59"/>
-                </a:cxn>
-                <a:cxn ang="0">
-                  <a:pos x="T60" y="T61"/>
-                </a:cxn>
-                <a:cxn ang="0">
-                  <a:pos x="T62" y="T63"/>
-                </a:cxn>
-                <a:cxn ang="0">
-                  <a:pos x="T64" y="T65"/>
-                </a:cxn>
-              </a:cxnLst>
-              <a:rect l="0" t="0" r="r" b="b"/>
-              <a:pathLst>
-                <a:path w="541" h="434">
-                  <a:moveTo>
-                    <a:pt x="495" y="223"/>
-                  </a:moveTo>
-                  <a:cubicBezTo>
-                    <a:pt x="521" y="218"/>
-                    <a:pt x="540" y="195"/>
-                    <a:pt x="540" y="168"/>
-                  </a:cubicBezTo>
-                  <a:cubicBezTo>
-                    <a:pt x="540" y="140"/>
-                    <a:pt x="520" y="117"/>
-                    <a:pt x="494" y="112"/>
-                  </a:cubicBezTo>
-                  <a:cubicBezTo>
-                    <a:pt x="520" y="107"/>
-                    <a:pt x="540" y="84"/>
-                    <a:pt x="540" y="57"/>
-                  </a:cubicBezTo>
-                  <a:cubicBezTo>
-                    <a:pt x="540" y="26"/>
-                    <a:pt x="514" y="0"/>
-                    <a:pt x="483" y="0"/>
-                  </a:cubicBezTo>
-                  <a:cubicBezTo>
-                    <a:pt x="56" y="0"/>
-                    <a:pt x="56" y="0"/>
-                    <a:pt x="56" y="0"/>
-                  </a:cubicBezTo>
-                  <a:cubicBezTo>
-                    <a:pt x="25" y="0"/>
-                    <a:pt x="0" y="25"/>
-                    <a:pt x="0" y="56"/>
-                  </a:cubicBezTo>
-                  <a:cubicBezTo>
-                    <a:pt x="0" y="84"/>
-                    <a:pt x="20" y="107"/>
-                    <a:pt x="46" y="112"/>
-                  </a:cubicBezTo>
-                  <a:cubicBezTo>
-                    <a:pt x="20" y="117"/>
-                    <a:pt x="0" y="140"/>
-                    <a:pt x="0" y="167"/>
-                  </a:cubicBezTo>
-                  <a:cubicBezTo>
-                    <a:pt x="0" y="195"/>
-                    <a:pt x="20" y="218"/>
-                    <a:pt x="46" y="223"/>
-                  </a:cubicBezTo>
-                  <a:cubicBezTo>
-                    <a:pt x="20" y="228"/>
-                    <a:pt x="1" y="250"/>
-                    <a:pt x="1" y="278"/>
-                  </a:cubicBezTo>
-                  <a:cubicBezTo>
-                    <a:pt x="1" y="309"/>
-                    <a:pt x="26" y="334"/>
-                    <a:pt x="57" y="334"/>
-                  </a:cubicBezTo>
-                  <a:cubicBezTo>
-                    <a:pt x="157" y="334"/>
-                    <a:pt x="157" y="334"/>
-                    <a:pt x="157" y="334"/>
-                  </a:cubicBezTo>
-                  <a:cubicBezTo>
-                    <a:pt x="158" y="340"/>
-                    <a:pt x="159" y="345"/>
-                    <a:pt x="161" y="351"/>
-                  </a:cubicBezTo>
-                  <a:cubicBezTo>
-                    <a:pt x="175" y="399"/>
-                    <a:pt x="219" y="434"/>
-                    <a:pt x="272" y="433"/>
-                  </a:cubicBezTo>
-                  <a:cubicBezTo>
-                    <a:pt x="331" y="433"/>
-                    <a:pt x="380" y="392"/>
-                    <a:pt x="383" y="335"/>
-                  </a:cubicBezTo>
-                  <a:cubicBezTo>
-                    <a:pt x="484" y="335"/>
-                    <a:pt x="484" y="335"/>
-                    <a:pt x="484" y="335"/>
-                  </a:cubicBezTo>
-                  <a:cubicBezTo>
-                    <a:pt x="515" y="335"/>
-                    <a:pt x="541" y="309"/>
-                    <a:pt x="541" y="278"/>
-                  </a:cubicBezTo>
-                  <a:cubicBezTo>
-                    <a:pt x="541" y="251"/>
-                    <a:pt x="521" y="228"/>
-                    <a:pt x="495" y="223"/>
-                  </a:cubicBezTo>
-                  <a:close/>
-                  <a:moveTo>
-                    <a:pt x="423" y="241"/>
-                  </a:moveTo>
-                  <a:cubicBezTo>
-                    <a:pt x="118" y="241"/>
-                    <a:pt x="118" y="241"/>
-                    <a:pt x="118" y="241"/>
-                  </a:cubicBezTo>
-                  <a:cubicBezTo>
-                    <a:pt x="110" y="241"/>
-                    <a:pt x="104" y="234"/>
-                    <a:pt x="104" y="227"/>
-                  </a:cubicBezTo>
-                  <a:cubicBezTo>
-                    <a:pt x="104" y="219"/>
-                    <a:pt x="110" y="213"/>
-                    <a:pt x="118" y="213"/>
-                  </a:cubicBezTo>
-                  <a:cubicBezTo>
-                    <a:pt x="423" y="213"/>
-                    <a:pt x="423" y="213"/>
-                    <a:pt x="423" y="213"/>
-                  </a:cubicBezTo>
-                  <a:cubicBezTo>
-                    <a:pt x="431" y="213"/>
-                    <a:pt x="437" y="219"/>
-                    <a:pt x="437" y="227"/>
-                  </a:cubicBezTo>
-                  <a:cubicBezTo>
-                    <a:pt x="437" y="234"/>
-                    <a:pt x="431" y="241"/>
-                    <a:pt x="423" y="241"/>
-                  </a:cubicBezTo>
-                  <a:close/>
-                  <a:moveTo>
-                    <a:pt x="423" y="116"/>
-                  </a:moveTo>
-                  <a:cubicBezTo>
-                    <a:pt x="118" y="116"/>
-                    <a:pt x="118" y="116"/>
-                    <a:pt x="118" y="116"/>
-                  </a:cubicBezTo>
-                  <a:cubicBezTo>
-                    <a:pt x="110" y="116"/>
-                    <a:pt x="104" y="110"/>
-                    <a:pt x="104" y="102"/>
-                  </a:cubicBezTo>
-                  <a:cubicBezTo>
-                    <a:pt x="104" y="95"/>
-                    <a:pt x="110" y="88"/>
-                    <a:pt x="118" y="88"/>
-                  </a:cubicBezTo>
-                  <a:cubicBezTo>
-                    <a:pt x="423" y="88"/>
-                    <a:pt x="423" y="88"/>
-                    <a:pt x="423" y="88"/>
-                  </a:cubicBezTo>
-                  <a:cubicBezTo>
-                    <a:pt x="431" y="88"/>
-                    <a:pt x="437" y="95"/>
-                    <a:pt x="437" y="102"/>
-                  </a:cubicBezTo>
-                  <a:cubicBezTo>
-                    <a:pt x="437" y="110"/>
-                    <a:pt x="431" y="116"/>
-                    <a:pt x="423" y="116"/>
-                  </a:cubicBezTo>
-                  <a:close/>
-                </a:path>
-              </a:pathLst>
-            </a:custGeom>
-            <a:grpFill/>
-            <a:ln>
-              <a:noFill/>
-            </a:ln>
-          </p:spPr>
-          <p:txBody>
-            <a:bodyPr vert="horz" wrap="square" lIns="91440" tIns="45720" rIns="91440" bIns="45720" numCol="1" anchor="t" anchorCtr="0" compatLnSpc="1">
-              <a:prstTxWarp prst="textNoShape">
-                <a:avLst/>
-              </a:prstTxWarp>
-            </a:bodyPr>
-            <a:lstStyle/>
-            <a:p>
-              <a:endParaRPr lang="id-ID">
-                <a:solidFill>
-                  <a:schemeClr val="bg1">
-                    <a:lumMod val="50000"/>
-                  </a:schemeClr>
-                </a:solidFill>
-              </a:endParaRPr>
-            </a:p>
-          </p:txBody>
-        </p:sp>
-      </p:grpSp>
-      <p:grpSp>
-        <p:nvGrpSpPr>
-          <p:cNvPr id="38" name="Group 87">
-            <a:extLst>
-              <a:ext uri="{FF2B5EF4-FFF2-40B4-BE49-F238E27FC236}">
-                <a16:creationId xmlns:a16="http://schemas.microsoft.com/office/drawing/2014/main" id="{44285946-D463-49C5-B255-1F7BA3674B63}"/>
-              </a:ext>
-            </a:extLst>
-          </p:cNvPr>
-          <p:cNvGrpSpPr/>
-          <p:nvPr/>
-        </p:nvGrpSpPr>
-        <p:grpSpPr>
-          <a:xfrm>
-            <a:off x="7718056" y="1639125"/>
-            <a:ext cx="1815974" cy="1625805"/>
-            <a:chOff x="8169276" y="952501"/>
-            <a:chExt cx="3781424" cy="3384550"/>
-          </a:xfrm>
-          <a:solidFill>
-            <a:schemeClr val="accent1"/>
-          </a:solidFill>
-        </p:grpSpPr>
-        <p:sp>
-          <p:nvSpPr>
-            <p:cNvPr id="39" name="Freeform 10">
-              <a:extLst>
-                <a:ext uri="{FF2B5EF4-FFF2-40B4-BE49-F238E27FC236}">
-                  <a16:creationId xmlns:a16="http://schemas.microsoft.com/office/drawing/2014/main" id="{E2157A7C-BFCF-42C2-976D-BF9ACF54665C}"/>
-                </a:ext>
-              </a:extLst>
-            </p:cNvPr>
-            <p:cNvSpPr>
-              <a:spLocks/>
-            </p:cNvSpPr>
-            <p:nvPr/>
-          </p:nvSpPr>
-          <p:spPr bwMode="auto">
-            <a:xfrm>
-              <a:off x="9297988" y="1533526"/>
-              <a:ext cx="1392237" cy="1004888"/>
-            </a:xfrm>
-            <a:custGeom>
-              <a:avLst/>
-              <a:gdLst>
-                <a:gd name="T0" fmla="*/ 142 w 370"/>
-                <a:gd name="T1" fmla="*/ 228 h 267"/>
-                <a:gd name="T2" fmla="*/ 241 w 370"/>
-                <a:gd name="T3" fmla="*/ 248 h 267"/>
-                <a:gd name="T4" fmla="*/ 303 w 370"/>
-                <a:gd name="T5" fmla="*/ 226 h 267"/>
-                <a:gd name="T6" fmla="*/ 368 w 370"/>
-                <a:gd name="T7" fmla="*/ 107 h 267"/>
-                <a:gd name="T8" fmla="*/ 278 w 370"/>
-                <a:gd name="T9" fmla="*/ 11 h 267"/>
-                <a:gd name="T10" fmla="*/ 179 w 370"/>
-                <a:gd name="T11" fmla="*/ 58 h 267"/>
-                <a:gd name="T12" fmla="*/ 168 w 370"/>
-                <a:gd name="T13" fmla="*/ 65 h 267"/>
-                <a:gd name="T14" fmla="*/ 155 w 370"/>
-                <a:gd name="T15" fmla="*/ 60 h 267"/>
-                <a:gd name="T16" fmla="*/ 67 w 370"/>
-                <a:gd name="T17" fmla="*/ 47 h 267"/>
-                <a:gd name="T18" fmla="*/ 0 w 370"/>
-                <a:gd name="T19" fmla="*/ 116 h 267"/>
-                <a:gd name="T20" fmla="*/ 9 w 370"/>
-                <a:gd name="T21" fmla="*/ 121 h 267"/>
-                <a:gd name="T22" fmla="*/ 84 w 370"/>
-                <a:gd name="T23" fmla="*/ 267 h 267"/>
-                <a:gd name="T24" fmla="*/ 142 w 370"/>
-                <a:gd name="T25" fmla="*/ 228 h 267"/>
-              </a:gdLst>
-              <a:ahLst/>
-              <a:cxnLst>
-                <a:cxn ang="0">
-                  <a:pos x="T0" y="T1"/>
-                </a:cxn>
-                <a:cxn ang="0">
-                  <a:pos x="T2" y="T3"/>
-                </a:cxn>
-                <a:cxn ang="0">
-                  <a:pos x="T4" y="T5"/>
-                </a:cxn>
-                <a:cxn ang="0">
-                  <a:pos x="T6" y="T7"/>
-                </a:cxn>
-                <a:cxn ang="0">
-                  <a:pos x="T8" y="T9"/>
-                </a:cxn>
-                <a:cxn ang="0">
-                  <a:pos x="T10" y="T11"/>
-                </a:cxn>
-                <a:cxn ang="0">
-                  <a:pos x="T12" y="T13"/>
-                </a:cxn>
-                <a:cxn ang="0">
-                  <a:pos x="T14" y="T15"/>
-                </a:cxn>
-                <a:cxn ang="0">
-                  <a:pos x="T16" y="T17"/>
-                </a:cxn>
-                <a:cxn ang="0">
-                  <a:pos x="T18" y="T19"/>
-                </a:cxn>
-                <a:cxn ang="0">
-                  <a:pos x="T20" y="T21"/>
-                </a:cxn>
-                <a:cxn ang="0">
-                  <a:pos x="T22" y="T23"/>
-                </a:cxn>
-                <a:cxn ang="0">
-                  <a:pos x="T24" y="T25"/>
-                </a:cxn>
-              </a:cxnLst>
-              <a:rect l="0" t="0" r="r" b="b"/>
-              <a:pathLst>
-                <a:path w="370" h="267">
-                  <a:moveTo>
-                    <a:pt x="142" y="228"/>
-                  </a:moveTo>
-                  <a:cubicBezTo>
-                    <a:pt x="189" y="219"/>
-                    <a:pt x="225" y="237"/>
-                    <a:pt x="241" y="248"/>
-                  </a:cubicBezTo>
-                  <a:cubicBezTo>
-                    <a:pt x="253" y="241"/>
-                    <a:pt x="275" y="230"/>
-                    <a:pt x="303" y="226"/>
-                  </a:cubicBezTo>
-                  <a:cubicBezTo>
-                    <a:pt x="304" y="191"/>
-                    <a:pt x="319" y="134"/>
-                    <a:pt x="368" y="107"/>
-                  </a:cubicBezTo>
-                  <a:cubicBezTo>
-                    <a:pt x="370" y="82"/>
-                    <a:pt x="350" y="22"/>
-                    <a:pt x="278" y="11"/>
-                  </a:cubicBezTo>
-                  <a:cubicBezTo>
-                    <a:pt x="211" y="0"/>
-                    <a:pt x="181" y="56"/>
-                    <a:pt x="179" y="58"/>
-                  </a:cubicBezTo>
-                  <a:cubicBezTo>
-                    <a:pt x="177" y="62"/>
-                    <a:pt x="173" y="65"/>
-                    <a:pt x="168" y="65"/>
-                  </a:cubicBezTo>
-                  <a:cubicBezTo>
-                    <a:pt x="163" y="66"/>
-                    <a:pt x="158" y="64"/>
-                    <a:pt x="155" y="60"/>
-                  </a:cubicBezTo>
-                  <a:cubicBezTo>
-                    <a:pt x="155" y="59"/>
-                    <a:pt x="133" y="32"/>
-                    <a:pt x="67" y="47"/>
-                  </a:cubicBezTo>
-                  <a:cubicBezTo>
-                    <a:pt x="14" y="60"/>
-                    <a:pt x="2" y="101"/>
-                    <a:pt x="0" y="116"/>
-                  </a:cubicBezTo>
-                  <a:cubicBezTo>
-                    <a:pt x="3" y="117"/>
-                    <a:pt x="6" y="119"/>
-                    <a:pt x="9" y="121"/>
-                  </a:cubicBezTo>
-                  <a:cubicBezTo>
-                    <a:pt x="63" y="161"/>
-                    <a:pt x="80" y="224"/>
-                    <a:pt x="84" y="267"/>
-                  </a:cubicBezTo>
-                  <a:cubicBezTo>
-                    <a:pt x="96" y="250"/>
-                    <a:pt x="114" y="234"/>
-                    <a:pt x="142" y="228"/>
-                  </a:cubicBezTo>
-                  <a:close/>
-                </a:path>
-              </a:pathLst>
-            </a:custGeom>
-            <a:grpFill/>
-            <a:ln>
-              <a:noFill/>
-            </a:ln>
-            <a:extLst>
-              <a:ext uri="{91240B29-F687-4f45-9708-019B960494DF}">
-                <a14:hiddenLine xmlns="" xmlns:a14="http://schemas.microsoft.com/office/drawing/2010/main" w="9525">
-                  <a:solidFill>
-                    <a:srgbClr val="000000"/>
-                  </a:solidFill>
-                  <a:round/>
-                  <a:headEnd/>
-                  <a:tailEnd/>
-                </a14:hiddenLine>
-              </a:ext>
-            </a:extLst>
-          </p:spPr>
-          <p:txBody>
-            <a:bodyPr vert="horz" wrap="square" lIns="91440" tIns="45720" rIns="91440" bIns="45720" numCol="1" anchor="t" anchorCtr="0" compatLnSpc="1">
-              <a:prstTxWarp prst="textNoShape">
-                <a:avLst/>
-              </a:prstTxWarp>
-            </a:bodyPr>
-            <a:lstStyle/>
-            <a:p>
-              <a:endParaRPr lang="id-ID"/>
-            </a:p>
-          </p:txBody>
-        </p:sp>
-        <p:sp>
-          <p:nvSpPr>
-            <p:cNvPr id="40" name="Freeform 11">
-              <a:extLst>
-                <a:ext uri="{FF2B5EF4-FFF2-40B4-BE49-F238E27FC236}">
-                  <a16:creationId xmlns:a16="http://schemas.microsoft.com/office/drawing/2014/main" id="{183BDCFD-24C6-43F4-BD11-2AF7D81CBED3}"/>
-                </a:ext>
-              </a:extLst>
-            </p:cNvPr>
-            <p:cNvSpPr>
-              <a:spLocks/>
-            </p:cNvSpPr>
-            <p:nvPr/>
-          </p:nvSpPr>
-          <p:spPr bwMode="auto">
-            <a:xfrm>
-              <a:off x="8169276" y="952501"/>
-              <a:ext cx="3781424" cy="3384550"/>
-            </a:xfrm>
-            <a:custGeom>
-              <a:avLst/>
-              <a:gdLst>
-                <a:gd name="T0" fmla="*/ 932 w 1005"/>
-                <a:gd name="T1" fmla="*/ 313 h 899"/>
-                <a:gd name="T2" fmla="*/ 693 w 1005"/>
-                <a:gd name="T3" fmla="*/ 126 h 899"/>
-                <a:gd name="T4" fmla="*/ 192 w 1005"/>
-                <a:gd name="T5" fmla="*/ 181 h 899"/>
-                <a:gd name="T6" fmla="*/ 261 w 1005"/>
-                <a:gd name="T7" fmla="*/ 549 h 899"/>
-                <a:gd name="T8" fmla="*/ 292 w 1005"/>
-                <a:gd name="T9" fmla="*/ 298 h 899"/>
-                <a:gd name="T10" fmla="*/ 155 w 1005"/>
-                <a:gd name="T11" fmla="*/ 377 h 899"/>
-                <a:gd name="T12" fmla="*/ 244 w 1005"/>
-                <a:gd name="T13" fmla="*/ 409 h 899"/>
-                <a:gd name="T14" fmla="*/ 255 w 1005"/>
-                <a:gd name="T15" fmla="*/ 435 h 899"/>
-                <a:gd name="T16" fmla="*/ 128 w 1005"/>
-                <a:gd name="T17" fmla="*/ 388 h 899"/>
-                <a:gd name="T18" fmla="*/ 274 w 1005"/>
-                <a:gd name="T19" fmla="*/ 257 h 899"/>
-                <a:gd name="T20" fmla="*/ 464 w 1005"/>
-                <a:gd name="T21" fmla="*/ 184 h 899"/>
-                <a:gd name="T22" fmla="*/ 673 w 1005"/>
-                <a:gd name="T23" fmla="*/ 190 h 899"/>
-                <a:gd name="T24" fmla="*/ 851 w 1005"/>
-                <a:gd name="T25" fmla="*/ 291 h 899"/>
-                <a:gd name="T26" fmla="*/ 914 w 1005"/>
-                <a:gd name="T27" fmla="*/ 518 h 899"/>
-                <a:gd name="T28" fmla="*/ 747 w 1005"/>
-                <a:gd name="T29" fmla="*/ 572 h 899"/>
-                <a:gd name="T30" fmla="*/ 474 w 1005"/>
-                <a:gd name="T31" fmla="*/ 615 h 899"/>
-                <a:gd name="T32" fmla="*/ 421 w 1005"/>
-                <a:gd name="T33" fmla="*/ 572 h 899"/>
-                <a:gd name="T34" fmla="*/ 446 w 1005"/>
-                <a:gd name="T35" fmla="*/ 560 h 899"/>
-                <a:gd name="T36" fmla="*/ 553 w 1005"/>
-                <a:gd name="T37" fmla="*/ 547 h 899"/>
-                <a:gd name="T38" fmla="*/ 854 w 1005"/>
-                <a:gd name="T39" fmla="*/ 560 h 899"/>
-                <a:gd name="T40" fmla="*/ 857 w 1005"/>
-                <a:gd name="T41" fmla="*/ 427 h 899"/>
-                <a:gd name="T42" fmla="*/ 831 w 1005"/>
-                <a:gd name="T43" fmla="*/ 311 h 899"/>
-                <a:gd name="T44" fmla="*/ 632 w 1005"/>
-                <a:gd name="T45" fmla="*/ 378 h 899"/>
-                <a:gd name="T46" fmla="*/ 742 w 1005"/>
-                <a:gd name="T47" fmla="*/ 461 h 899"/>
-                <a:gd name="T48" fmla="*/ 549 w 1005"/>
-                <a:gd name="T49" fmla="*/ 430 h 899"/>
-                <a:gd name="T50" fmla="*/ 447 w 1005"/>
-                <a:gd name="T51" fmla="*/ 410 h 899"/>
-                <a:gd name="T52" fmla="*/ 381 w 1005"/>
-                <a:gd name="T53" fmla="*/ 488 h 899"/>
-                <a:gd name="T54" fmla="*/ 300 w 1005"/>
-                <a:gd name="T55" fmla="*/ 535 h 899"/>
-                <a:gd name="T56" fmla="*/ 298 w 1005"/>
-                <a:gd name="T57" fmla="*/ 538 h 899"/>
-                <a:gd name="T58" fmla="*/ 274 w 1005"/>
-                <a:gd name="T59" fmla="*/ 618 h 899"/>
-                <a:gd name="T60" fmla="*/ 288 w 1005"/>
-                <a:gd name="T61" fmla="*/ 665 h 899"/>
-                <a:gd name="T62" fmla="*/ 352 w 1005"/>
-                <a:gd name="T63" fmla="*/ 724 h 899"/>
-                <a:gd name="T64" fmla="*/ 571 w 1005"/>
-                <a:gd name="T65" fmla="*/ 769 h 899"/>
-                <a:gd name="T66" fmla="*/ 570 w 1005"/>
-                <a:gd name="T67" fmla="*/ 769 h 899"/>
-                <a:gd name="T68" fmla="*/ 681 w 1005"/>
-                <a:gd name="T69" fmla="*/ 675 h 899"/>
-                <a:gd name="T70" fmla="*/ 650 w 1005"/>
-                <a:gd name="T71" fmla="*/ 634 h 899"/>
-                <a:gd name="T72" fmla="*/ 708 w 1005"/>
-                <a:gd name="T73" fmla="*/ 665 h 899"/>
-                <a:gd name="T74" fmla="*/ 691 w 1005"/>
-                <a:gd name="T75" fmla="*/ 750 h 899"/>
-                <a:gd name="T76" fmla="*/ 491 w 1005"/>
-                <a:gd name="T77" fmla="*/ 785 h 899"/>
-                <a:gd name="T78" fmla="*/ 787 w 1005"/>
-                <a:gd name="T79" fmla="*/ 830 h 899"/>
-                <a:gd name="T80" fmla="*/ 1001 w 1005"/>
-                <a:gd name="T81" fmla="*/ 474 h 899"/>
-              </a:gdLst>
-              <a:ahLst/>
-              <a:cxnLst>
-                <a:cxn ang="0">
-                  <a:pos x="T0" y="T1"/>
-                </a:cxn>
-                <a:cxn ang="0">
-                  <a:pos x="T2" y="T3"/>
-                </a:cxn>
-                <a:cxn ang="0">
-                  <a:pos x="T4" y="T5"/>
-                </a:cxn>
-                <a:cxn ang="0">
-                  <a:pos x="T6" y="T7"/>
-                </a:cxn>
-                <a:cxn ang="0">
-                  <a:pos x="T8" y="T9"/>
-                </a:cxn>
-                <a:cxn ang="0">
-                  <a:pos x="T10" y="T11"/>
-                </a:cxn>
-                <a:cxn ang="0">
-                  <a:pos x="T12" y="T13"/>
-                </a:cxn>
-                <a:cxn ang="0">
-                  <a:pos x="T14" y="T15"/>
-                </a:cxn>
-                <a:cxn ang="0">
-                  <a:pos x="T16" y="T17"/>
-                </a:cxn>
-                <a:cxn ang="0">
-                  <a:pos x="T18" y="T19"/>
-                </a:cxn>
-                <a:cxn ang="0">
-                  <a:pos x="T20" y="T21"/>
-                </a:cxn>
-                <a:cxn ang="0">
-                  <a:pos x="T22" y="T23"/>
-                </a:cxn>
-                <a:cxn ang="0">
-                  <a:pos x="T24" y="T25"/>
-                </a:cxn>
-                <a:cxn ang="0">
-                  <a:pos x="T26" y="T27"/>
-                </a:cxn>
-                <a:cxn ang="0">
-                  <a:pos x="T28" y="T29"/>
-                </a:cxn>
-                <a:cxn ang="0">
-                  <a:pos x="T30" y="T31"/>
-                </a:cxn>
-                <a:cxn ang="0">
-                  <a:pos x="T32" y="T33"/>
-                </a:cxn>
-                <a:cxn ang="0">
-                  <a:pos x="T34" y="T35"/>
-                </a:cxn>
-                <a:cxn ang="0">
-                  <a:pos x="T36" y="T37"/>
-                </a:cxn>
-                <a:cxn ang="0">
-                  <a:pos x="T38" y="T39"/>
-                </a:cxn>
-                <a:cxn ang="0">
-                  <a:pos x="T40" y="T41"/>
-                </a:cxn>
-                <a:cxn ang="0">
-                  <a:pos x="T42" y="T43"/>
-                </a:cxn>
-                <a:cxn ang="0">
-                  <a:pos x="T44" y="T45"/>
-                </a:cxn>
-                <a:cxn ang="0">
-                  <a:pos x="T46" y="T47"/>
-                </a:cxn>
-                <a:cxn ang="0">
-                  <a:pos x="T48" y="T49"/>
-                </a:cxn>
-                <a:cxn ang="0">
-                  <a:pos x="T50" y="T51"/>
-                </a:cxn>
-                <a:cxn ang="0">
-                  <a:pos x="T52" y="T53"/>
-                </a:cxn>
-                <a:cxn ang="0">
-                  <a:pos x="T54" y="T55"/>
-                </a:cxn>
-                <a:cxn ang="0">
-                  <a:pos x="T56" y="T57"/>
-                </a:cxn>
-                <a:cxn ang="0">
-                  <a:pos x="T58" y="T59"/>
-                </a:cxn>
-                <a:cxn ang="0">
-                  <a:pos x="T60" y="T61"/>
-                </a:cxn>
-                <a:cxn ang="0">
-                  <a:pos x="T62" y="T63"/>
-                </a:cxn>
-                <a:cxn ang="0">
-                  <a:pos x="T64" y="T65"/>
-                </a:cxn>
-                <a:cxn ang="0">
-                  <a:pos x="T66" y="T67"/>
-                </a:cxn>
-                <a:cxn ang="0">
-                  <a:pos x="T68" y="T69"/>
-                </a:cxn>
-                <a:cxn ang="0">
-                  <a:pos x="T70" y="T71"/>
-                </a:cxn>
-                <a:cxn ang="0">
-                  <a:pos x="T72" y="T73"/>
-                </a:cxn>
-                <a:cxn ang="0">
-                  <a:pos x="T74" y="T75"/>
-                </a:cxn>
-                <a:cxn ang="0">
-                  <a:pos x="T76" y="T77"/>
-                </a:cxn>
-                <a:cxn ang="0">
-                  <a:pos x="T78" y="T79"/>
-                </a:cxn>
-                <a:cxn ang="0">
-                  <a:pos x="T80" y="T81"/>
-                </a:cxn>
-              </a:cxnLst>
-              <a:rect l="0" t="0" r="r" b="b"/>
-              <a:pathLst>
-                <a:path w="1005" h="899">
-                  <a:moveTo>
-                    <a:pt x="1001" y="474"/>
-                  </a:moveTo>
-                  <a:cubicBezTo>
-                    <a:pt x="997" y="357"/>
-                    <a:pt x="932" y="313"/>
-                    <a:pt x="932" y="313"/>
-                  </a:cubicBezTo>
-                  <a:cubicBezTo>
-                    <a:pt x="932" y="313"/>
-                    <a:pt x="924" y="257"/>
-                    <a:pt x="873" y="197"/>
-                  </a:cubicBezTo>
-                  <a:cubicBezTo>
-                    <a:pt x="794" y="111"/>
-                    <a:pt x="693" y="126"/>
-                    <a:pt x="693" y="126"/>
-                  </a:cubicBezTo>
-                  <a:cubicBezTo>
-                    <a:pt x="563" y="0"/>
-                    <a:pt x="430" y="97"/>
-                    <a:pt x="430" y="97"/>
-                  </a:cubicBezTo>
-                  <a:cubicBezTo>
-                    <a:pt x="245" y="36"/>
-                    <a:pt x="192" y="181"/>
-                    <a:pt x="192" y="181"/>
-                  </a:cubicBezTo>
-                  <a:cubicBezTo>
-                    <a:pt x="86" y="193"/>
-                    <a:pt x="0" y="317"/>
-                    <a:pt x="77" y="450"/>
-                  </a:cubicBezTo>
-                  <a:cubicBezTo>
-                    <a:pt x="136" y="552"/>
-                    <a:pt x="224" y="554"/>
-                    <a:pt x="261" y="549"/>
-                  </a:cubicBezTo>
-                  <a:cubicBezTo>
-                    <a:pt x="274" y="517"/>
-                    <a:pt x="300" y="481"/>
-                    <a:pt x="357" y="465"/>
-                  </a:cubicBezTo>
-                  <a:cubicBezTo>
-                    <a:pt x="358" y="459"/>
-                    <a:pt x="365" y="350"/>
-                    <a:pt x="292" y="298"/>
-                  </a:cubicBezTo>
-                  <a:cubicBezTo>
-                    <a:pt x="249" y="267"/>
-                    <a:pt x="201" y="275"/>
-                    <a:pt x="174" y="295"/>
-                  </a:cubicBezTo>
-                  <a:cubicBezTo>
-                    <a:pt x="149" y="315"/>
-                    <a:pt x="142" y="345"/>
-                    <a:pt x="155" y="377"/>
-                  </a:cubicBezTo>
-                  <a:cubicBezTo>
-                    <a:pt x="161" y="394"/>
-                    <a:pt x="171" y="405"/>
-                    <a:pt x="185" y="411"/>
-                  </a:cubicBezTo>
-                  <a:cubicBezTo>
-                    <a:pt x="212" y="422"/>
-                    <a:pt x="243" y="409"/>
-                    <a:pt x="244" y="409"/>
-                  </a:cubicBezTo>
-                  <a:cubicBezTo>
-                    <a:pt x="251" y="406"/>
-                    <a:pt x="259" y="410"/>
-                    <a:pt x="262" y="417"/>
-                  </a:cubicBezTo>
-                  <a:cubicBezTo>
-                    <a:pt x="265" y="424"/>
-                    <a:pt x="262" y="432"/>
-                    <a:pt x="255" y="435"/>
-                  </a:cubicBezTo>
-                  <a:cubicBezTo>
-                    <a:pt x="253" y="436"/>
-                    <a:pt x="212" y="453"/>
-                    <a:pt x="174" y="437"/>
-                  </a:cubicBezTo>
-                  <a:cubicBezTo>
-                    <a:pt x="154" y="429"/>
-                    <a:pt x="138" y="412"/>
-                    <a:pt x="128" y="388"/>
-                  </a:cubicBezTo>
-                  <a:cubicBezTo>
-                    <a:pt x="111" y="343"/>
-                    <a:pt x="122" y="300"/>
-                    <a:pt x="157" y="273"/>
-                  </a:cubicBezTo>
-                  <a:cubicBezTo>
-                    <a:pt x="189" y="248"/>
-                    <a:pt x="234" y="243"/>
-                    <a:pt x="274" y="257"/>
-                  </a:cubicBezTo>
-                  <a:cubicBezTo>
-                    <a:pt x="281" y="227"/>
-                    <a:pt x="304" y="187"/>
-                    <a:pt x="361" y="174"/>
-                  </a:cubicBezTo>
-                  <a:cubicBezTo>
-                    <a:pt x="415" y="161"/>
-                    <a:pt x="447" y="173"/>
-                    <a:pt x="464" y="184"/>
-                  </a:cubicBezTo>
-                  <a:cubicBezTo>
-                    <a:pt x="484" y="158"/>
-                    <a:pt x="524" y="127"/>
-                    <a:pt x="582" y="137"/>
-                  </a:cubicBezTo>
-                  <a:cubicBezTo>
-                    <a:pt x="631" y="145"/>
-                    <a:pt x="658" y="170"/>
-                    <a:pt x="673" y="190"/>
-                  </a:cubicBezTo>
-                  <a:cubicBezTo>
-                    <a:pt x="686" y="208"/>
-                    <a:pt x="694" y="230"/>
-                    <a:pt x="696" y="250"/>
-                  </a:cubicBezTo>
-                  <a:cubicBezTo>
-                    <a:pt x="751" y="237"/>
-                    <a:pt x="814" y="253"/>
-                    <a:pt x="851" y="291"/>
-                  </a:cubicBezTo>
-                  <a:cubicBezTo>
-                    <a:pt x="881" y="322"/>
-                    <a:pt x="892" y="365"/>
-                    <a:pt x="881" y="411"/>
-                  </a:cubicBezTo>
-                  <a:cubicBezTo>
-                    <a:pt x="895" y="424"/>
-                    <a:pt x="922" y="459"/>
-                    <a:pt x="914" y="518"/>
-                  </a:cubicBezTo>
-                  <a:cubicBezTo>
-                    <a:pt x="910" y="549"/>
-                    <a:pt x="893" y="573"/>
-                    <a:pt x="866" y="586"/>
-                  </a:cubicBezTo>
-                  <a:cubicBezTo>
-                    <a:pt x="831" y="602"/>
-                    <a:pt x="785" y="596"/>
-                    <a:pt x="747" y="572"/>
-                  </a:cubicBezTo>
-                  <a:cubicBezTo>
-                    <a:pt x="693" y="538"/>
-                    <a:pt x="609" y="536"/>
-                    <a:pt x="571" y="568"/>
-                  </a:cubicBezTo>
-                  <a:cubicBezTo>
-                    <a:pt x="541" y="593"/>
-                    <a:pt x="507" y="618"/>
-                    <a:pt x="474" y="615"/>
-                  </a:cubicBezTo>
-                  <a:cubicBezTo>
-                    <a:pt x="472" y="615"/>
-                    <a:pt x="469" y="615"/>
-                    <a:pt x="466" y="614"/>
-                  </a:cubicBezTo>
-                  <a:cubicBezTo>
-                    <a:pt x="447" y="610"/>
-                    <a:pt x="432" y="596"/>
-                    <a:pt x="421" y="572"/>
-                  </a:cubicBezTo>
-                  <a:cubicBezTo>
-                    <a:pt x="417" y="565"/>
-                    <a:pt x="420" y="557"/>
-                    <a:pt x="427" y="554"/>
-                  </a:cubicBezTo>
-                  <a:cubicBezTo>
-                    <a:pt x="434" y="550"/>
-                    <a:pt x="443" y="553"/>
-                    <a:pt x="446" y="560"/>
-                  </a:cubicBezTo>
-                  <a:cubicBezTo>
-                    <a:pt x="453" y="576"/>
-                    <a:pt x="462" y="584"/>
-                    <a:pt x="473" y="586"/>
-                  </a:cubicBezTo>
-                  <a:cubicBezTo>
-                    <a:pt x="496" y="592"/>
-                    <a:pt x="530" y="566"/>
-                    <a:pt x="553" y="547"/>
-                  </a:cubicBezTo>
-                  <a:cubicBezTo>
-                    <a:pt x="601" y="506"/>
-                    <a:pt x="697" y="507"/>
-                    <a:pt x="762" y="548"/>
-                  </a:cubicBezTo>
-                  <a:cubicBezTo>
-                    <a:pt x="792" y="567"/>
-                    <a:pt x="828" y="572"/>
-                    <a:pt x="854" y="560"/>
-                  </a:cubicBezTo>
-                  <a:cubicBezTo>
-                    <a:pt x="872" y="552"/>
-                    <a:pt x="883" y="536"/>
-                    <a:pt x="886" y="514"/>
-                  </a:cubicBezTo>
-                  <a:cubicBezTo>
-                    <a:pt x="895" y="455"/>
-                    <a:pt x="858" y="427"/>
-                    <a:pt x="857" y="427"/>
-                  </a:cubicBezTo>
-                  <a:cubicBezTo>
-                    <a:pt x="852" y="424"/>
-                    <a:pt x="850" y="418"/>
-                    <a:pt x="852" y="412"/>
-                  </a:cubicBezTo>
-                  <a:cubicBezTo>
-                    <a:pt x="863" y="372"/>
-                    <a:pt x="856" y="337"/>
-                    <a:pt x="831" y="311"/>
-                  </a:cubicBezTo>
-                  <a:cubicBezTo>
-                    <a:pt x="800" y="280"/>
-                    <a:pt x="747" y="266"/>
-                    <a:pt x="702" y="278"/>
-                  </a:cubicBezTo>
-                  <a:cubicBezTo>
-                    <a:pt x="642" y="293"/>
-                    <a:pt x="633" y="357"/>
-                    <a:pt x="632" y="378"/>
-                  </a:cubicBezTo>
-                  <a:cubicBezTo>
-                    <a:pt x="667" y="380"/>
-                    <a:pt x="707" y="396"/>
-                    <a:pt x="744" y="441"/>
-                  </a:cubicBezTo>
-                  <a:cubicBezTo>
-                    <a:pt x="749" y="447"/>
-                    <a:pt x="748" y="456"/>
-                    <a:pt x="742" y="461"/>
-                  </a:cubicBezTo>
-                  <a:cubicBezTo>
-                    <a:pt x="736" y="466"/>
-                    <a:pt x="727" y="465"/>
-                    <a:pt x="722" y="459"/>
-                  </a:cubicBezTo>
-                  <a:cubicBezTo>
-                    <a:pt x="643" y="362"/>
-                    <a:pt x="552" y="428"/>
-                    <a:pt x="549" y="430"/>
-                  </a:cubicBezTo>
-                  <a:cubicBezTo>
-                    <a:pt x="543" y="434"/>
-                    <a:pt x="536" y="434"/>
-                    <a:pt x="531" y="430"/>
-                  </a:cubicBezTo>
-                  <a:cubicBezTo>
-                    <a:pt x="529" y="429"/>
-                    <a:pt x="496" y="400"/>
-                    <a:pt x="447" y="410"/>
-                  </a:cubicBezTo>
-                  <a:cubicBezTo>
-                    <a:pt x="401" y="419"/>
-                    <a:pt x="393" y="476"/>
-                    <a:pt x="393" y="476"/>
-                  </a:cubicBezTo>
-                  <a:cubicBezTo>
-                    <a:pt x="392" y="482"/>
-                    <a:pt x="387" y="487"/>
-                    <a:pt x="381" y="488"/>
-                  </a:cubicBezTo>
-                  <a:cubicBezTo>
-                    <a:pt x="339" y="496"/>
-                    <a:pt x="315" y="514"/>
-                    <a:pt x="300" y="535"/>
-                  </a:cubicBezTo>
-                  <a:cubicBezTo>
-                    <a:pt x="300" y="535"/>
-                    <a:pt x="300" y="535"/>
-                    <a:pt x="300" y="535"/>
-                  </a:cubicBezTo>
-                  <a:cubicBezTo>
-                    <a:pt x="300" y="535"/>
-                    <a:pt x="300" y="535"/>
-                    <a:pt x="300" y="535"/>
-                  </a:cubicBezTo>
-                  <a:cubicBezTo>
-                    <a:pt x="299" y="536"/>
-                    <a:pt x="299" y="537"/>
-                    <a:pt x="298" y="538"/>
-                  </a:cubicBezTo>
-                  <a:cubicBezTo>
-                    <a:pt x="278" y="568"/>
-                    <a:pt x="273" y="596"/>
-                    <a:pt x="275" y="618"/>
-                  </a:cubicBezTo>
-                  <a:cubicBezTo>
-                    <a:pt x="275" y="618"/>
-                    <a:pt x="274" y="618"/>
-                    <a:pt x="274" y="618"/>
-                  </a:cubicBezTo>
-                  <a:cubicBezTo>
-                    <a:pt x="275" y="625"/>
-                    <a:pt x="276" y="631"/>
-                    <a:pt x="278" y="637"/>
-                  </a:cubicBezTo>
-                  <a:cubicBezTo>
-                    <a:pt x="281" y="654"/>
-                    <a:pt x="288" y="664"/>
-                    <a:pt x="288" y="665"/>
-                  </a:cubicBezTo>
-                  <a:cubicBezTo>
-                    <a:pt x="302" y="693"/>
-                    <a:pt x="326" y="711"/>
-                    <a:pt x="352" y="724"/>
-                  </a:cubicBezTo>
-                  <a:cubicBezTo>
-                    <a:pt x="352" y="724"/>
-                    <a:pt x="352" y="724"/>
-                    <a:pt x="352" y="724"/>
-                  </a:cubicBezTo>
-                  <a:cubicBezTo>
-                    <a:pt x="352" y="724"/>
-                    <a:pt x="418" y="758"/>
-                    <a:pt x="552" y="768"/>
-                  </a:cubicBezTo>
-                  <a:cubicBezTo>
-                    <a:pt x="558" y="768"/>
-                    <a:pt x="565" y="769"/>
-                    <a:pt x="571" y="769"/>
-                  </a:cubicBezTo>
-                  <a:cubicBezTo>
-                    <a:pt x="571" y="769"/>
-                    <a:pt x="570" y="769"/>
-                    <a:pt x="570" y="769"/>
-                  </a:cubicBezTo>
-                  <a:cubicBezTo>
-                    <a:pt x="570" y="769"/>
-                    <a:pt x="570" y="769"/>
-                    <a:pt x="570" y="769"/>
-                  </a:cubicBezTo>
-                  <a:cubicBezTo>
-                    <a:pt x="606" y="770"/>
-                    <a:pt x="643" y="762"/>
-                    <a:pt x="668" y="733"/>
-                  </a:cubicBezTo>
-                  <a:cubicBezTo>
-                    <a:pt x="682" y="710"/>
-                    <a:pt x="687" y="689"/>
-                    <a:pt x="681" y="675"/>
-                  </a:cubicBezTo>
-                  <a:cubicBezTo>
-                    <a:pt x="675" y="658"/>
-                    <a:pt x="659" y="652"/>
-                    <a:pt x="659" y="652"/>
-                  </a:cubicBezTo>
-                  <a:cubicBezTo>
-                    <a:pt x="651" y="649"/>
-                    <a:pt x="648" y="641"/>
-                    <a:pt x="650" y="634"/>
-                  </a:cubicBezTo>
-                  <a:cubicBezTo>
-                    <a:pt x="653" y="627"/>
-                    <a:pt x="661" y="623"/>
-                    <a:pt x="668" y="625"/>
-                  </a:cubicBezTo>
-                  <a:cubicBezTo>
-                    <a:pt x="669" y="626"/>
-                    <a:pt x="698" y="636"/>
-                    <a:pt x="708" y="665"/>
-                  </a:cubicBezTo>
-                  <a:cubicBezTo>
-                    <a:pt x="717" y="689"/>
-                    <a:pt x="711" y="717"/>
-                    <a:pt x="692" y="749"/>
-                  </a:cubicBezTo>
-                  <a:cubicBezTo>
-                    <a:pt x="691" y="749"/>
-                    <a:pt x="691" y="750"/>
-                    <a:pt x="691" y="750"/>
-                  </a:cubicBezTo>
-                  <a:cubicBezTo>
-                    <a:pt x="655" y="793"/>
-                    <a:pt x="601" y="800"/>
-                    <a:pt x="556" y="797"/>
-                  </a:cubicBezTo>
-                  <a:cubicBezTo>
-                    <a:pt x="530" y="795"/>
-                    <a:pt x="507" y="789"/>
-                    <a:pt x="491" y="785"/>
-                  </a:cubicBezTo>
-                  <a:cubicBezTo>
-                    <a:pt x="524" y="857"/>
-                    <a:pt x="598" y="891"/>
-                    <a:pt x="677" y="895"/>
-                  </a:cubicBezTo>
-                  <a:cubicBezTo>
-                    <a:pt x="769" y="899"/>
-                    <a:pt x="787" y="830"/>
-                    <a:pt x="787" y="830"/>
-                  </a:cubicBezTo>
-                  <a:cubicBezTo>
-                    <a:pt x="911" y="781"/>
-                    <a:pt x="884" y="656"/>
-                    <a:pt x="884" y="656"/>
-                  </a:cubicBezTo>
-                  <a:cubicBezTo>
-                    <a:pt x="936" y="648"/>
-                    <a:pt x="1005" y="590"/>
-                    <a:pt x="1001" y="474"/>
-                  </a:cubicBezTo>
-                  <a:close/>
-                </a:path>
-              </a:pathLst>
-            </a:custGeom>
-            <a:grpFill/>
-            <a:ln>
-              <a:noFill/>
-            </a:ln>
-            <a:extLst>
-              <a:ext uri="{91240B29-F687-4f45-9708-019B960494DF}">
-                <a14:hiddenLine xmlns="" xmlns:a14="http://schemas.microsoft.com/office/drawing/2010/main" w="9525">
-                  <a:solidFill>
-                    <a:srgbClr val="000000"/>
-                  </a:solidFill>
-                  <a:round/>
-                  <a:headEnd/>
-                  <a:tailEnd/>
-                </a14:hiddenLine>
-              </a:ext>
-            </a:extLst>
-          </p:spPr>
-          <p:txBody>
-            <a:bodyPr vert="horz" wrap="square" lIns="91440" tIns="45720" rIns="91440" bIns="45720" numCol="1" anchor="t" anchorCtr="0" compatLnSpc="1">
-              <a:prstTxWarp prst="textNoShape">
-                <a:avLst/>
-              </a:prstTxWarp>
-            </a:bodyPr>
-            <a:lstStyle/>
-            <a:p>
-              <a:endParaRPr lang="id-ID"/>
-            </a:p>
-          </p:txBody>
-        </p:sp>
-      </p:grpSp>
-      <p:grpSp>
-        <p:nvGrpSpPr>
-          <p:cNvPr id="41" name="Group 90">
-            <a:extLst>
-              <a:ext uri="{FF2B5EF4-FFF2-40B4-BE49-F238E27FC236}">
-                <a16:creationId xmlns:a16="http://schemas.microsoft.com/office/drawing/2014/main" id="{0D20E1D1-76C3-437B-BF00-B6B5EEEF1CD3}"/>
-              </a:ext>
-            </a:extLst>
-          </p:cNvPr>
-          <p:cNvGrpSpPr/>
-          <p:nvPr/>
-        </p:nvGrpSpPr>
-        <p:grpSpPr>
-          <a:xfrm>
-            <a:off x="7840191" y="2349396"/>
-            <a:ext cx="1182904" cy="1404967"/>
-            <a:chOff x="7826363" y="2844010"/>
-            <a:chExt cx="1580725" cy="1876982"/>
-          </a:xfrm>
-          <a:solidFill>
-            <a:schemeClr val="accent1"/>
-          </a:solidFill>
-        </p:grpSpPr>
-        <p:sp>
-          <p:nvSpPr>
-            <p:cNvPr id="42" name="Rounded Rectangle 91">
-              <a:extLst>
-                <a:ext uri="{FF2B5EF4-FFF2-40B4-BE49-F238E27FC236}">
-                  <a16:creationId xmlns:a16="http://schemas.microsoft.com/office/drawing/2014/main" id="{482F6A79-0330-4589-B9F2-04822587D3E5}"/>
-                </a:ext>
-              </a:extLst>
-            </p:cNvPr>
-            <p:cNvSpPr/>
-            <p:nvPr/>
-          </p:nvSpPr>
-          <p:spPr>
-            <a:xfrm>
-              <a:off x="8110354" y="2984172"/>
-              <a:ext cx="101591" cy="790450"/>
-            </a:xfrm>
-            <a:prstGeom prst="roundRect">
-              <a:avLst>
-                <a:gd name="adj" fmla="val 50000"/>
-              </a:avLst>
-            </a:prstGeom>
-            <a:grpFill/>
-            <a:ln>
-              <a:noFill/>
-            </a:ln>
-          </p:spPr>
-          <p:style>
-            <a:lnRef idx="2">
-              <a:schemeClr val="accent1">
-                <a:shade val="50000"/>
-              </a:schemeClr>
-            </a:lnRef>
-            <a:fillRef idx="1">
-              <a:schemeClr val="accent1"/>
-            </a:fillRef>
-            <a:effectRef idx="0">
-              <a:schemeClr val="accent1"/>
-            </a:effectRef>
-            <a:fontRef idx="minor">
-              <a:schemeClr val="lt1"/>
-            </a:fontRef>
-          </p:style>
-          <p:txBody>
-            <a:bodyPr rtlCol="0" anchor="ctr"/>
-            <a:lstStyle/>
-            <a:p>
-              <a:pPr algn="ctr"/>
-              <a:endParaRPr lang="id-ID"/>
-            </a:p>
-          </p:txBody>
-        </p:sp>
-        <p:sp>
-          <p:nvSpPr>
-            <p:cNvPr id="43" name="Rounded Rectangle 92">
-              <a:extLst>
-                <a:ext uri="{FF2B5EF4-FFF2-40B4-BE49-F238E27FC236}">
-                  <a16:creationId xmlns:a16="http://schemas.microsoft.com/office/drawing/2014/main" id="{E8675697-1A17-4EE7-A305-82236B377EF6}"/>
-                </a:ext>
-              </a:extLst>
-            </p:cNvPr>
-            <p:cNvSpPr/>
-            <p:nvPr/>
-          </p:nvSpPr>
-          <p:spPr>
-            <a:xfrm>
-              <a:off x="8375528" y="3216877"/>
-              <a:ext cx="101591" cy="1504115"/>
-            </a:xfrm>
-            <a:prstGeom prst="roundRect">
-              <a:avLst>
-                <a:gd name="adj" fmla="val 50000"/>
-              </a:avLst>
-            </a:prstGeom>
-            <a:grpFill/>
-            <a:ln>
-              <a:noFill/>
-            </a:ln>
-          </p:spPr>
-          <p:style>
-            <a:lnRef idx="2">
-              <a:schemeClr val="accent1">
-                <a:shade val="50000"/>
-              </a:schemeClr>
-            </a:lnRef>
-            <a:fillRef idx="1">
-              <a:schemeClr val="accent1"/>
-            </a:fillRef>
-            <a:effectRef idx="0">
-              <a:schemeClr val="accent1"/>
-            </a:effectRef>
-            <a:fontRef idx="minor">
-              <a:schemeClr val="lt1"/>
-            </a:fontRef>
-          </p:style>
-          <p:txBody>
-            <a:bodyPr rtlCol="0" anchor="ctr"/>
-            <a:lstStyle/>
-            <a:p>
-              <a:pPr algn="ctr"/>
-              <a:endParaRPr lang="id-ID"/>
-            </a:p>
-          </p:txBody>
-        </p:sp>
-        <p:sp>
-          <p:nvSpPr>
-            <p:cNvPr id="44" name="Rounded Rectangle 93">
-              <a:extLst>
-                <a:ext uri="{FF2B5EF4-FFF2-40B4-BE49-F238E27FC236}">
-                  <a16:creationId xmlns:a16="http://schemas.microsoft.com/office/drawing/2014/main" id="{391367F9-2E8E-4437-BF04-A034E1B45B53}"/>
-                </a:ext>
-              </a:extLst>
-            </p:cNvPr>
-            <p:cNvSpPr/>
-            <p:nvPr/>
-          </p:nvSpPr>
-          <p:spPr>
-            <a:xfrm>
-              <a:off x="8672942" y="3502859"/>
-              <a:ext cx="101591" cy="1218133"/>
-            </a:xfrm>
-            <a:prstGeom prst="roundRect">
-              <a:avLst>
-                <a:gd name="adj" fmla="val 50000"/>
-              </a:avLst>
-            </a:prstGeom>
-            <a:grpFill/>
-            <a:ln>
-              <a:noFill/>
-            </a:ln>
-          </p:spPr>
-          <p:style>
-            <a:lnRef idx="2">
-              <a:schemeClr val="accent1">
-                <a:shade val="50000"/>
-              </a:schemeClr>
-            </a:lnRef>
-            <a:fillRef idx="1">
-              <a:schemeClr val="accent1"/>
-            </a:fillRef>
-            <a:effectRef idx="0">
-              <a:schemeClr val="accent1"/>
-            </a:effectRef>
-            <a:fontRef idx="minor">
-              <a:schemeClr val="lt1"/>
-            </a:fontRef>
-          </p:style>
-          <p:txBody>
-            <a:bodyPr rtlCol="0" anchor="ctr"/>
-            <a:lstStyle/>
-            <a:p>
-              <a:pPr algn="ctr"/>
-              <a:endParaRPr lang="id-ID"/>
-            </a:p>
-          </p:txBody>
-        </p:sp>
-        <p:sp>
-          <p:nvSpPr>
-            <p:cNvPr id="45" name="Rounded Rectangle 94">
-              <a:extLst>
-                <a:ext uri="{FF2B5EF4-FFF2-40B4-BE49-F238E27FC236}">
-                  <a16:creationId xmlns:a16="http://schemas.microsoft.com/office/drawing/2014/main" id="{E6531787-ADB6-4C04-B7F1-C376B67CD30D}"/>
-                </a:ext>
-              </a:extLst>
-            </p:cNvPr>
-            <p:cNvSpPr/>
-            <p:nvPr/>
-          </p:nvSpPr>
-          <p:spPr>
-            <a:xfrm>
-              <a:off x="9007728" y="3844758"/>
-              <a:ext cx="101591" cy="876234"/>
-            </a:xfrm>
-            <a:prstGeom prst="roundRect">
-              <a:avLst>
-                <a:gd name="adj" fmla="val 50000"/>
-              </a:avLst>
-            </a:prstGeom>
-            <a:grpFill/>
-            <a:ln>
-              <a:noFill/>
-            </a:ln>
-          </p:spPr>
-          <p:style>
-            <a:lnRef idx="2">
-              <a:schemeClr val="accent1">
-                <a:shade val="50000"/>
-              </a:schemeClr>
-            </a:lnRef>
-            <a:fillRef idx="1">
-              <a:schemeClr val="accent1"/>
-            </a:fillRef>
-            <a:effectRef idx="0">
-              <a:schemeClr val="accent1"/>
-            </a:effectRef>
-            <a:fontRef idx="minor">
-              <a:schemeClr val="lt1"/>
-            </a:fontRef>
-          </p:style>
-          <p:txBody>
-            <a:bodyPr rtlCol="0" anchor="ctr"/>
-            <a:lstStyle/>
-            <a:p>
-              <a:pPr algn="ctr"/>
-              <a:endParaRPr lang="id-ID"/>
-            </a:p>
-          </p:txBody>
-        </p:sp>
-        <p:sp>
-          <p:nvSpPr>
-            <p:cNvPr id="46" name="Rounded Rectangle 95">
-              <a:extLst>
-                <a:ext uri="{FF2B5EF4-FFF2-40B4-BE49-F238E27FC236}">
-                  <a16:creationId xmlns:a16="http://schemas.microsoft.com/office/drawing/2014/main" id="{4E8D7BF5-9047-4177-B8EA-A52C8C000B97}"/>
-                </a:ext>
-              </a:extLst>
-            </p:cNvPr>
-            <p:cNvSpPr/>
-            <p:nvPr/>
-          </p:nvSpPr>
-          <p:spPr>
-            <a:xfrm>
-              <a:off x="9305497" y="3844758"/>
-              <a:ext cx="101591" cy="876234"/>
-            </a:xfrm>
-            <a:prstGeom prst="roundRect">
-              <a:avLst>
-                <a:gd name="adj" fmla="val 50000"/>
-              </a:avLst>
-            </a:prstGeom>
-            <a:grpFill/>
-            <a:ln>
-              <a:noFill/>
-            </a:ln>
-          </p:spPr>
-          <p:style>
-            <a:lnRef idx="2">
-              <a:schemeClr val="accent1">
-                <a:shade val="50000"/>
-              </a:schemeClr>
-            </a:lnRef>
-            <a:fillRef idx="1">
-              <a:schemeClr val="accent1"/>
-            </a:fillRef>
-            <a:effectRef idx="0">
-              <a:schemeClr val="accent1"/>
-            </a:effectRef>
-            <a:fontRef idx="minor">
-              <a:schemeClr val="lt1"/>
-            </a:fontRef>
-          </p:style>
-          <p:txBody>
-            <a:bodyPr rtlCol="0" anchor="ctr"/>
-            <a:lstStyle/>
-            <a:p>
-              <a:pPr algn="ctr"/>
-              <a:endParaRPr lang="id-ID"/>
-            </a:p>
-          </p:txBody>
-        </p:sp>
-        <p:sp>
-          <p:nvSpPr>
-            <p:cNvPr id="47" name="Rounded Rectangle 96">
-              <a:extLst>
-                <a:ext uri="{FF2B5EF4-FFF2-40B4-BE49-F238E27FC236}">
-                  <a16:creationId xmlns:a16="http://schemas.microsoft.com/office/drawing/2014/main" id="{E6F12B41-E055-4367-AA11-23A1D6E70CAD}"/>
-                </a:ext>
-              </a:extLst>
-            </p:cNvPr>
-            <p:cNvSpPr/>
-            <p:nvPr/>
-          </p:nvSpPr>
-          <p:spPr>
-            <a:xfrm>
-              <a:off x="7826363" y="2844010"/>
-              <a:ext cx="101591" cy="658850"/>
-            </a:xfrm>
-            <a:prstGeom prst="roundRect">
-              <a:avLst>
-                <a:gd name="adj" fmla="val 50000"/>
-              </a:avLst>
-            </a:prstGeom>
-            <a:grpFill/>
-            <a:ln>
-              <a:noFill/>
-            </a:ln>
-          </p:spPr>
-          <p:style>
-            <a:lnRef idx="2">
-              <a:schemeClr val="accent1">
-                <a:shade val="50000"/>
-              </a:schemeClr>
-            </a:lnRef>
-            <a:fillRef idx="1">
-              <a:schemeClr val="accent1"/>
-            </a:fillRef>
-            <a:effectRef idx="0">
-              <a:schemeClr val="accent1"/>
-            </a:effectRef>
-            <a:fontRef idx="minor">
-              <a:schemeClr val="lt1"/>
-            </a:fontRef>
-          </p:style>
-          <p:txBody>
-            <a:bodyPr rtlCol="0" anchor="ctr"/>
-            <a:lstStyle/>
-            <a:p>
-              <a:pPr algn="ctr"/>
-              <a:endParaRPr lang="id-ID"/>
-            </a:p>
-          </p:txBody>
-        </p:sp>
-      </p:grpSp>
-      <p:sp>
-        <p:nvSpPr>
-          <p:cNvPr id="27" name="Textfeld 26">
-            <a:extLst>
-              <a:ext uri="{FF2B5EF4-FFF2-40B4-BE49-F238E27FC236}">
-                <a16:creationId xmlns:a16="http://schemas.microsoft.com/office/drawing/2014/main" id="{F7F2AB95-F58D-4E03-85A2-70F1CD65A874}"/>
-              </a:ext>
-            </a:extLst>
-          </p:cNvPr>
-          <p:cNvSpPr txBox="1"/>
-          <p:nvPr/>
-        </p:nvSpPr>
+        </p:nvPicPr>
+        <p:blipFill>
+          <a:blip r:embed="rId2"/>
+          <a:stretch>
+            <a:fillRect/>
+          </a:stretch>
+        </p:blipFill>
         <p:spPr>
           <a:xfrm>
-            <a:off x="2370753" y="2133759"/>
-            <a:ext cx="4600564" cy="2585323"/>
+            <a:off x="3884328" y="1690688"/>
+            <a:ext cx="4423344" cy="3971982"/>
           </a:xfrm>
           <a:prstGeom prst="rect">
             <a:avLst/>
           </a:prstGeom>
-          <a:noFill/>
         </p:spPr>
-        <p:txBody>
-          <a:bodyPr wrap="square" rtlCol="0">
-            <a:spAutoFit/>
-          </a:bodyPr>
-          <a:lstStyle/>
-          <a:p>
-            <a:pPr marL="285750" indent="-285750">
-              <a:buFont typeface="Arial" panose="020B0604020202020204" pitchFamily="34" charset="0"/>
-              <a:buChar char="•"/>
-            </a:pPr>
-            <a:r>
-              <a:rPr lang="de-DE" sz="2400" dirty="0">
-                <a:solidFill>
-                  <a:schemeClr val="bg1"/>
-                </a:solidFill>
-                <a:latin typeface="Lorenza" panose="02000500000000000000" pitchFamily="2" charset="0"/>
-              </a:rPr>
-              <a:t>Neuer robuster Aufbau</a:t>
-            </a:r>
-          </a:p>
-          <a:p>
-            <a:endParaRPr lang="de-DE" sz="2400" dirty="0">
-              <a:solidFill>
-                <a:schemeClr val="bg1"/>
-              </a:solidFill>
-              <a:latin typeface="Lorenza" panose="02000500000000000000" pitchFamily="2" charset="0"/>
-            </a:endParaRPr>
-          </a:p>
-          <a:p>
-            <a:pPr marL="285750" indent="-285750">
-              <a:buFont typeface="Arial" panose="020B0604020202020204" pitchFamily="34" charset="0"/>
-              <a:buChar char="•"/>
-            </a:pPr>
-            <a:r>
-              <a:rPr lang="de-DE" sz="2400" dirty="0">
-                <a:solidFill>
-                  <a:schemeClr val="bg1"/>
-                </a:solidFill>
-                <a:latin typeface="Lorenza" panose="02000500000000000000" pitchFamily="2" charset="0"/>
-              </a:rPr>
-              <a:t>Individuelle Projekte strukturiert zusammenfassen</a:t>
-            </a:r>
-          </a:p>
-          <a:p>
-            <a:pPr marL="285750" indent="-285750">
-              <a:buFont typeface="Arial" panose="020B0604020202020204" pitchFamily="34" charset="0"/>
-              <a:buChar char="•"/>
-            </a:pPr>
-            <a:endParaRPr lang="de-DE" sz="2400" dirty="0">
-              <a:solidFill>
-                <a:schemeClr val="bg1"/>
-              </a:solidFill>
-              <a:latin typeface="Lorenza" panose="02000500000000000000" pitchFamily="2" charset="0"/>
-            </a:endParaRPr>
-          </a:p>
-          <a:p>
-            <a:pPr marL="285750" indent="-285750">
-              <a:buFont typeface="Arial" panose="020B0604020202020204" pitchFamily="34" charset="0"/>
-              <a:buChar char="•"/>
-            </a:pPr>
-            <a:r>
-              <a:rPr lang="de-DE" sz="2400" dirty="0">
-                <a:solidFill>
-                  <a:schemeClr val="bg1"/>
-                </a:solidFill>
-                <a:latin typeface="Lorenza" panose="02000500000000000000" pitchFamily="2" charset="0"/>
-              </a:rPr>
-              <a:t>Modularität</a:t>
-            </a:r>
-          </a:p>
-          <a:p>
-            <a:endParaRPr lang="de-DE" dirty="0">
-              <a:latin typeface="Lorenza" panose="02000500000000000000" pitchFamily="2" charset="0"/>
-            </a:endParaRPr>
-          </a:p>
-        </p:txBody>
-      </p:sp>
+      </p:pic>
     </p:spTree>
     <p:extLst>
       <p:ext uri="{BB962C8B-B14F-4D97-AF65-F5344CB8AC3E}">
-        <p14:creationId xmlns:p14="http://schemas.microsoft.com/office/powerpoint/2010/main" val="941408796"/>
+        <p14:creationId xmlns:p14="http://schemas.microsoft.com/office/powerpoint/2010/main" val="2511690528"/>
       </p:ext>
     </p:extLst>
   </p:cSld>
@@ -18035,43 +18371,40 @@
           <a:chExt cx="0" cy="0"/>
         </a:xfrm>
       </p:grpSpPr>
-      <p:graphicFrame>
-        <p:nvGraphicFramePr>
-          <p:cNvPr id="5" name="Inhaltsplatzhalter 4">
+      <p:sp>
+        <p:nvSpPr>
+          <p:cNvPr id="7" name="Titel 6">
             <a:extLst>
               <a:ext uri="{FF2B5EF4-FFF2-40B4-BE49-F238E27FC236}">
-                <a16:creationId xmlns:a16="http://schemas.microsoft.com/office/drawing/2014/main" id="{2CFD0B0F-02AD-4A94-BE6D-26BB6679D6B7}"/>
+                <a16:creationId xmlns:a16="http://schemas.microsoft.com/office/drawing/2014/main" id="{4CC51961-35A4-486A-8412-5241BB4E29E0}"/>
               </a:ext>
             </a:extLst>
           </p:cNvPr>
-          <p:cNvGraphicFramePr>
-            <a:graphicFrameLocks noGrp="1"/>
-          </p:cNvGraphicFramePr>
+          <p:cNvSpPr>
+            <a:spLocks noGrp="1"/>
+          </p:cNvSpPr>
           <p:nvPr>
-            <p:ph idx="1"/>
-            <p:extLst>
-              <p:ext uri="{D42A27DB-BD31-4B8C-83A1-F6EECF244321}">
-                <p14:modId xmlns:p14="http://schemas.microsoft.com/office/powerpoint/2010/main" val="2048702457"/>
-              </p:ext>
-            </p:extLst>
+            <p:ph type="title"/>
           </p:nvPr>
-        </p:nvGraphicFramePr>
-        <p:xfrm>
-          <a:off x="419100" y="1228575"/>
-          <a:ext cx="11353800" cy="4400849"/>
-        </p:xfrm>
-        <a:graphic>
-          <a:graphicData uri="http://schemas.openxmlformats.org/drawingml/2006/diagram">
-            <dgm:relIds xmlns:dgm="http://schemas.openxmlformats.org/drawingml/2006/diagram" xmlns:r="http://schemas.openxmlformats.org/officeDocument/2006/relationships" r:dm="rId2" r:lo="rId3" r:qs="rId4" r:cs="rId5"/>
-          </a:graphicData>
-        </a:graphic>
-      </p:graphicFrame>
+        </p:nvSpPr>
+        <p:spPr/>
+        <p:txBody>
+          <a:bodyPr/>
+          <a:lstStyle/>
+          <a:p>
+            <a:r>
+              <a:rPr lang="de-DE" dirty="0"/>
+              <a:t>Senden und Empfangen</a:t>
+            </a:r>
+          </a:p>
+        </p:txBody>
+      </p:sp>
       <p:sp>
         <p:nvSpPr>
           <p:cNvPr id="4" name="Foliennummernplatzhalter 3">
             <a:extLst>
               <a:ext uri="{FF2B5EF4-FFF2-40B4-BE49-F238E27FC236}">
-                <a16:creationId xmlns:a16="http://schemas.microsoft.com/office/drawing/2014/main" id="{65A32C60-A8CB-469F-BEB4-7439947CF1BE}"/>
+                <a16:creationId xmlns:a16="http://schemas.microsoft.com/office/drawing/2014/main" id="{5A7489DB-B7BF-4005-97A7-2E400F3EE6BF}"/>
               </a:ext>
             </a:extLst>
           </p:cNvPr>
@@ -18095,10 +18428,40 @@
           </a:p>
         </p:txBody>
       </p:sp>
+      <p:pic>
+        <p:nvPicPr>
+          <p:cNvPr id="3" name="Grafik 2">
+            <a:extLst>
+              <a:ext uri="{FF2B5EF4-FFF2-40B4-BE49-F238E27FC236}">
+                <a16:creationId xmlns:a16="http://schemas.microsoft.com/office/drawing/2014/main" id="{BDA84A2D-9D23-41FB-887E-6C180F455EA7}"/>
+              </a:ext>
+            </a:extLst>
+          </p:cNvPr>
+          <p:cNvPicPr>
+            <a:picLocks noChangeAspect="1"/>
+          </p:cNvPicPr>
+          <p:nvPr/>
+        </p:nvPicPr>
+        <p:blipFill>
+          <a:blip r:embed="rId2"/>
+          <a:stretch>
+            <a:fillRect/>
+          </a:stretch>
+        </p:blipFill>
+        <p:spPr>
+          <a:xfrm>
+            <a:off x="3148843" y="2034768"/>
+            <a:ext cx="5894314" cy="2788464"/>
+          </a:xfrm>
+          <a:prstGeom prst="rect">
+            <a:avLst/>
+          </a:prstGeom>
+        </p:spPr>
+      </p:pic>
     </p:spTree>
     <p:extLst>
       <p:ext uri="{BB962C8B-B14F-4D97-AF65-F5344CB8AC3E}">
-        <p14:creationId xmlns:p14="http://schemas.microsoft.com/office/powerpoint/2010/main" val="1664322626"/>
+        <p14:creationId xmlns:p14="http://schemas.microsoft.com/office/powerpoint/2010/main" val="2241593612"/>
       </p:ext>
     </p:extLst>
   </p:cSld>
@@ -18863,18 +19226,18 @@
 </file>
 
 <file path=customXml/item2.xml><?xml version="1.0" encoding="utf-8"?>
+<p:properties xmlns:p="http://schemas.microsoft.com/office/2006/metadata/properties" xmlns:xsi="http://www.w3.org/2001/XMLSchema-instance" xmlns:pc="http://schemas.microsoft.com/office/infopath/2007/PartnerControls">
+  <documentManagement/>
+</p:properties>
+</file>
+
+<file path=customXml/item3.xml><?xml version="1.0" encoding="utf-8"?>
 <?mso-contentType ?>
 <FormTemplates xmlns="http://schemas.microsoft.com/sharepoint/v3/contenttype/forms">
   <Display>DocumentLibraryForm</Display>
   <Edit>DocumentLibraryForm</Edit>
   <New>DocumentLibraryForm</New>
 </FormTemplates>
-</file>
-
-<file path=customXml/item3.xml><?xml version="1.0" encoding="utf-8"?>
-<p:properties xmlns:p="http://schemas.microsoft.com/office/2006/metadata/properties" xmlns:xsi="http://www.w3.org/2001/XMLSchema-instance" xmlns:pc="http://schemas.microsoft.com/office/infopath/2007/PartnerControls">
-  <documentManagement/>
-</p:properties>
 </file>
 
 <file path=customXml/itemProps1.xml><?xml version="1.0" encoding="utf-8"?>
@@ -18896,18 +19259,18 @@
 </file>
 
 <file path=customXml/itemProps2.xml><?xml version="1.0" encoding="utf-8"?>
-<ds:datastoreItem xmlns:ds="http://schemas.openxmlformats.org/officeDocument/2006/customXml" ds:itemID="{52DFAA76-DA7C-42FE-9ACB-07F6B47CA830}">
-  <ds:schemaRefs>
-    <ds:schemaRef ds:uri="http://schemas.microsoft.com/sharepoint/v3/contenttype/forms"/>
-  </ds:schemaRefs>
-</ds:datastoreItem>
-</file>
-
-<file path=customXml/itemProps3.xml><?xml version="1.0" encoding="utf-8"?>
 <ds:datastoreItem xmlns:ds="http://schemas.openxmlformats.org/officeDocument/2006/customXml" ds:itemID="{9C1C98E1-7FB5-4D9F-AB84-81399E3AA813}">
   <ds:schemaRefs>
     <ds:schemaRef ds:uri="http://schemas.microsoft.com/office/2006/metadata/properties"/>
     <ds:schemaRef ds:uri="http://schemas.microsoft.com/office/infopath/2007/PartnerControls"/>
   </ds:schemaRefs>
 </ds:datastoreItem>
+</file>
+
+<file path=customXml/itemProps3.xml><?xml version="1.0" encoding="utf-8"?>
+<ds:datastoreItem xmlns:ds="http://schemas.openxmlformats.org/officeDocument/2006/customXml" ds:itemID="{52DFAA76-DA7C-42FE-9ACB-07F6B47CA830}">
+  <ds:schemaRefs>
+    <ds:schemaRef ds:uri="http://schemas.microsoft.com/sharepoint/v3/contenttype/forms"/>
+  </ds:schemaRefs>
+</ds:datastoreItem>
 </file>
</xml_diff>

<commit_message>
added finalized first presentation and pdf
</commit_message>
<xml_diff>
--- a/21-fs-ias-lec/3-BACnetCore/Documents/presentation.pptx
+++ b/21-fs-ias-lec/3-BACnetCore/Documents/presentation.pptx
@@ -6867,7 +6867,7 @@
           <a:p>
             <a:fld id="{42FF2469-0EFB-441C-B52D-64D512818000}" type="datetimeFigureOut">
               <a:rPr lang="de-DE" smtClean="0"/>
-              <a:t>10.05.2021</a:t>
+              <a:t>12.05.2021</a:t>
             </a:fld>
             <a:endParaRPr lang="de-DE"/>
           </a:p>
@@ -7291,7 +7291,7 @@
           <a:p>
             <a:fld id="{55867CE6-E885-4203-A15D-2969EBCDFBF4}" type="datetime1">
               <a:rPr lang="de-DE" smtClean="0"/>
-              <a:t>10.05.2021</a:t>
+              <a:t>12.05.2021</a:t>
             </a:fld>
             <a:endParaRPr lang="de-DE"/>
           </a:p>
@@ -7489,7 +7489,7 @@
           <a:p>
             <a:fld id="{A4025196-E84F-48CF-A48C-AD1B5DF58818}" type="datetime1">
               <a:rPr lang="de-DE" smtClean="0"/>
-              <a:t>10.05.2021</a:t>
+              <a:t>12.05.2021</a:t>
             </a:fld>
             <a:endParaRPr lang="de-DE"/>
           </a:p>
@@ -7697,7 +7697,7 @@
           <a:p>
             <a:fld id="{EE96DBAE-844C-4C1F-8133-DC072F799892}" type="datetime1">
               <a:rPr lang="de-DE" smtClean="0"/>
-              <a:t>10.05.2021</a:t>
+              <a:t>12.05.2021</a:t>
             </a:fld>
             <a:endParaRPr lang="de-DE"/>
           </a:p>
@@ -7895,7 +7895,7 @@
           <a:p>
             <a:fld id="{602EFBBE-14A6-4A64-B3AA-ADB39ED62F58}" type="datetime1">
               <a:rPr lang="de-DE" smtClean="0"/>
-              <a:t>10.05.2021</a:t>
+              <a:t>12.05.2021</a:t>
             </a:fld>
             <a:endParaRPr lang="de-DE"/>
           </a:p>
@@ -8170,7 +8170,7 @@
           <a:p>
             <a:fld id="{75C23B9F-D7E3-4146-BB56-AAFC0D5EEAAF}" type="datetime1">
               <a:rPr lang="de-DE" smtClean="0"/>
-              <a:t>10.05.2021</a:t>
+              <a:t>12.05.2021</a:t>
             </a:fld>
             <a:endParaRPr lang="de-DE"/>
           </a:p>
@@ -8435,7 +8435,7 @@
           <a:p>
             <a:fld id="{7AC0E115-7CED-4D06-9757-035CDFC06BFF}" type="datetime1">
               <a:rPr lang="de-DE" smtClean="0"/>
-              <a:t>10.05.2021</a:t>
+              <a:t>12.05.2021</a:t>
             </a:fld>
             <a:endParaRPr lang="de-DE"/>
           </a:p>
@@ -8847,7 +8847,7 @@
           <a:p>
             <a:fld id="{B1E5B7CB-308C-4030-98F9-0816B5D1F083}" type="datetime1">
               <a:rPr lang="de-DE" smtClean="0"/>
-              <a:t>10.05.2021</a:t>
+              <a:t>12.05.2021</a:t>
             </a:fld>
             <a:endParaRPr lang="de-DE"/>
           </a:p>
@@ -8988,7 +8988,7 @@
           <a:p>
             <a:fld id="{A11D1A23-3990-4556-AB95-FAE0C336F5F4}" type="datetime1">
               <a:rPr lang="de-DE" smtClean="0"/>
-              <a:t>10.05.2021</a:t>
+              <a:t>12.05.2021</a:t>
             </a:fld>
             <a:endParaRPr lang="de-DE"/>
           </a:p>
@@ -9101,7 +9101,7 @@
           <a:p>
             <a:fld id="{F41BE48C-AC5D-41A6-88DE-0799E5A0D42E}" type="datetime1">
               <a:rPr lang="de-DE" smtClean="0"/>
-              <a:t>10.05.2021</a:t>
+              <a:t>12.05.2021</a:t>
             </a:fld>
             <a:endParaRPr lang="de-DE"/>
           </a:p>
@@ -9412,7 +9412,7 @@
           <a:p>
             <a:fld id="{9581C9C2-C83E-4F1A-9B97-D10952A164F6}" type="datetime1">
               <a:rPr lang="de-DE" smtClean="0"/>
-              <a:t>10.05.2021</a:t>
+              <a:t>12.05.2021</a:t>
             </a:fld>
             <a:endParaRPr lang="de-DE"/>
           </a:p>
@@ -9703,7 +9703,7 @@
           <a:p>
             <a:fld id="{3B03D962-037B-4AB6-B462-4228C3E21AAF}" type="datetime1">
               <a:rPr lang="de-DE" smtClean="0"/>
-              <a:t>10.05.2021</a:t>
+              <a:t>12.05.2021</a:t>
             </a:fld>
             <a:endParaRPr lang="de-DE"/>
           </a:p>
@@ -9995,7 +9995,7 @@
           <a:p>
             <a:fld id="{DF9AE8E5-7959-4C58-B3D3-9FAFEA8EB156}" type="datetime1">
               <a:rPr lang="de-DE" smtClean="0"/>
-              <a:t>10.05.2021</a:t>
+              <a:t>12.05.2021</a:t>
             </a:fld>
             <a:endParaRPr lang="de-DE"/>
           </a:p>
@@ -11829,7 +11829,7 @@
             </a:ln>
             <a:extLst>
               <a:ext uri="{91240B29-F687-4f45-9708-019B960494DF}">
-                <a14:hiddenLine xmlns:a14="http://schemas.microsoft.com/office/drawing/2010/main" xmlns="" w="9525">
+                <a14:hiddenLine xmlns="" xmlns:a14="http://schemas.microsoft.com/office/drawing/2010/main" w="9525">
                   <a:solidFill>
                     <a:srgbClr val="000000"/>
                   </a:solidFill>
@@ -12504,7 +12504,7 @@
             </a:ln>
             <a:extLst>
               <a:ext uri="{91240B29-F687-4f45-9708-019B960494DF}">
-                <a14:hiddenLine xmlns:a14="http://schemas.microsoft.com/office/drawing/2010/main" xmlns="" w="9525">
+                <a14:hiddenLine xmlns="" xmlns:a14="http://schemas.microsoft.com/office/drawing/2010/main" w="9525">
                   <a:solidFill>
                     <a:srgbClr val="000000"/>
                   </a:solidFill>
@@ -18153,7 +18153,9 @@
           <a:lstStyle/>
           <a:p>
             <a:r>
-              <a:rPr lang="de-DE" dirty="0"/>
+              <a:rPr lang="de-DE" dirty="0">
+                <a:latin typeface="Lorenza" panose="02000500000000000000" pitchFamily="2" charset="0"/>
+              </a:rPr>
               <a:t>Netzknoten erstellen</a:t>
             </a:r>
           </a:p>
@@ -18276,7 +18278,9 @@
           <a:lstStyle/>
           <a:p>
             <a:r>
-              <a:rPr lang="de-DE" dirty="0"/>
+              <a:rPr lang="de-DE" dirty="0">
+                <a:latin typeface="Lorenza" panose="02000500000000000000" pitchFamily="2" charset="0"/>
+              </a:rPr>
               <a:t>Der Masterfeed</a:t>
             </a:r>
           </a:p>
@@ -18393,7 +18397,9 @@
           <a:lstStyle/>
           <a:p>
             <a:r>
-              <a:rPr lang="de-DE" dirty="0"/>
+              <a:rPr lang="de-DE" dirty="0">
+                <a:latin typeface="Lorenza" panose="02000500000000000000" pitchFamily="2" charset="0"/>
+              </a:rPr>
               <a:t>Senden und Empfangen</a:t>
             </a:r>
           </a:p>
@@ -19062,6 +19068,21 @@
 </file>
 
 <file path=customXml/item1.xml><?xml version="1.0" encoding="utf-8"?>
+<?mso-contentType ?>
+<FormTemplates xmlns="http://schemas.microsoft.com/sharepoint/v3/contenttype/forms">
+  <Display>DocumentLibraryForm</Display>
+  <Edit>DocumentLibraryForm</Edit>
+  <New>DocumentLibraryForm</New>
+</FormTemplates>
+</file>
+
+<file path=customXml/item2.xml><?xml version="1.0" encoding="utf-8"?>
+<p:properties xmlns:p="http://schemas.microsoft.com/office/2006/metadata/properties" xmlns:xsi="http://www.w3.org/2001/XMLSchema-instance" xmlns:pc="http://schemas.microsoft.com/office/infopath/2007/PartnerControls">
+  <documentManagement/>
+</p:properties>
+</file>
+
+<file path=customXml/item3.xml><?xml version="1.0" encoding="utf-8"?>
 <ct:contentTypeSchema xmlns:ct="http://schemas.microsoft.com/office/2006/metadata/contentType" xmlns:ma="http://schemas.microsoft.com/office/2006/metadata/properties/metaAttributes" ct:_="" ma:_="" ma:contentTypeName="Dokument" ma:contentTypeID="0x010100F928FD2B388CA14EA5CD6737385E7612" ma:contentTypeVersion="7" ma:contentTypeDescription="Ein neues Dokument erstellen." ma:contentTypeScope="" ma:versionID="370192537e313c52927510048e1cf931">
   <xsd:schema xmlns:xsd="http://www.w3.org/2001/XMLSchema" xmlns:xs="http://www.w3.org/2001/XMLSchema" xmlns:p="http://schemas.microsoft.com/office/2006/metadata/properties" xmlns:ns3="51a08ac1-174b-4e49-8bba-c06fa4b221fb" targetNamespace="http://schemas.microsoft.com/office/2006/metadata/properties" ma:root="true" ma:fieldsID="bc4a76344ed44fc6f17c3c10956e1d0e" ns3:_="">
     <xsd:import namespace="51a08ac1-174b-4e49-8bba-c06fa4b221fb"/>
@@ -19225,22 +19246,24 @@
 </ct:contentTypeSchema>
 </file>
 
-<file path=customXml/item2.xml><?xml version="1.0" encoding="utf-8"?>
-<p:properties xmlns:p="http://schemas.microsoft.com/office/2006/metadata/properties" xmlns:xsi="http://www.w3.org/2001/XMLSchema-instance" xmlns:pc="http://schemas.microsoft.com/office/infopath/2007/PartnerControls">
-  <documentManagement/>
-</p:properties>
+<file path=customXml/itemProps1.xml><?xml version="1.0" encoding="utf-8"?>
+<ds:datastoreItem xmlns:ds="http://schemas.openxmlformats.org/officeDocument/2006/customXml" ds:itemID="{52DFAA76-DA7C-42FE-9ACB-07F6B47CA830}">
+  <ds:schemaRefs>
+    <ds:schemaRef ds:uri="http://schemas.microsoft.com/sharepoint/v3/contenttype/forms"/>
+  </ds:schemaRefs>
+</ds:datastoreItem>
 </file>
 
-<file path=customXml/item3.xml><?xml version="1.0" encoding="utf-8"?>
-<?mso-contentType ?>
-<FormTemplates xmlns="http://schemas.microsoft.com/sharepoint/v3/contenttype/forms">
-  <Display>DocumentLibraryForm</Display>
-  <Edit>DocumentLibraryForm</Edit>
-  <New>DocumentLibraryForm</New>
-</FormTemplates>
+<file path=customXml/itemProps2.xml><?xml version="1.0" encoding="utf-8"?>
+<ds:datastoreItem xmlns:ds="http://schemas.openxmlformats.org/officeDocument/2006/customXml" ds:itemID="{9C1C98E1-7FB5-4D9F-AB84-81399E3AA813}">
+  <ds:schemaRefs>
+    <ds:schemaRef ds:uri="http://schemas.microsoft.com/office/2006/metadata/properties"/>
+    <ds:schemaRef ds:uri="http://schemas.microsoft.com/office/infopath/2007/PartnerControls"/>
+  </ds:schemaRefs>
+</ds:datastoreItem>
 </file>
 
-<file path=customXml/itemProps1.xml><?xml version="1.0" encoding="utf-8"?>
+<file path=customXml/itemProps3.xml><?xml version="1.0" encoding="utf-8"?>
 <ds:datastoreItem xmlns:ds="http://schemas.openxmlformats.org/officeDocument/2006/customXml" ds:itemID="{45E20B90-750F-449F-A7FA-9ED64EE6BD4B}">
   <ds:schemaRefs>
     <ds:schemaRef ds:uri="http://schemas.microsoft.com/office/2006/metadata/contentType"/>
@@ -19256,21 +19279,4 @@
     <ds:schemaRef ds:uri="http://schemas.microsoft.com/internal/obd"/>
   </ds:schemaRefs>
 </ds:datastoreItem>
-</file>
-
-<file path=customXml/itemProps2.xml><?xml version="1.0" encoding="utf-8"?>
-<ds:datastoreItem xmlns:ds="http://schemas.openxmlformats.org/officeDocument/2006/customXml" ds:itemID="{9C1C98E1-7FB5-4D9F-AB84-81399E3AA813}">
-  <ds:schemaRefs>
-    <ds:schemaRef ds:uri="http://schemas.microsoft.com/office/2006/metadata/properties"/>
-    <ds:schemaRef ds:uri="http://schemas.microsoft.com/office/infopath/2007/PartnerControls"/>
-  </ds:schemaRefs>
-</ds:datastoreItem>
-</file>
-
-<file path=customXml/itemProps3.xml><?xml version="1.0" encoding="utf-8"?>
-<ds:datastoreItem xmlns:ds="http://schemas.openxmlformats.org/officeDocument/2006/customXml" ds:itemID="{52DFAA76-DA7C-42FE-9ACB-07F6B47CA830}">
-  <ds:schemaRefs>
-    <ds:schemaRef ds:uri="http://schemas.microsoft.com/sharepoint/v3/contenttype/forms"/>
-  </ds:schemaRefs>
-</ds:datastoreItem>
 </file>
</xml_diff>